<commit_message>
LayoutFile not entirely finished
</commit_message>
<xml_diff>
--- a/Description/ReservationLayout.pptx
+++ b/Description/ReservationLayout.pptx
@@ -10,6 +10,8 @@
     <p:sldId id="283" r:id="rId4"/>
     <p:sldId id="265" r:id="rId5"/>
     <p:sldId id="266" r:id="rId6"/>
+    <p:sldId id="284" r:id="rId7"/>
+    <p:sldId id="285" r:id="rId8"/>
   </p:sldIdLst>
   <p:sldSz cx="12192000" cy="6858000"/>
   <p:notesSz cx="6661150" cy="9866313"/>
@@ -258,7 +260,7 @@
           <a:p>
             <a:fld id="{DDCE6D58-9B57-4731-A47B-3CD41B48F0A9}" type="datetimeFigureOut">
               <a:rPr lang="de-CH" smtClean="0"/>
-              <a:t>12.11.2024</a:t>
+              <a:t>29.11.2024</a:t>
             </a:fld>
             <a:endParaRPr lang="de-CH"/>
           </a:p>
@@ -428,7 +430,7 @@
           <a:p>
             <a:fld id="{DDCE6D58-9B57-4731-A47B-3CD41B48F0A9}" type="datetimeFigureOut">
               <a:rPr lang="de-CH" smtClean="0"/>
-              <a:t>12.11.2024</a:t>
+              <a:t>29.11.2024</a:t>
             </a:fld>
             <a:endParaRPr lang="de-CH"/>
           </a:p>
@@ -608,7 +610,7 @@
           <a:p>
             <a:fld id="{DDCE6D58-9B57-4731-A47B-3CD41B48F0A9}" type="datetimeFigureOut">
               <a:rPr lang="de-CH" smtClean="0"/>
-              <a:t>12.11.2024</a:t>
+              <a:t>29.11.2024</a:t>
             </a:fld>
             <a:endParaRPr lang="de-CH"/>
           </a:p>
@@ -778,7 +780,7 @@
           <a:p>
             <a:fld id="{DDCE6D58-9B57-4731-A47B-3CD41B48F0A9}" type="datetimeFigureOut">
               <a:rPr lang="de-CH" smtClean="0"/>
-              <a:t>12.11.2024</a:t>
+              <a:t>29.11.2024</a:t>
             </a:fld>
             <a:endParaRPr lang="de-CH"/>
           </a:p>
@@ -1024,7 +1026,7 @@
           <a:p>
             <a:fld id="{DDCE6D58-9B57-4731-A47B-3CD41B48F0A9}" type="datetimeFigureOut">
               <a:rPr lang="de-CH" smtClean="0"/>
-              <a:t>12.11.2024</a:t>
+              <a:t>29.11.2024</a:t>
             </a:fld>
             <a:endParaRPr lang="de-CH"/>
           </a:p>
@@ -1256,7 +1258,7 @@
           <a:p>
             <a:fld id="{DDCE6D58-9B57-4731-A47B-3CD41B48F0A9}" type="datetimeFigureOut">
               <a:rPr lang="de-CH" smtClean="0"/>
-              <a:t>12.11.2024</a:t>
+              <a:t>29.11.2024</a:t>
             </a:fld>
             <a:endParaRPr lang="de-CH"/>
           </a:p>
@@ -1623,7 +1625,7 @@
           <a:p>
             <a:fld id="{DDCE6D58-9B57-4731-A47B-3CD41B48F0A9}" type="datetimeFigureOut">
               <a:rPr lang="de-CH" smtClean="0"/>
-              <a:t>12.11.2024</a:t>
+              <a:t>29.11.2024</a:t>
             </a:fld>
             <a:endParaRPr lang="de-CH"/>
           </a:p>
@@ -1741,7 +1743,7 @@
           <a:p>
             <a:fld id="{DDCE6D58-9B57-4731-A47B-3CD41B48F0A9}" type="datetimeFigureOut">
               <a:rPr lang="de-CH" smtClean="0"/>
-              <a:t>12.11.2024</a:t>
+              <a:t>29.11.2024</a:t>
             </a:fld>
             <a:endParaRPr lang="de-CH"/>
           </a:p>
@@ -1836,7 +1838,7 @@
           <a:p>
             <a:fld id="{DDCE6D58-9B57-4731-A47B-3CD41B48F0A9}" type="datetimeFigureOut">
               <a:rPr lang="de-CH" smtClean="0"/>
-              <a:t>12.11.2024</a:t>
+              <a:t>29.11.2024</a:t>
             </a:fld>
             <a:endParaRPr lang="de-CH"/>
           </a:p>
@@ -2113,7 +2115,7 @@
           <a:p>
             <a:fld id="{DDCE6D58-9B57-4731-A47B-3CD41B48F0A9}" type="datetimeFigureOut">
               <a:rPr lang="de-CH" smtClean="0"/>
-              <a:t>12.11.2024</a:t>
+              <a:t>29.11.2024</a:t>
             </a:fld>
             <a:endParaRPr lang="de-CH"/>
           </a:p>
@@ -2366,7 +2368,7 @@
           <a:p>
             <a:fld id="{DDCE6D58-9B57-4731-A47B-3CD41B48F0A9}" type="datetimeFigureOut">
               <a:rPr lang="de-CH" smtClean="0"/>
-              <a:t>12.11.2024</a:t>
+              <a:t>29.11.2024</a:t>
             </a:fld>
             <a:endParaRPr lang="de-CH"/>
           </a:p>
@@ -2579,7 +2581,7 @@
           <a:p>
             <a:fld id="{DDCE6D58-9B57-4731-A47B-3CD41B48F0A9}" type="datetimeFigureOut">
               <a:rPr lang="de-CH" smtClean="0"/>
-              <a:t>12.11.2024</a:t>
+              <a:t>29.11.2024</a:t>
             </a:fld>
             <a:endParaRPr lang="de-CH"/>
           </a:p>
@@ -7947,10 +7949,100 @@
           <a:chExt cx="0" cy="0"/>
         </a:xfrm>
       </p:grpSpPr>
+      <p:pic>
+        <p:nvPicPr>
+          <p:cNvPr id="3" name="Grafik 2">
+            <a:extLst>
+              <a:ext uri="{FF2B5EF4-FFF2-40B4-BE49-F238E27FC236}">
+                <a16:creationId xmlns:a16="http://schemas.microsoft.com/office/drawing/2014/main" id="{7619D2C6-EC7D-E80A-7E30-B631DC911F25}"/>
+              </a:ext>
+            </a:extLst>
+          </p:cNvPr>
+          <p:cNvPicPr>
+            <a:picLocks noChangeAspect="1"/>
+          </p:cNvPicPr>
+          <p:nvPr/>
+        </p:nvPicPr>
+        <p:blipFill>
+          <a:blip r:embed="rId2"/>
+          <a:stretch>
+            <a:fillRect/>
+          </a:stretch>
+        </p:blipFill>
+        <p:spPr>
+          <a:xfrm>
+            <a:off x="3868677" y="480149"/>
+            <a:ext cx="3983851" cy="6293009"/>
+          </a:xfrm>
+          <a:prstGeom prst="rect">
+            <a:avLst/>
+          </a:prstGeom>
+        </p:spPr>
+      </p:pic>
     </p:spTree>
     <p:extLst>
       <p:ext uri="{BB962C8B-B14F-4D97-AF65-F5344CB8AC3E}">
         <p14:creationId xmlns:p14="http://schemas.microsoft.com/office/powerpoint/2010/main" val="2444453286"/>
+      </p:ext>
+    </p:extLst>
+  </p:cSld>
+  <p:clrMapOvr>
+    <a:masterClrMapping/>
+  </p:clrMapOvr>
+</p:sld>
+</file>
+
+<file path=ppt/slides/slide6.xml><?xml version="1.0" encoding="utf-8"?>
+<p:sld xmlns:a="http://schemas.openxmlformats.org/drawingml/2006/main" xmlns:r="http://schemas.openxmlformats.org/officeDocument/2006/relationships" xmlns:p="http://schemas.openxmlformats.org/presentationml/2006/main">
+  <p:cSld>
+    <p:spTree>
+      <p:nvGrpSpPr>
+        <p:cNvPr id="1" name=""/>
+        <p:cNvGrpSpPr/>
+        <p:nvPr/>
+      </p:nvGrpSpPr>
+      <p:grpSpPr>
+        <a:xfrm>
+          <a:off x="0" y="0"/>
+          <a:ext cx="0" cy="0"/>
+          <a:chOff x="0" y="0"/>
+          <a:chExt cx="0" cy="0"/>
+        </a:xfrm>
+      </p:grpSpPr>
+    </p:spTree>
+    <p:extLst>
+      <p:ext uri="{BB962C8B-B14F-4D97-AF65-F5344CB8AC3E}">
+        <p14:creationId xmlns:p14="http://schemas.microsoft.com/office/powerpoint/2010/main" val="2987062777"/>
+      </p:ext>
+    </p:extLst>
+  </p:cSld>
+  <p:clrMapOvr>
+    <a:masterClrMapping/>
+  </p:clrMapOvr>
+</p:sld>
+</file>
+
+<file path=ppt/slides/slide7.xml><?xml version="1.0" encoding="utf-8"?>
+<p:sld xmlns:a="http://schemas.openxmlformats.org/drawingml/2006/main" xmlns:r="http://schemas.openxmlformats.org/officeDocument/2006/relationships" xmlns:p="http://schemas.openxmlformats.org/presentationml/2006/main">
+  <p:cSld>
+    <p:spTree>
+      <p:nvGrpSpPr>
+        <p:cNvPr id="1" name=""/>
+        <p:cNvGrpSpPr/>
+        <p:nvPr/>
+      </p:nvGrpSpPr>
+      <p:grpSpPr>
+        <a:xfrm>
+          <a:off x="0" y="0"/>
+          <a:ext cx="0" cy="0"/>
+          <a:chOff x="0" y="0"/>
+          <a:chExt cx="0" cy="0"/>
+        </a:xfrm>
+      </p:grpSpPr>
+    </p:spTree>
+    <p:extLst>
+      <p:ext uri="{BB962C8B-B14F-4D97-AF65-F5344CB8AC3E}">
+        <p14:creationId xmlns:p14="http://schemas.microsoft.com/office/powerpoint/2010/main" val="2699061922"/>
       </p:ext>
     </p:extLst>
   </p:cSld>

</xml_diff>

<commit_message>
Seat event functions added
</commit_message>
<xml_diff>
--- a/Description/ReservationLayout.pptx
+++ b/Description/ReservationLayout.pptx
@@ -11,9 +11,10 @@
     <p:sldId id="284" r:id="rId5"/>
     <p:sldId id="286" r:id="rId6"/>
     <p:sldId id="287" r:id="rId7"/>
-    <p:sldId id="265" r:id="rId8"/>
-    <p:sldId id="266" r:id="rId9"/>
-    <p:sldId id="285" r:id="rId10"/>
+    <p:sldId id="288" r:id="rId8"/>
+    <p:sldId id="265" r:id="rId9"/>
+    <p:sldId id="266" r:id="rId10"/>
+    <p:sldId id="285" r:id="rId11"/>
   </p:sldIdLst>
   <p:sldSz cx="12192000" cy="6858000"/>
   <p:notesSz cx="6661150" cy="9866313"/>
@@ -274,7 +275,7 @@
           <a:p>
             <a:fld id="{DDCE6D58-9B57-4731-A47B-3CD41B48F0A9}" type="datetimeFigureOut">
               <a:rPr lang="de-CH" smtClean="0"/>
-              <a:t>04.12.2024</a:t>
+              <a:t>05.12.2024</a:t>
             </a:fld>
             <a:endParaRPr lang="de-CH"/>
           </a:p>
@@ -444,7 +445,7 @@
           <a:p>
             <a:fld id="{DDCE6D58-9B57-4731-A47B-3CD41B48F0A9}" type="datetimeFigureOut">
               <a:rPr lang="de-CH" smtClean="0"/>
-              <a:t>04.12.2024</a:t>
+              <a:t>05.12.2024</a:t>
             </a:fld>
             <a:endParaRPr lang="de-CH"/>
           </a:p>
@@ -624,7 +625,7 @@
           <a:p>
             <a:fld id="{DDCE6D58-9B57-4731-A47B-3CD41B48F0A9}" type="datetimeFigureOut">
               <a:rPr lang="de-CH" smtClean="0"/>
-              <a:t>04.12.2024</a:t>
+              <a:t>05.12.2024</a:t>
             </a:fld>
             <a:endParaRPr lang="de-CH"/>
           </a:p>
@@ -794,7 +795,7 @@
           <a:p>
             <a:fld id="{DDCE6D58-9B57-4731-A47B-3CD41B48F0A9}" type="datetimeFigureOut">
               <a:rPr lang="de-CH" smtClean="0"/>
-              <a:t>04.12.2024</a:t>
+              <a:t>05.12.2024</a:t>
             </a:fld>
             <a:endParaRPr lang="de-CH"/>
           </a:p>
@@ -1040,7 +1041,7 @@
           <a:p>
             <a:fld id="{DDCE6D58-9B57-4731-A47B-3CD41B48F0A9}" type="datetimeFigureOut">
               <a:rPr lang="de-CH" smtClean="0"/>
-              <a:t>04.12.2024</a:t>
+              <a:t>05.12.2024</a:t>
             </a:fld>
             <a:endParaRPr lang="de-CH"/>
           </a:p>
@@ -1272,7 +1273,7 @@
           <a:p>
             <a:fld id="{DDCE6D58-9B57-4731-A47B-3CD41B48F0A9}" type="datetimeFigureOut">
               <a:rPr lang="de-CH" smtClean="0"/>
-              <a:t>04.12.2024</a:t>
+              <a:t>05.12.2024</a:t>
             </a:fld>
             <a:endParaRPr lang="de-CH"/>
           </a:p>
@@ -1639,7 +1640,7 @@
           <a:p>
             <a:fld id="{DDCE6D58-9B57-4731-A47B-3CD41B48F0A9}" type="datetimeFigureOut">
               <a:rPr lang="de-CH" smtClean="0"/>
-              <a:t>04.12.2024</a:t>
+              <a:t>05.12.2024</a:t>
             </a:fld>
             <a:endParaRPr lang="de-CH"/>
           </a:p>
@@ -1757,7 +1758,7 @@
           <a:p>
             <a:fld id="{DDCE6D58-9B57-4731-A47B-3CD41B48F0A9}" type="datetimeFigureOut">
               <a:rPr lang="de-CH" smtClean="0"/>
-              <a:t>04.12.2024</a:t>
+              <a:t>05.12.2024</a:t>
             </a:fld>
             <a:endParaRPr lang="de-CH"/>
           </a:p>
@@ -1852,7 +1853,7 @@
           <a:p>
             <a:fld id="{DDCE6D58-9B57-4731-A47B-3CD41B48F0A9}" type="datetimeFigureOut">
               <a:rPr lang="de-CH" smtClean="0"/>
-              <a:t>04.12.2024</a:t>
+              <a:t>05.12.2024</a:t>
             </a:fld>
             <a:endParaRPr lang="de-CH"/>
           </a:p>
@@ -2129,7 +2130,7 @@
           <a:p>
             <a:fld id="{DDCE6D58-9B57-4731-A47B-3CD41B48F0A9}" type="datetimeFigureOut">
               <a:rPr lang="de-CH" smtClean="0"/>
-              <a:t>04.12.2024</a:t>
+              <a:t>05.12.2024</a:t>
             </a:fld>
             <a:endParaRPr lang="de-CH"/>
           </a:p>
@@ -2382,7 +2383,7 @@
           <a:p>
             <a:fld id="{DDCE6D58-9B57-4731-A47B-3CD41B48F0A9}" type="datetimeFigureOut">
               <a:rPr lang="de-CH" smtClean="0"/>
-              <a:t>04.12.2024</a:t>
+              <a:t>05.12.2024</a:t>
             </a:fld>
             <a:endParaRPr lang="de-CH"/>
           </a:p>
@@ -2595,7 +2596,7 @@
           <a:p>
             <a:fld id="{DDCE6D58-9B57-4731-A47B-3CD41B48F0A9}" type="datetimeFigureOut">
               <a:rPr lang="de-CH" smtClean="0"/>
-              <a:t>04.12.2024</a:t>
+              <a:t>05.12.2024</a:t>
             </a:fld>
             <a:endParaRPr lang="de-CH"/>
           </a:p>
@@ -4040,6 +4041,36 @@
 </p:sld>
 </file>
 
+<file path=ppt/slides/slide10.xml><?xml version="1.0" encoding="utf-8"?>
+<p:sld xmlns:a="http://schemas.openxmlformats.org/drawingml/2006/main" xmlns:r="http://schemas.openxmlformats.org/officeDocument/2006/relationships" xmlns:p="http://schemas.openxmlformats.org/presentationml/2006/main">
+  <p:cSld>
+    <p:spTree>
+      <p:nvGrpSpPr>
+        <p:cNvPr id="1" name=""/>
+        <p:cNvGrpSpPr/>
+        <p:nvPr/>
+      </p:nvGrpSpPr>
+      <p:grpSpPr>
+        <a:xfrm>
+          <a:off x="0" y="0"/>
+          <a:ext cx="0" cy="0"/>
+          <a:chOff x="0" y="0"/>
+          <a:chExt cx="0" cy="0"/>
+        </a:xfrm>
+      </p:grpSpPr>
+    </p:spTree>
+    <p:extLst>
+      <p:ext uri="{BB962C8B-B14F-4D97-AF65-F5344CB8AC3E}">
+        <p14:creationId xmlns:p14="http://schemas.microsoft.com/office/powerpoint/2010/main" val="2699061922"/>
+      </p:ext>
+    </p:extLst>
+  </p:cSld>
+  <p:clrMapOvr>
+    <a:masterClrMapping/>
+  </p:clrMapOvr>
+</p:sld>
+</file>
+
 <file path=ppt/slides/slide2.xml><?xml version="1.0" encoding="utf-8"?>
 <p:sld xmlns:a="http://schemas.openxmlformats.org/drawingml/2006/main" xmlns:r="http://schemas.openxmlformats.org/officeDocument/2006/relationships" xmlns:p="http://schemas.openxmlformats.org/presentationml/2006/main">
   <p:cSld>
@@ -15414,6 +15445,36 @@
           <a:chExt cx="0" cy="0"/>
         </a:xfrm>
       </p:grpSpPr>
+    </p:spTree>
+    <p:extLst>
+      <p:ext uri="{BB962C8B-B14F-4D97-AF65-F5344CB8AC3E}">
+        <p14:creationId xmlns:p14="http://schemas.microsoft.com/office/powerpoint/2010/main" val="1389259899"/>
+      </p:ext>
+    </p:extLst>
+  </p:cSld>
+  <p:clrMapOvr>
+    <a:masterClrMapping/>
+  </p:clrMapOvr>
+</p:sld>
+</file>
+
+<file path=ppt/slides/slide8.xml><?xml version="1.0" encoding="utf-8"?>
+<p:sld xmlns:a="http://schemas.openxmlformats.org/drawingml/2006/main" xmlns:r="http://schemas.openxmlformats.org/officeDocument/2006/relationships" xmlns:p="http://schemas.openxmlformats.org/presentationml/2006/main">
+  <p:cSld>
+    <p:spTree>
+      <p:nvGrpSpPr>
+        <p:cNvPr id="1" name=""/>
+        <p:cNvGrpSpPr/>
+        <p:nvPr/>
+      </p:nvGrpSpPr>
+      <p:grpSpPr>
+        <a:xfrm>
+          <a:off x="0" y="0"/>
+          <a:ext cx="0" cy="0"/>
+          <a:chOff x="0" y="0"/>
+          <a:chExt cx="0" cy="0"/>
+        </a:xfrm>
+      </p:grpSpPr>
       <p:sp>
         <p:nvSpPr>
           <p:cNvPr id="2" name="Rechteck 1">
@@ -15646,7 +15707,7 @@
 </p:sld>
 </file>
 
-<file path=ppt/slides/slide8.xml><?xml version="1.0" encoding="utf-8"?>
+<file path=ppt/slides/slide9.xml><?xml version="1.0" encoding="utf-8"?>
 <p:sld xmlns:a="http://schemas.openxmlformats.org/drawingml/2006/main" xmlns:r="http://schemas.openxmlformats.org/officeDocument/2006/relationships" xmlns:p="http://schemas.openxmlformats.org/presentationml/2006/main">
   <p:cSld>
     <p:spTree>
@@ -15697,36 +15758,6 @@
     <p:extLst>
       <p:ext uri="{BB962C8B-B14F-4D97-AF65-F5344CB8AC3E}">
         <p14:creationId xmlns:p14="http://schemas.microsoft.com/office/powerpoint/2010/main" val="2444453286"/>
-      </p:ext>
-    </p:extLst>
-  </p:cSld>
-  <p:clrMapOvr>
-    <a:masterClrMapping/>
-  </p:clrMapOvr>
-</p:sld>
-</file>
-
-<file path=ppt/slides/slide9.xml><?xml version="1.0" encoding="utf-8"?>
-<p:sld xmlns:a="http://schemas.openxmlformats.org/drawingml/2006/main" xmlns:r="http://schemas.openxmlformats.org/officeDocument/2006/relationships" xmlns:p="http://schemas.openxmlformats.org/presentationml/2006/main">
-  <p:cSld>
-    <p:spTree>
-      <p:nvGrpSpPr>
-        <p:cNvPr id="1" name=""/>
-        <p:cNvGrpSpPr/>
-        <p:nvPr/>
-      </p:nvGrpSpPr>
-      <p:grpSpPr>
-        <a:xfrm>
-          <a:off x="0" y="0"/>
-          <a:ext cx="0" cy="0"/>
-          <a:chOff x="0" y="0"/>
-          <a:chExt cx="0" cy="0"/>
-        </a:xfrm>
-      </p:grpSpPr>
-    </p:spTree>
-    <p:extLst>
-      <p:ext uri="{BB962C8B-B14F-4D97-AF65-F5344CB8AC3E}">
-        <p14:creationId xmlns:p14="http://schemas.microsoft.com/office/powerpoint/2010/main" val="2699061922"/>
       </p:ext>
     </p:extLst>
   </p:cSld>

</xml_diff>

<commit_message>
Button for the creation of XML files added
</commit_message>
<xml_diff>
--- a/Description/ReservationLayout.pptx
+++ b/Description/ReservationLayout.pptx
@@ -276,7 +276,7 @@
           <a:p>
             <a:fld id="{DDCE6D58-9B57-4731-A47B-3CD41B48F0A9}" type="datetimeFigureOut">
               <a:rPr lang="de-CH" smtClean="0"/>
-              <a:t>06.12.2024</a:t>
+              <a:t>08.12.2024</a:t>
             </a:fld>
             <a:endParaRPr lang="de-CH"/>
           </a:p>
@@ -446,7 +446,7 @@
           <a:p>
             <a:fld id="{DDCE6D58-9B57-4731-A47B-3CD41B48F0A9}" type="datetimeFigureOut">
               <a:rPr lang="de-CH" smtClean="0"/>
-              <a:t>06.12.2024</a:t>
+              <a:t>08.12.2024</a:t>
             </a:fld>
             <a:endParaRPr lang="de-CH"/>
           </a:p>
@@ -626,7 +626,7 @@
           <a:p>
             <a:fld id="{DDCE6D58-9B57-4731-A47B-3CD41B48F0A9}" type="datetimeFigureOut">
               <a:rPr lang="de-CH" smtClean="0"/>
-              <a:t>06.12.2024</a:t>
+              <a:t>08.12.2024</a:t>
             </a:fld>
             <a:endParaRPr lang="de-CH"/>
           </a:p>
@@ -796,7 +796,7 @@
           <a:p>
             <a:fld id="{DDCE6D58-9B57-4731-A47B-3CD41B48F0A9}" type="datetimeFigureOut">
               <a:rPr lang="de-CH" smtClean="0"/>
-              <a:t>06.12.2024</a:t>
+              <a:t>08.12.2024</a:t>
             </a:fld>
             <a:endParaRPr lang="de-CH"/>
           </a:p>
@@ -1042,7 +1042,7 @@
           <a:p>
             <a:fld id="{DDCE6D58-9B57-4731-A47B-3CD41B48F0A9}" type="datetimeFigureOut">
               <a:rPr lang="de-CH" smtClean="0"/>
-              <a:t>06.12.2024</a:t>
+              <a:t>08.12.2024</a:t>
             </a:fld>
             <a:endParaRPr lang="de-CH"/>
           </a:p>
@@ -1274,7 +1274,7 @@
           <a:p>
             <a:fld id="{DDCE6D58-9B57-4731-A47B-3CD41B48F0A9}" type="datetimeFigureOut">
               <a:rPr lang="de-CH" smtClean="0"/>
-              <a:t>06.12.2024</a:t>
+              <a:t>08.12.2024</a:t>
             </a:fld>
             <a:endParaRPr lang="de-CH"/>
           </a:p>
@@ -1641,7 +1641,7 @@
           <a:p>
             <a:fld id="{DDCE6D58-9B57-4731-A47B-3CD41B48F0A9}" type="datetimeFigureOut">
               <a:rPr lang="de-CH" smtClean="0"/>
-              <a:t>06.12.2024</a:t>
+              <a:t>08.12.2024</a:t>
             </a:fld>
             <a:endParaRPr lang="de-CH"/>
           </a:p>
@@ -1759,7 +1759,7 @@
           <a:p>
             <a:fld id="{DDCE6D58-9B57-4731-A47B-3CD41B48F0A9}" type="datetimeFigureOut">
               <a:rPr lang="de-CH" smtClean="0"/>
-              <a:t>06.12.2024</a:t>
+              <a:t>08.12.2024</a:t>
             </a:fld>
             <a:endParaRPr lang="de-CH"/>
           </a:p>
@@ -1854,7 +1854,7 @@
           <a:p>
             <a:fld id="{DDCE6D58-9B57-4731-A47B-3CD41B48F0A9}" type="datetimeFigureOut">
               <a:rPr lang="de-CH" smtClean="0"/>
-              <a:t>06.12.2024</a:t>
+              <a:t>08.12.2024</a:t>
             </a:fld>
             <a:endParaRPr lang="de-CH"/>
           </a:p>
@@ -2131,7 +2131,7 @@
           <a:p>
             <a:fld id="{DDCE6D58-9B57-4731-A47B-3CD41B48F0A9}" type="datetimeFigureOut">
               <a:rPr lang="de-CH" smtClean="0"/>
-              <a:t>06.12.2024</a:t>
+              <a:t>08.12.2024</a:t>
             </a:fld>
             <a:endParaRPr lang="de-CH"/>
           </a:p>
@@ -2384,7 +2384,7 @@
           <a:p>
             <a:fld id="{DDCE6D58-9B57-4731-A47B-3CD41B48F0A9}" type="datetimeFigureOut">
               <a:rPr lang="de-CH" smtClean="0"/>
-              <a:t>06.12.2024</a:t>
+              <a:t>08.12.2024</a:t>
             </a:fld>
             <a:endParaRPr lang="de-CH"/>
           </a:p>
@@ -2597,7 +2597,7 @@
           <a:p>
             <a:fld id="{DDCE6D58-9B57-4731-A47B-3CD41B48F0A9}" type="datetimeFigureOut">
               <a:rPr lang="de-CH" smtClean="0"/>
-              <a:t>06.12.2024</a:t>
+              <a:t>08.12.2024</a:t>
             </a:fld>
             <a:endParaRPr lang="de-CH"/>
           </a:p>
@@ -4029,6 +4029,66 @@
           </a:p>
         </p:txBody>
       </p:sp>
+      <p:sp>
+        <p:nvSpPr>
+          <p:cNvPr id="3" name="Rechteck 2">
+            <a:extLst>
+              <a:ext uri="{FF2B5EF4-FFF2-40B4-BE49-F238E27FC236}">
+                <a16:creationId xmlns:a16="http://schemas.microsoft.com/office/drawing/2014/main" id="{015C8146-9AF8-AA1D-33F2-A86F90B0D083}"/>
+              </a:ext>
+            </a:extLst>
+          </p:cNvPr>
+          <p:cNvSpPr/>
+          <p:nvPr/>
+        </p:nvSpPr>
+        <p:spPr>
+          <a:xfrm>
+            <a:off x="2767553" y="5784836"/>
+            <a:ext cx="1631962" cy="247619"/>
+          </a:xfrm>
+          <a:prstGeom prst="rect">
+            <a:avLst/>
+          </a:prstGeom>
+          <a:noFill/>
+          <a:ln>
+            <a:solidFill>
+              <a:schemeClr val="tx1"/>
+            </a:solidFill>
+          </a:ln>
+        </p:spPr>
+        <p:style>
+          <a:lnRef idx="2">
+            <a:schemeClr val="accent1">
+              <a:shade val="50000"/>
+            </a:schemeClr>
+          </a:lnRef>
+          <a:fillRef idx="1">
+            <a:schemeClr val="accent1"/>
+          </a:fillRef>
+          <a:effectRef idx="0">
+            <a:schemeClr val="accent1"/>
+          </a:effectRef>
+          <a:fontRef idx="minor">
+            <a:schemeClr val="lt1"/>
+          </a:fontRef>
+        </p:style>
+        <p:txBody>
+          <a:bodyPr rtlCol="0" anchor="ctr"/>
+          <a:lstStyle/>
+          <a:p>
+            <a:r>
+              <a:rPr lang="de-CH" sz="1200" dirty="0">
+                <a:solidFill>
+                  <a:schemeClr val="tx1"/>
+                </a:solidFill>
+                <a:latin typeface="Arial" panose="020B0604020202020204" pitchFamily="34" charset="0"/>
+                <a:cs typeface="Arial" panose="020B0604020202020204" pitchFamily="34" charset="0"/>
+              </a:rPr>
+              <a:t>Neue XML Dateien </a:t>
+            </a:r>
+          </a:p>
+        </p:txBody>
+      </p:sp>
     </p:spTree>
     <p:extLst>
       <p:ext uri="{BB962C8B-B14F-4D97-AF65-F5344CB8AC3E}">
@@ -5352,7 +5412,7 @@
         <p:spPr>
           <a:xfrm>
             <a:off x="3428528" y="6337143"/>
-            <a:ext cx="1248534" cy="237807"/>
+            <a:ext cx="1569852" cy="237807"/>
           </a:xfrm>
           <a:prstGeom prst="rect">
             <a:avLst/>
@@ -6276,6 +6336,42 @@
             <a:r>
               <a:rPr lang="de-CH" sz="1100" b="1" dirty="0" err="1"/>
               <a:t>id_div_layout_upload</a:t>
+            </a:r>
+            <a:endParaRPr lang="de-CH" b="1" dirty="0"/>
+          </a:p>
+        </p:txBody>
+      </p:sp>
+      <p:sp>
+        <p:nvSpPr>
+          <p:cNvPr id="8" name="Textfeld 7">
+            <a:extLst>
+              <a:ext uri="{FF2B5EF4-FFF2-40B4-BE49-F238E27FC236}">
+                <a16:creationId xmlns:a16="http://schemas.microsoft.com/office/drawing/2014/main" id="{F8528DB4-7688-3896-9314-FABD5071F60F}"/>
+              </a:ext>
+            </a:extLst>
+          </p:cNvPr>
+          <p:cNvSpPr txBox="1"/>
+          <p:nvPr/>
+        </p:nvSpPr>
+        <p:spPr>
+          <a:xfrm>
+            <a:off x="3411781" y="6321991"/>
+            <a:ext cx="1710626" cy="261610"/>
+          </a:xfrm>
+          <a:prstGeom prst="rect">
+            <a:avLst/>
+          </a:prstGeom>
+          <a:noFill/>
+        </p:spPr>
+        <p:txBody>
+          <a:bodyPr wrap="square" rtlCol="0">
+            <a:spAutoFit/>
+          </a:bodyPr>
+          <a:lstStyle/>
+          <a:p>
+            <a:r>
+              <a:rPr lang="de-CH" sz="1100" b="1" dirty="0" err="1"/>
+              <a:t>id_div_layout_xml_new</a:t>
             </a:r>
             <a:endParaRPr lang="de-CH" b="1" dirty="0"/>
           </a:p>

</xml_diff>

<commit_message>
Comments and descriptions added
</commit_message>
<xml_diff>
--- a/Description/ReservationLayout.pptx
+++ b/Description/ReservationLayout.pptx
@@ -13,9 +13,12 @@
     <p:sldId id="288" r:id="rId7"/>
     <p:sldId id="286" r:id="rId8"/>
     <p:sldId id="287" r:id="rId9"/>
-    <p:sldId id="265" r:id="rId10"/>
-    <p:sldId id="266" r:id="rId11"/>
-    <p:sldId id="285" r:id="rId12"/>
+    <p:sldId id="290" r:id="rId10"/>
+    <p:sldId id="292" r:id="rId11"/>
+    <p:sldId id="291" r:id="rId12"/>
+    <p:sldId id="265" r:id="rId13"/>
+    <p:sldId id="266" r:id="rId14"/>
+    <p:sldId id="285" r:id="rId15"/>
   </p:sldIdLst>
   <p:sldSz cx="12192000" cy="6858000"/>
   <p:notesSz cx="6661150" cy="9866313"/>
@@ -276,7 +279,7 @@
           <a:p>
             <a:fld id="{DDCE6D58-9B57-4731-A47B-3CD41B48F0A9}" type="datetimeFigureOut">
               <a:rPr lang="de-CH" smtClean="0"/>
-              <a:t>08.12.2024</a:t>
+              <a:t>20.12.2024</a:t>
             </a:fld>
             <a:endParaRPr lang="de-CH"/>
           </a:p>
@@ -446,7 +449,7 @@
           <a:p>
             <a:fld id="{DDCE6D58-9B57-4731-A47B-3CD41B48F0A9}" type="datetimeFigureOut">
               <a:rPr lang="de-CH" smtClean="0"/>
-              <a:t>08.12.2024</a:t>
+              <a:t>20.12.2024</a:t>
             </a:fld>
             <a:endParaRPr lang="de-CH"/>
           </a:p>
@@ -626,7 +629,7 @@
           <a:p>
             <a:fld id="{DDCE6D58-9B57-4731-A47B-3CD41B48F0A9}" type="datetimeFigureOut">
               <a:rPr lang="de-CH" smtClean="0"/>
-              <a:t>08.12.2024</a:t>
+              <a:t>20.12.2024</a:t>
             </a:fld>
             <a:endParaRPr lang="de-CH"/>
           </a:p>
@@ -796,7 +799,7 @@
           <a:p>
             <a:fld id="{DDCE6D58-9B57-4731-A47B-3CD41B48F0A9}" type="datetimeFigureOut">
               <a:rPr lang="de-CH" smtClean="0"/>
-              <a:t>08.12.2024</a:t>
+              <a:t>20.12.2024</a:t>
             </a:fld>
             <a:endParaRPr lang="de-CH"/>
           </a:p>
@@ -1042,7 +1045,7 @@
           <a:p>
             <a:fld id="{DDCE6D58-9B57-4731-A47B-3CD41B48F0A9}" type="datetimeFigureOut">
               <a:rPr lang="de-CH" smtClean="0"/>
-              <a:t>08.12.2024</a:t>
+              <a:t>20.12.2024</a:t>
             </a:fld>
             <a:endParaRPr lang="de-CH"/>
           </a:p>
@@ -1274,7 +1277,7 @@
           <a:p>
             <a:fld id="{DDCE6D58-9B57-4731-A47B-3CD41B48F0A9}" type="datetimeFigureOut">
               <a:rPr lang="de-CH" smtClean="0"/>
-              <a:t>08.12.2024</a:t>
+              <a:t>20.12.2024</a:t>
             </a:fld>
             <a:endParaRPr lang="de-CH"/>
           </a:p>
@@ -1641,7 +1644,7 @@
           <a:p>
             <a:fld id="{DDCE6D58-9B57-4731-A47B-3CD41B48F0A9}" type="datetimeFigureOut">
               <a:rPr lang="de-CH" smtClean="0"/>
-              <a:t>08.12.2024</a:t>
+              <a:t>20.12.2024</a:t>
             </a:fld>
             <a:endParaRPr lang="de-CH"/>
           </a:p>
@@ -1759,7 +1762,7 @@
           <a:p>
             <a:fld id="{DDCE6D58-9B57-4731-A47B-3CD41B48F0A9}" type="datetimeFigureOut">
               <a:rPr lang="de-CH" smtClean="0"/>
-              <a:t>08.12.2024</a:t>
+              <a:t>20.12.2024</a:t>
             </a:fld>
             <a:endParaRPr lang="de-CH"/>
           </a:p>
@@ -1854,7 +1857,7 @@
           <a:p>
             <a:fld id="{DDCE6D58-9B57-4731-A47B-3CD41B48F0A9}" type="datetimeFigureOut">
               <a:rPr lang="de-CH" smtClean="0"/>
-              <a:t>08.12.2024</a:t>
+              <a:t>20.12.2024</a:t>
             </a:fld>
             <a:endParaRPr lang="de-CH"/>
           </a:p>
@@ -2131,7 +2134,7 @@
           <a:p>
             <a:fld id="{DDCE6D58-9B57-4731-A47B-3CD41B48F0A9}" type="datetimeFigureOut">
               <a:rPr lang="de-CH" smtClean="0"/>
-              <a:t>08.12.2024</a:t>
+              <a:t>20.12.2024</a:t>
             </a:fld>
             <a:endParaRPr lang="de-CH"/>
           </a:p>
@@ -2384,7 +2387,7 @@
           <a:p>
             <a:fld id="{DDCE6D58-9B57-4731-A47B-3CD41B48F0A9}" type="datetimeFigureOut">
               <a:rPr lang="de-CH" smtClean="0"/>
-              <a:t>08.12.2024</a:t>
+              <a:t>20.12.2024</a:t>
             </a:fld>
             <a:endParaRPr lang="de-CH"/>
           </a:p>
@@ -2597,7 +2600,7 @@
           <a:p>
             <a:fld id="{DDCE6D58-9B57-4731-A47B-3CD41B48F0A9}" type="datetimeFigureOut">
               <a:rPr lang="de-CH" smtClean="0"/>
-              <a:t>08.12.2024</a:t>
+              <a:t>20.12.2024</a:t>
             </a:fld>
             <a:endParaRPr lang="de-CH"/>
           </a:p>
@@ -4119,6 +4122,917 @@
           <a:chExt cx="0" cy="0"/>
         </a:xfrm>
       </p:grpSpPr>
+      <p:sp>
+        <p:nvSpPr>
+          <p:cNvPr id="2" name="Textfeld 1">
+            <a:extLst>
+              <a:ext uri="{FF2B5EF4-FFF2-40B4-BE49-F238E27FC236}">
+                <a16:creationId xmlns:a16="http://schemas.microsoft.com/office/drawing/2014/main" id="{E37C5640-4119-299C-C5A9-B3E4BF88F9C8}"/>
+              </a:ext>
+            </a:extLst>
+          </p:cNvPr>
+          <p:cNvSpPr txBox="1"/>
+          <p:nvPr/>
+        </p:nvSpPr>
+        <p:spPr>
+          <a:xfrm>
+            <a:off x="0" y="270415"/>
+            <a:ext cx="12192000" cy="369332"/>
+          </a:xfrm>
+          <a:prstGeom prst="rect">
+            <a:avLst/>
+          </a:prstGeom>
+          <a:noFill/>
+        </p:spPr>
+        <p:txBody>
+          <a:bodyPr wrap="square">
+            <a:spAutoFit/>
+          </a:bodyPr>
+          <a:lstStyle/>
+          <a:p>
+            <a:pPr algn="ctr"/>
+            <a:r>
+              <a:rPr lang="de-CH" b="1" dirty="0">
+                <a:latin typeface="Arial" panose="020B0604020202020204" pitchFamily="34" charset="0"/>
+                <a:cs typeface="Arial" panose="020B0604020202020204" pitchFamily="34" charset="0"/>
+              </a:rPr>
+              <a:t>ReservationLayout.htm</a:t>
+            </a:r>
+          </a:p>
+        </p:txBody>
+      </p:sp>
+      <p:sp>
+        <p:nvSpPr>
+          <p:cNvPr id="3" name="Rechteck 2">
+            <a:extLst>
+              <a:ext uri="{FF2B5EF4-FFF2-40B4-BE49-F238E27FC236}">
+                <a16:creationId xmlns:a16="http://schemas.microsoft.com/office/drawing/2014/main" id="{5589BFB1-0E5A-52EF-A6E6-82CED99E30C2}"/>
+              </a:ext>
+            </a:extLst>
+          </p:cNvPr>
+          <p:cNvSpPr/>
+          <p:nvPr/>
+        </p:nvSpPr>
+        <p:spPr>
+          <a:xfrm>
+            <a:off x="301998" y="1337581"/>
+            <a:ext cx="4552806" cy="570469"/>
+          </a:xfrm>
+          <a:prstGeom prst="rect">
+            <a:avLst/>
+          </a:prstGeom>
+          <a:noFill/>
+          <a:ln w="19050">
+            <a:solidFill>
+              <a:schemeClr val="tx1"/>
+            </a:solidFill>
+          </a:ln>
+        </p:spPr>
+        <p:style>
+          <a:lnRef idx="2">
+            <a:schemeClr val="accent1">
+              <a:shade val="50000"/>
+            </a:schemeClr>
+          </a:lnRef>
+          <a:fillRef idx="1">
+            <a:schemeClr val="accent1"/>
+          </a:fillRef>
+          <a:effectRef idx="0">
+            <a:schemeClr val="accent1"/>
+          </a:effectRef>
+          <a:fontRef idx="minor">
+            <a:schemeClr val="lt1"/>
+          </a:fontRef>
+        </p:style>
+        <p:txBody>
+          <a:bodyPr rtlCol="0" anchor="ctr"/>
+          <a:lstStyle/>
+          <a:p>
+            <a:pPr algn="ctr"/>
+            <a:r>
+              <a:rPr lang="de-CH" dirty="0" err="1">
+                <a:solidFill>
+                  <a:schemeClr val="tx1"/>
+                </a:solidFill>
+                <a:latin typeface="Arial" panose="020B0604020202020204" pitchFamily="34" charset="0"/>
+                <a:cs typeface="Arial" panose="020B0604020202020204" pitchFamily="34" charset="0"/>
+              </a:rPr>
+              <a:t>ReservationLayout</a:t>
+            </a:r>
+            <a:endParaRPr lang="de-CH" dirty="0">
+              <a:solidFill>
+                <a:schemeClr val="tx1"/>
+              </a:solidFill>
+              <a:latin typeface="Arial" panose="020B0604020202020204" pitchFamily="34" charset="0"/>
+              <a:cs typeface="Arial" panose="020B0604020202020204" pitchFamily="34" charset="0"/>
+            </a:endParaRPr>
+          </a:p>
+          <a:p>
+            <a:pPr algn="ctr"/>
+            <a:r>
+              <a:rPr lang="de-CH" sz="1200" dirty="0">
+                <a:solidFill>
+                  <a:schemeClr val="tx1"/>
+                </a:solidFill>
+                <a:latin typeface="Arial" panose="020B0604020202020204" pitchFamily="34" charset="0"/>
+                <a:cs typeface="Arial" panose="020B0604020202020204" pitchFamily="34" charset="0"/>
+              </a:rPr>
+              <a:t>Web </a:t>
+            </a:r>
+            <a:r>
+              <a:rPr lang="de-CH" sz="1200" dirty="0" err="1">
+                <a:solidFill>
+                  <a:schemeClr val="tx1"/>
+                </a:solidFill>
+                <a:latin typeface="Arial" panose="020B0604020202020204" pitchFamily="34" charset="0"/>
+                <a:cs typeface="Arial" panose="020B0604020202020204" pitchFamily="34" charset="0"/>
+              </a:rPr>
+              <a:t>application</a:t>
+            </a:r>
+            <a:r>
+              <a:rPr lang="de-CH" sz="1200" dirty="0">
+                <a:solidFill>
+                  <a:schemeClr val="tx1"/>
+                </a:solidFill>
+                <a:latin typeface="Arial" panose="020B0604020202020204" pitchFamily="34" charset="0"/>
+                <a:cs typeface="Arial" panose="020B0604020202020204" pitchFamily="34" charset="0"/>
+              </a:rPr>
+              <a:t>: Create </a:t>
+            </a:r>
+            <a:r>
+              <a:rPr lang="de-CH" sz="1200" dirty="0" err="1">
+                <a:solidFill>
+                  <a:schemeClr val="tx1"/>
+                </a:solidFill>
+                <a:latin typeface="Arial" panose="020B0604020202020204" pitchFamily="34" charset="0"/>
+                <a:cs typeface="Arial" panose="020B0604020202020204" pitchFamily="34" charset="0"/>
+              </a:rPr>
+              <a:t>layout</a:t>
+            </a:r>
+            <a:r>
+              <a:rPr lang="de-CH" sz="1200" dirty="0">
+                <a:solidFill>
+                  <a:schemeClr val="tx1"/>
+                </a:solidFill>
+                <a:latin typeface="Arial" panose="020B0604020202020204" pitchFamily="34" charset="0"/>
+                <a:cs typeface="Arial" panose="020B0604020202020204" pitchFamily="34" charset="0"/>
+              </a:rPr>
+              <a:t> </a:t>
+            </a:r>
+            <a:r>
+              <a:rPr lang="de-CH" sz="1200" dirty="0" err="1">
+                <a:solidFill>
+                  <a:schemeClr val="tx1"/>
+                </a:solidFill>
+                <a:latin typeface="Arial" panose="020B0604020202020204" pitchFamily="34" charset="0"/>
+                <a:cs typeface="Arial" panose="020B0604020202020204" pitchFamily="34" charset="0"/>
+              </a:rPr>
+              <a:t>for</a:t>
+            </a:r>
+            <a:r>
+              <a:rPr lang="de-CH" sz="1200" dirty="0">
+                <a:solidFill>
+                  <a:schemeClr val="tx1"/>
+                </a:solidFill>
+                <a:latin typeface="Arial" panose="020B0604020202020204" pitchFamily="34" charset="0"/>
+                <a:cs typeface="Arial" panose="020B0604020202020204" pitchFamily="34" charset="0"/>
+              </a:rPr>
+              <a:t> </a:t>
+            </a:r>
+            <a:r>
+              <a:rPr lang="de-CH" sz="1200" dirty="0" err="1">
+                <a:solidFill>
+                  <a:schemeClr val="tx1"/>
+                </a:solidFill>
+                <a:latin typeface="Arial" panose="020B0604020202020204" pitchFamily="34" charset="0"/>
+                <a:cs typeface="Arial" panose="020B0604020202020204" pitchFamily="34" charset="0"/>
+              </a:rPr>
+              <a:t>event</a:t>
+            </a:r>
+            <a:r>
+              <a:rPr lang="de-CH" sz="1200" dirty="0">
+                <a:solidFill>
+                  <a:schemeClr val="tx1"/>
+                </a:solidFill>
+                <a:latin typeface="Arial" panose="020B0604020202020204" pitchFamily="34" charset="0"/>
+                <a:cs typeface="Arial" panose="020B0604020202020204" pitchFamily="34" charset="0"/>
+              </a:rPr>
+              <a:t> </a:t>
+            </a:r>
+            <a:r>
+              <a:rPr lang="de-CH" sz="1200" dirty="0" err="1">
+                <a:solidFill>
+                  <a:schemeClr val="tx1"/>
+                </a:solidFill>
+                <a:latin typeface="Arial" panose="020B0604020202020204" pitchFamily="34" charset="0"/>
+                <a:cs typeface="Arial" panose="020B0604020202020204" pitchFamily="34" charset="0"/>
+              </a:rPr>
+              <a:t>premises</a:t>
+            </a:r>
+            <a:endParaRPr lang="de-CH" sz="1200" dirty="0">
+              <a:solidFill>
+                <a:schemeClr val="tx1"/>
+              </a:solidFill>
+              <a:latin typeface="Arial" panose="020B0604020202020204" pitchFamily="34" charset="0"/>
+              <a:cs typeface="Arial" panose="020B0604020202020204" pitchFamily="34" charset="0"/>
+            </a:endParaRPr>
+          </a:p>
+        </p:txBody>
+      </p:sp>
+      <p:sp>
+        <p:nvSpPr>
+          <p:cNvPr id="4" name="Rechteck 3">
+            <a:extLst>
+              <a:ext uri="{FF2B5EF4-FFF2-40B4-BE49-F238E27FC236}">
+                <a16:creationId xmlns:a16="http://schemas.microsoft.com/office/drawing/2014/main" id="{504FA9B9-1F5F-57BA-5E4E-AD0FA3306E44}"/>
+              </a:ext>
+            </a:extLst>
+          </p:cNvPr>
+          <p:cNvSpPr/>
+          <p:nvPr/>
+        </p:nvSpPr>
+        <p:spPr>
+          <a:xfrm>
+            <a:off x="301998" y="1908050"/>
+            <a:ext cx="4552806" cy="2505381"/>
+          </a:xfrm>
+          <a:prstGeom prst="rect">
+            <a:avLst/>
+          </a:prstGeom>
+          <a:noFill/>
+          <a:ln w="19050">
+            <a:solidFill>
+              <a:schemeClr val="tx1"/>
+            </a:solidFill>
+          </a:ln>
+        </p:spPr>
+        <p:style>
+          <a:lnRef idx="2">
+            <a:schemeClr val="accent1">
+              <a:shade val="50000"/>
+            </a:schemeClr>
+          </a:lnRef>
+          <a:fillRef idx="1">
+            <a:schemeClr val="accent1"/>
+          </a:fillRef>
+          <a:effectRef idx="0">
+            <a:schemeClr val="accent1"/>
+          </a:effectRef>
+          <a:fontRef idx="minor">
+            <a:schemeClr val="lt1"/>
+          </a:fontRef>
+        </p:style>
+        <p:txBody>
+          <a:bodyPr rtlCol="0" anchor="ctr"/>
+          <a:lstStyle/>
+          <a:p>
+            <a:r>
+              <a:rPr lang="en-US" sz="1200" b="1" dirty="0">
+                <a:solidFill>
+                  <a:schemeClr val="tx1"/>
+                </a:solidFill>
+                <a:latin typeface="Arial" panose="020B0604020202020204" pitchFamily="34" charset="0"/>
+                <a:cs typeface="Arial" panose="020B0604020202020204" pitchFamily="34" charset="0"/>
+              </a:rPr>
+              <a:t>&lt;html&gt;</a:t>
+            </a:r>
+          </a:p>
+          <a:p>
+            <a:endParaRPr lang="en-US" sz="1200" dirty="0">
+              <a:solidFill>
+                <a:schemeClr val="tx1"/>
+              </a:solidFill>
+              <a:latin typeface="Arial" panose="020B0604020202020204" pitchFamily="34" charset="0"/>
+              <a:cs typeface="Arial" panose="020B0604020202020204" pitchFamily="34" charset="0"/>
+            </a:endParaRPr>
+          </a:p>
+          <a:p>
+            <a:endParaRPr lang="en-US" sz="1200" dirty="0">
+              <a:solidFill>
+                <a:schemeClr val="tx1"/>
+              </a:solidFill>
+              <a:latin typeface="Arial" panose="020B0604020202020204" pitchFamily="34" charset="0"/>
+              <a:cs typeface="Arial" panose="020B0604020202020204" pitchFamily="34" charset="0"/>
+            </a:endParaRPr>
+          </a:p>
+          <a:p>
+            <a:endParaRPr lang="en-US" sz="1200" dirty="0">
+              <a:solidFill>
+                <a:schemeClr val="tx1"/>
+              </a:solidFill>
+              <a:latin typeface="Arial" panose="020B0604020202020204" pitchFamily="34" charset="0"/>
+              <a:cs typeface="Arial" panose="020B0604020202020204" pitchFamily="34" charset="0"/>
+            </a:endParaRPr>
+          </a:p>
+          <a:p>
+            <a:endParaRPr lang="en-US" sz="1200" dirty="0">
+              <a:solidFill>
+                <a:schemeClr val="tx1"/>
+              </a:solidFill>
+              <a:latin typeface="Arial" panose="020B0604020202020204" pitchFamily="34" charset="0"/>
+              <a:cs typeface="Arial" panose="020B0604020202020204" pitchFamily="34" charset="0"/>
+            </a:endParaRPr>
+          </a:p>
+          <a:p>
+            <a:endParaRPr lang="en-US" sz="1200" dirty="0">
+              <a:solidFill>
+                <a:schemeClr val="tx1"/>
+              </a:solidFill>
+              <a:latin typeface="Arial" panose="020B0604020202020204" pitchFamily="34" charset="0"/>
+              <a:cs typeface="Arial" panose="020B0604020202020204" pitchFamily="34" charset="0"/>
+            </a:endParaRPr>
+          </a:p>
+          <a:p>
+            <a:endParaRPr lang="en-US" sz="1200" dirty="0">
+              <a:solidFill>
+                <a:schemeClr val="tx1"/>
+              </a:solidFill>
+              <a:latin typeface="Arial" panose="020B0604020202020204" pitchFamily="34" charset="0"/>
+              <a:cs typeface="Arial" panose="020B0604020202020204" pitchFamily="34" charset="0"/>
+            </a:endParaRPr>
+          </a:p>
+          <a:p>
+            <a:endParaRPr lang="en-US" sz="1200" dirty="0">
+              <a:solidFill>
+                <a:schemeClr val="tx1"/>
+              </a:solidFill>
+              <a:latin typeface="Arial" panose="020B0604020202020204" pitchFamily="34" charset="0"/>
+              <a:cs typeface="Arial" panose="020B0604020202020204" pitchFamily="34" charset="0"/>
+            </a:endParaRPr>
+          </a:p>
+          <a:p>
+            <a:endParaRPr lang="en-US" sz="1200" dirty="0">
+              <a:solidFill>
+                <a:schemeClr val="tx1"/>
+              </a:solidFill>
+              <a:latin typeface="Arial" panose="020B0604020202020204" pitchFamily="34" charset="0"/>
+              <a:cs typeface="Arial" panose="020B0604020202020204" pitchFamily="34" charset="0"/>
+            </a:endParaRPr>
+          </a:p>
+          <a:p>
+            <a:endParaRPr lang="en-US" sz="1200" dirty="0">
+              <a:solidFill>
+                <a:schemeClr val="tx1"/>
+              </a:solidFill>
+              <a:latin typeface="Arial" panose="020B0604020202020204" pitchFamily="34" charset="0"/>
+              <a:cs typeface="Arial" panose="020B0604020202020204" pitchFamily="34" charset="0"/>
+            </a:endParaRPr>
+          </a:p>
+          <a:p>
+            <a:endParaRPr lang="en-US" sz="1200" dirty="0">
+              <a:solidFill>
+                <a:schemeClr val="tx1"/>
+              </a:solidFill>
+              <a:latin typeface="Arial" panose="020B0604020202020204" pitchFamily="34" charset="0"/>
+              <a:cs typeface="Arial" panose="020B0604020202020204" pitchFamily="34" charset="0"/>
+            </a:endParaRPr>
+          </a:p>
+          <a:p>
+            <a:endParaRPr lang="en-US" sz="1200" dirty="0">
+              <a:solidFill>
+                <a:schemeClr val="tx1"/>
+              </a:solidFill>
+              <a:latin typeface="Arial" panose="020B0604020202020204" pitchFamily="34" charset="0"/>
+              <a:cs typeface="Arial" panose="020B0604020202020204" pitchFamily="34" charset="0"/>
+            </a:endParaRPr>
+          </a:p>
+          <a:p>
+            <a:endParaRPr lang="en-US" sz="1000" b="1" dirty="0">
+              <a:solidFill>
+                <a:schemeClr val="tx1"/>
+              </a:solidFill>
+              <a:latin typeface="Arial" panose="020B0604020202020204" pitchFamily="34" charset="0"/>
+              <a:cs typeface="Arial" panose="020B0604020202020204" pitchFamily="34" charset="0"/>
+            </a:endParaRPr>
+          </a:p>
+        </p:txBody>
+      </p:sp>
+      <p:sp>
+        <p:nvSpPr>
+          <p:cNvPr id="5" name="Rechteck 4">
+            <a:extLst>
+              <a:ext uri="{FF2B5EF4-FFF2-40B4-BE49-F238E27FC236}">
+                <a16:creationId xmlns:a16="http://schemas.microsoft.com/office/drawing/2014/main" id="{538D4641-1529-4778-F19B-788A21D229DE}"/>
+              </a:ext>
+            </a:extLst>
+          </p:cNvPr>
+          <p:cNvSpPr/>
+          <p:nvPr/>
+        </p:nvSpPr>
+        <p:spPr>
+          <a:xfrm>
+            <a:off x="410405" y="2289117"/>
+            <a:ext cx="4302998" cy="811780"/>
+          </a:xfrm>
+          <a:prstGeom prst="rect">
+            <a:avLst/>
+          </a:prstGeom>
+          <a:noFill/>
+          <a:ln w="19050">
+            <a:solidFill>
+              <a:schemeClr val="tx1"/>
+            </a:solidFill>
+          </a:ln>
+        </p:spPr>
+        <p:style>
+          <a:lnRef idx="2">
+            <a:schemeClr val="accent1">
+              <a:shade val="50000"/>
+            </a:schemeClr>
+          </a:lnRef>
+          <a:fillRef idx="1">
+            <a:schemeClr val="accent1"/>
+          </a:fillRef>
+          <a:effectRef idx="0">
+            <a:schemeClr val="accent1"/>
+          </a:effectRef>
+          <a:fontRef idx="minor">
+            <a:schemeClr val="lt1"/>
+          </a:fontRef>
+        </p:style>
+        <p:txBody>
+          <a:bodyPr rtlCol="0" anchor="ctr"/>
+          <a:lstStyle/>
+          <a:p>
+            <a:r>
+              <a:rPr lang="en-US" sz="1200" b="1" dirty="0">
+                <a:solidFill>
+                  <a:schemeClr val="tx1"/>
+                </a:solidFill>
+                <a:latin typeface="Arial" panose="020B0604020202020204" pitchFamily="34" charset="0"/>
+                <a:cs typeface="Arial" panose="020B0604020202020204" pitchFamily="34" charset="0"/>
+              </a:rPr>
+              <a:t>&lt;header&gt;</a:t>
+            </a:r>
+          </a:p>
+          <a:p>
+            <a:r>
+              <a:rPr lang="en-US" sz="1200" b="1" dirty="0">
+                <a:solidFill>
+                  <a:schemeClr val="tx1"/>
+                </a:solidFill>
+                <a:latin typeface="Arial" panose="020B0604020202020204" pitchFamily="34" charset="0"/>
+                <a:cs typeface="Arial" panose="020B0604020202020204" pitchFamily="34" charset="0"/>
+              </a:rPr>
+              <a:t>Included external </a:t>
+            </a:r>
+            <a:r>
+              <a:rPr lang="en-US" sz="1200" b="1" dirty="0" err="1">
+                <a:solidFill>
+                  <a:schemeClr val="tx1"/>
+                </a:solidFill>
+                <a:latin typeface="Arial" panose="020B0604020202020204" pitchFamily="34" charset="0"/>
+                <a:cs typeface="Arial" panose="020B0604020202020204" pitchFamily="34" charset="0"/>
+              </a:rPr>
+              <a:t>Javascripts</a:t>
+            </a:r>
+            <a:r>
+              <a:rPr lang="en-US" sz="1200" b="1" dirty="0">
+                <a:solidFill>
+                  <a:schemeClr val="tx1"/>
+                </a:solidFill>
+                <a:latin typeface="Arial" panose="020B0604020202020204" pitchFamily="34" charset="0"/>
+                <a:cs typeface="Arial" panose="020B0604020202020204" pitchFamily="34" charset="0"/>
+              </a:rPr>
+              <a:t>:</a:t>
+            </a:r>
+          </a:p>
+          <a:p>
+            <a:r>
+              <a:rPr lang="en-US" sz="1200" b="1" i="1" dirty="0">
+                <a:solidFill>
+                  <a:schemeClr val="tx1"/>
+                </a:solidFill>
+                <a:latin typeface="Arial" panose="020B0604020202020204" pitchFamily="34" charset="0"/>
+                <a:cs typeface="Arial" panose="020B0604020202020204" pitchFamily="34" charset="0"/>
+              </a:rPr>
+              <a:t>Utils_20241111.js, TODO</a:t>
+            </a:r>
+          </a:p>
+        </p:txBody>
+      </p:sp>
+      <p:sp>
+        <p:nvSpPr>
+          <p:cNvPr id="6" name="Rechteck 5">
+            <a:extLst>
+              <a:ext uri="{FF2B5EF4-FFF2-40B4-BE49-F238E27FC236}">
+                <a16:creationId xmlns:a16="http://schemas.microsoft.com/office/drawing/2014/main" id="{485299A7-903D-691C-A721-D27847BFD0F4}"/>
+              </a:ext>
+            </a:extLst>
+          </p:cNvPr>
+          <p:cNvSpPr/>
+          <p:nvPr/>
+        </p:nvSpPr>
+        <p:spPr>
+          <a:xfrm>
+            <a:off x="410404" y="3170910"/>
+            <a:ext cx="4302998" cy="811780"/>
+          </a:xfrm>
+          <a:prstGeom prst="rect">
+            <a:avLst/>
+          </a:prstGeom>
+          <a:noFill/>
+          <a:ln w="19050">
+            <a:solidFill>
+              <a:schemeClr val="tx1"/>
+            </a:solidFill>
+          </a:ln>
+        </p:spPr>
+        <p:style>
+          <a:lnRef idx="2">
+            <a:schemeClr val="accent1">
+              <a:shade val="50000"/>
+            </a:schemeClr>
+          </a:lnRef>
+          <a:fillRef idx="1">
+            <a:schemeClr val="accent1"/>
+          </a:fillRef>
+          <a:effectRef idx="0">
+            <a:schemeClr val="accent1"/>
+          </a:effectRef>
+          <a:fontRef idx="minor">
+            <a:schemeClr val="lt1"/>
+          </a:fontRef>
+        </p:style>
+        <p:txBody>
+          <a:bodyPr rtlCol="0" anchor="ctr"/>
+          <a:lstStyle/>
+          <a:p>
+            <a:r>
+              <a:rPr lang="en-US" sz="1200" b="1" dirty="0">
+                <a:solidFill>
+                  <a:schemeClr val="tx1"/>
+                </a:solidFill>
+                <a:latin typeface="Arial" panose="020B0604020202020204" pitchFamily="34" charset="0"/>
+                <a:cs typeface="Arial" panose="020B0604020202020204" pitchFamily="34" charset="0"/>
+              </a:rPr>
+              <a:t>&lt;body&gt;</a:t>
+            </a:r>
+          </a:p>
+          <a:p>
+            <a:r>
+              <a:rPr lang="en-US" sz="1200" b="1" dirty="0">
+                <a:solidFill>
+                  <a:schemeClr val="tx1"/>
+                </a:solidFill>
+                <a:latin typeface="Arial" panose="020B0604020202020204" pitchFamily="34" charset="0"/>
+                <a:cs typeface="Arial" panose="020B0604020202020204" pitchFamily="34" charset="0"/>
+              </a:rPr>
+              <a:t>Onload function: </a:t>
+            </a:r>
+            <a:r>
+              <a:rPr lang="en-US" sz="1200" b="1" dirty="0" err="1">
+                <a:solidFill>
+                  <a:schemeClr val="tx1"/>
+                </a:solidFill>
+                <a:latin typeface="Arial" panose="020B0604020202020204" pitchFamily="34" charset="0"/>
+                <a:cs typeface="Arial" panose="020B0604020202020204" pitchFamily="34" charset="0"/>
+              </a:rPr>
+              <a:t>initReservationLayout</a:t>
+            </a:r>
+            <a:endParaRPr lang="en-US" sz="1200" b="1" dirty="0">
+              <a:solidFill>
+                <a:schemeClr val="tx1"/>
+              </a:solidFill>
+              <a:latin typeface="Arial" panose="020B0604020202020204" pitchFamily="34" charset="0"/>
+              <a:cs typeface="Arial" panose="020B0604020202020204" pitchFamily="34" charset="0"/>
+            </a:endParaRPr>
+          </a:p>
+          <a:p>
+            <a:r>
+              <a:rPr lang="en-US" sz="1200" b="1" dirty="0">
+                <a:solidFill>
+                  <a:schemeClr val="tx1"/>
+                </a:solidFill>
+                <a:latin typeface="Arial" panose="020B0604020202020204" pitchFamily="34" charset="0"/>
+                <a:cs typeface="Arial" panose="020B0604020202020204" pitchFamily="34" charset="0"/>
+              </a:rPr>
+              <a:t>The &lt;div&gt; elements as defined on another picture</a:t>
+            </a:r>
+          </a:p>
+          <a:p>
+            <a:r>
+              <a:rPr lang="en-US" sz="1200" b="1" dirty="0">
+                <a:solidFill>
+                  <a:schemeClr val="tx1"/>
+                </a:solidFill>
+                <a:latin typeface="Arial" panose="020B0604020202020204" pitchFamily="34" charset="0"/>
+                <a:cs typeface="Arial" panose="020B0604020202020204" pitchFamily="34" charset="0"/>
+              </a:rPr>
+              <a:t> </a:t>
+            </a:r>
+          </a:p>
+        </p:txBody>
+      </p:sp>
+    </p:spTree>
+    <p:extLst>
+      <p:ext uri="{BB962C8B-B14F-4D97-AF65-F5344CB8AC3E}">
+        <p14:creationId xmlns:p14="http://schemas.microsoft.com/office/powerpoint/2010/main" val="3297217409"/>
+      </p:ext>
+    </p:extLst>
+  </p:cSld>
+  <p:clrMapOvr>
+    <a:masterClrMapping/>
+  </p:clrMapOvr>
+</p:sld>
+</file>
+
+<file path=ppt/slides/slide11.xml><?xml version="1.0" encoding="utf-8"?>
+<p:sld xmlns:a="http://schemas.openxmlformats.org/drawingml/2006/main" xmlns:r="http://schemas.openxmlformats.org/officeDocument/2006/relationships" xmlns:p="http://schemas.openxmlformats.org/presentationml/2006/main">
+  <p:cSld>
+    <p:spTree>
+      <p:nvGrpSpPr>
+        <p:cNvPr id="1" name=""/>
+        <p:cNvGrpSpPr/>
+        <p:nvPr/>
+      </p:nvGrpSpPr>
+      <p:grpSpPr>
+        <a:xfrm>
+          <a:off x="0" y="0"/>
+          <a:ext cx="0" cy="0"/>
+          <a:chOff x="0" y="0"/>
+          <a:chExt cx="0" cy="0"/>
+        </a:xfrm>
+      </p:grpSpPr>
+    </p:spTree>
+    <p:extLst>
+      <p:ext uri="{BB962C8B-B14F-4D97-AF65-F5344CB8AC3E}">
+        <p14:creationId xmlns:p14="http://schemas.microsoft.com/office/powerpoint/2010/main" val="833590008"/>
+      </p:ext>
+    </p:extLst>
+  </p:cSld>
+  <p:clrMapOvr>
+    <a:masterClrMapping/>
+  </p:clrMapOvr>
+</p:sld>
+</file>
+
+<file path=ppt/slides/slide12.xml><?xml version="1.0" encoding="utf-8"?>
+<p:sld xmlns:a="http://schemas.openxmlformats.org/drawingml/2006/main" xmlns:r="http://schemas.openxmlformats.org/officeDocument/2006/relationships" xmlns:p="http://schemas.openxmlformats.org/presentationml/2006/main">
+  <p:cSld>
+    <p:spTree>
+      <p:nvGrpSpPr>
+        <p:cNvPr id="1" name=""/>
+        <p:cNvGrpSpPr/>
+        <p:nvPr/>
+      </p:nvGrpSpPr>
+      <p:grpSpPr>
+        <a:xfrm>
+          <a:off x="0" y="0"/>
+          <a:ext cx="0" cy="0"/>
+          <a:chOff x="0" y="0"/>
+          <a:chExt cx="0" cy="0"/>
+        </a:xfrm>
+      </p:grpSpPr>
+      <p:sp>
+        <p:nvSpPr>
+          <p:cNvPr id="2" name="Rechteck 1">
+            <a:extLst>
+              <a:ext uri="{FF2B5EF4-FFF2-40B4-BE49-F238E27FC236}">
+                <a16:creationId xmlns:a16="http://schemas.microsoft.com/office/drawing/2014/main" id="{52595105-FEFA-4CD5-B185-8A4714FF18D1}"/>
+              </a:ext>
+            </a:extLst>
+          </p:cNvPr>
+          <p:cNvSpPr/>
+          <p:nvPr/>
+        </p:nvSpPr>
+        <p:spPr>
+          <a:xfrm>
+            <a:off x="9863400" y="2269796"/>
+            <a:ext cx="860597" cy="202374"/>
+          </a:xfrm>
+          <a:prstGeom prst="rect">
+            <a:avLst/>
+          </a:prstGeom>
+          <a:noFill/>
+          <a:ln>
+            <a:solidFill>
+              <a:schemeClr val="tx1"/>
+            </a:solidFill>
+          </a:ln>
+        </p:spPr>
+        <p:style>
+          <a:lnRef idx="2">
+            <a:schemeClr val="accent1">
+              <a:shade val="50000"/>
+            </a:schemeClr>
+          </a:lnRef>
+          <a:fillRef idx="1">
+            <a:schemeClr val="accent1"/>
+          </a:fillRef>
+          <a:effectRef idx="0">
+            <a:schemeClr val="accent1"/>
+          </a:effectRef>
+          <a:fontRef idx="minor">
+            <a:schemeClr val="lt1"/>
+          </a:fontRef>
+        </p:style>
+        <p:txBody>
+          <a:bodyPr rtlCol="0" anchor="ctr"/>
+          <a:lstStyle/>
+          <a:p>
+            <a:pPr algn="ctr"/>
+            <a:r>
+              <a:rPr lang="de-CH" sz="1200" dirty="0">
+                <a:solidFill>
+                  <a:schemeClr val="tx1"/>
+                </a:solidFill>
+                <a:latin typeface="Arial" panose="020B0604020202020204" pitchFamily="34" charset="0"/>
+                <a:cs typeface="Arial" panose="020B0604020202020204" pitchFamily="34" charset="0"/>
+              </a:rPr>
+              <a:t>Upload</a:t>
+            </a:r>
+          </a:p>
+        </p:txBody>
+      </p:sp>
+      <p:sp>
+        <p:nvSpPr>
+          <p:cNvPr id="3" name="Rechteck 2">
+            <a:extLst>
+              <a:ext uri="{FF2B5EF4-FFF2-40B4-BE49-F238E27FC236}">
+                <a16:creationId xmlns:a16="http://schemas.microsoft.com/office/drawing/2014/main" id="{DF884E46-6D7C-E024-E50C-4BA43D097645}"/>
+              </a:ext>
+            </a:extLst>
+          </p:cNvPr>
+          <p:cNvSpPr/>
+          <p:nvPr/>
+        </p:nvSpPr>
+        <p:spPr>
+          <a:xfrm>
+            <a:off x="10875886" y="2264999"/>
+            <a:ext cx="860597" cy="202375"/>
+          </a:xfrm>
+          <a:prstGeom prst="rect">
+            <a:avLst/>
+          </a:prstGeom>
+          <a:noFill/>
+          <a:ln>
+            <a:solidFill>
+              <a:schemeClr val="tx1"/>
+            </a:solidFill>
+          </a:ln>
+        </p:spPr>
+        <p:style>
+          <a:lnRef idx="2">
+            <a:schemeClr val="accent1">
+              <a:shade val="50000"/>
+            </a:schemeClr>
+          </a:lnRef>
+          <a:fillRef idx="1">
+            <a:schemeClr val="accent1"/>
+          </a:fillRef>
+          <a:effectRef idx="0">
+            <a:schemeClr val="accent1"/>
+          </a:effectRef>
+          <a:fontRef idx="minor">
+            <a:schemeClr val="lt1"/>
+          </a:fontRef>
+        </p:style>
+        <p:txBody>
+          <a:bodyPr rtlCol="0" anchor="ctr"/>
+          <a:lstStyle/>
+          <a:p>
+            <a:pPr algn="ctr"/>
+            <a:r>
+              <a:rPr lang="de-CH" sz="1200" dirty="0">
+                <a:solidFill>
+                  <a:schemeClr val="tx1"/>
+                </a:solidFill>
+                <a:latin typeface="Arial" panose="020B0604020202020204" pitchFamily="34" charset="0"/>
+                <a:cs typeface="Arial" panose="020B0604020202020204" pitchFamily="34" charset="0"/>
+              </a:rPr>
+              <a:t>Download</a:t>
+            </a:r>
+          </a:p>
+        </p:txBody>
+      </p:sp>
+      <p:sp>
+        <p:nvSpPr>
+          <p:cNvPr id="37" name="Textfeld 36">
+            <a:extLst>
+              <a:ext uri="{FF2B5EF4-FFF2-40B4-BE49-F238E27FC236}">
+                <a16:creationId xmlns:a16="http://schemas.microsoft.com/office/drawing/2014/main" id="{2ED15C12-AFDD-8F28-0B61-4636D8A38D8B}"/>
+              </a:ext>
+            </a:extLst>
+          </p:cNvPr>
+          <p:cNvSpPr txBox="1"/>
+          <p:nvPr/>
+        </p:nvSpPr>
+        <p:spPr>
+          <a:xfrm>
+            <a:off x="4482334" y="1174367"/>
+            <a:ext cx="1362165" cy="430887"/>
+          </a:xfrm>
+          <a:prstGeom prst="rect">
+            <a:avLst/>
+          </a:prstGeom>
+          <a:noFill/>
+        </p:spPr>
+        <p:txBody>
+          <a:bodyPr wrap="square" rtlCol="0">
+            <a:spAutoFit/>
+          </a:bodyPr>
+          <a:lstStyle/>
+          <a:p>
+            <a:r>
+              <a:rPr lang="de-CH" sz="1200" dirty="0">
+                <a:latin typeface="Arial" panose="020B0604020202020204" pitchFamily="34" charset="0"/>
+                <a:cs typeface="Arial" panose="020B0604020202020204" pitchFamily="34" charset="0"/>
+              </a:rPr>
+              <a:t>Nummer</a:t>
+            </a:r>
+          </a:p>
+          <a:p>
+            <a:endParaRPr lang="de-CH" sz="200" dirty="0">
+              <a:latin typeface="Arial" panose="020B0604020202020204" pitchFamily="34" charset="0"/>
+              <a:cs typeface="Arial" panose="020B0604020202020204" pitchFamily="34" charset="0"/>
+            </a:endParaRPr>
+          </a:p>
+          <a:p>
+            <a:r>
+              <a:rPr lang="de-CH" sz="800" dirty="0">
+                <a:latin typeface="Arial" panose="020B0604020202020204" pitchFamily="34" charset="0"/>
+                <a:cs typeface="Arial" panose="020B0604020202020204" pitchFamily="34" charset="0"/>
+              </a:rPr>
+              <a:t>&lt;</a:t>
+            </a:r>
+            <a:r>
+              <a:rPr lang="de-CH" sz="800" dirty="0" err="1">
+                <a:latin typeface="Arial" panose="020B0604020202020204" pitchFamily="34" charset="0"/>
+                <a:cs typeface="Arial" panose="020B0604020202020204" pitchFamily="34" charset="0"/>
+              </a:rPr>
+              <a:t>JazzGuestRegNumber</a:t>
+            </a:r>
+            <a:r>
+              <a:rPr lang="de-CH" sz="800" dirty="0">
+                <a:latin typeface="Arial" panose="020B0604020202020204" pitchFamily="34" charset="0"/>
+                <a:cs typeface="Arial" panose="020B0604020202020204" pitchFamily="34" charset="0"/>
+              </a:rPr>
+              <a:t>&gt;</a:t>
+            </a:r>
+          </a:p>
+        </p:txBody>
+      </p:sp>
+      <p:pic>
+        <p:nvPicPr>
+          <p:cNvPr id="57" name="Grafik 56">
+            <a:extLst>
+              <a:ext uri="{FF2B5EF4-FFF2-40B4-BE49-F238E27FC236}">
+                <a16:creationId xmlns:a16="http://schemas.microsoft.com/office/drawing/2014/main" id="{DD4C6D50-48D3-1ABC-0597-4B799DEFC3DA}"/>
+              </a:ext>
+            </a:extLst>
+          </p:cNvPr>
+          <p:cNvPicPr>
+            <a:picLocks noChangeAspect="1"/>
+          </p:cNvPicPr>
+          <p:nvPr/>
+        </p:nvPicPr>
+        <p:blipFill>
+          <a:blip r:embed="rId2"/>
+          <a:stretch>
+            <a:fillRect/>
+          </a:stretch>
+        </p:blipFill>
+        <p:spPr>
+          <a:xfrm>
+            <a:off x="2242388" y="713056"/>
+            <a:ext cx="4733333" cy="247619"/>
+          </a:xfrm>
+          <a:prstGeom prst="rect">
+            <a:avLst/>
+          </a:prstGeom>
+        </p:spPr>
+      </p:pic>
+    </p:spTree>
+    <p:extLst>
+      <p:ext uri="{BB962C8B-B14F-4D97-AF65-F5344CB8AC3E}">
+        <p14:creationId xmlns:p14="http://schemas.microsoft.com/office/powerpoint/2010/main" val="2402299156"/>
+      </p:ext>
+    </p:extLst>
+  </p:cSld>
+  <p:clrMapOvr>
+    <a:masterClrMapping/>
+  </p:clrMapOvr>
+</p:sld>
+</file>
+
+<file path=ppt/slides/slide13.xml><?xml version="1.0" encoding="utf-8"?>
+<p:sld xmlns:a="http://schemas.openxmlformats.org/drawingml/2006/main" xmlns:r="http://schemas.openxmlformats.org/officeDocument/2006/relationships" xmlns:p="http://schemas.openxmlformats.org/presentationml/2006/main">
+  <p:cSld>
+    <p:spTree>
+      <p:nvGrpSpPr>
+        <p:cNvPr id="1" name=""/>
+        <p:cNvGrpSpPr/>
+        <p:nvPr/>
+      </p:nvGrpSpPr>
+      <p:grpSpPr>
+        <a:xfrm>
+          <a:off x="0" y="0"/>
+          <a:ext cx="0" cy="0"/>
+          <a:chOff x="0" y="0"/>
+          <a:chExt cx="0" cy="0"/>
+        </a:xfrm>
+      </p:grpSpPr>
       <p:pic>
         <p:nvPicPr>
           <p:cNvPr id="3" name="Grafik 2">
@@ -4162,7 +5076,7 @@
 </p:sld>
 </file>
 
-<file path=ppt/slides/slide11.xml><?xml version="1.0" encoding="utf-8"?>
+<file path=ppt/slides/slide14.xml><?xml version="1.0" encoding="utf-8"?>
 <p:sld xmlns:a="http://schemas.openxmlformats.org/drawingml/2006/main" xmlns:r="http://schemas.openxmlformats.org/officeDocument/2006/relationships" xmlns:p="http://schemas.openxmlformats.org/presentationml/2006/main">
   <p:cSld>
     <p:spTree>
@@ -18690,7 +19604,7 @@
           <p:cNvPr id="2" name="Rechteck 1">
             <a:extLst>
               <a:ext uri="{FF2B5EF4-FFF2-40B4-BE49-F238E27FC236}">
-                <a16:creationId xmlns:a16="http://schemas.microsoft.com/office/drawing/2014/main" id="{52595105-FEFA-4CD5-B185-8A4714FF18D1}"/>
+                <a16:creationId xmlns:a16="http://schemas.microsoft.com/office/drawing/2014/main" id="{B858DDCA-486F-DFCB-C4F4-02C8B9509B97}"/>
               </a:ext>
             </a:extLst>
           </p:cNvPr>
@@ -18699,14 +19613,14 @@
         </p:nvSpPr>
         <p:spPr>
           <a:xfrm>
-            <a:off x="9863400" y="2269796"/>
-            <a:ext cx="860597" cy="202374"/>
+            <a:off x="412314" y="317792"/>
+            <a:ext cx="3245285" cy="1379031"/>
           </a:xfrm>
           <a:prstGeom prst="rect">
             <a:avLst/>
           </a:prstGeom>
           <a:noFill/>
-          <a:ln>
+          <a:ln w="19050">
             <a:solidFill>
               <a:schemeClr val="tx1"/>
             </a:solidFill>
@@ -18734,6 +19648,46 @@
           <a:p>
             <a:pPr algn="ctr"/>
             <a:r>
+              <a:rPr lang="de-CH" dirty="0" err="1">
+                <a:solidFill>
+                  <a:schemeClr val="tx1"/>
+                </a:solidFill>
+                <a:latin typeface="Arial" panose="020B0604020202020204" pitchFamily="34" charset="0"/>
+                <a:cs typeface="Arial" panose="020B0604020202020204" pitchFamily="34" charset="0"/>
+              </a:rPr>
+              <a:t>ReservationLayoutHtml</a:t>
+            </a:r>
+            <a:endParaRPr lang="de-CH" dirty="0">
+              <a:solidFill>
+                <a:schemeClr val="tx1"/>
+              </a:solidFill>
+              <a:latin typeface="Arial" panose="020B0604020202020204" pitchFamily="34" charset="0"/>
+              <a:cs typeface="Arial" panose="020B0604020202020204" pitchFamily="34" charset="0"/>
+            </a:endParaRPr>
+          </a:p>
+          <a:p>
+            <a:pPr algn="ctr"/>
+            <a:endParaRPr lang="de-CH" sz="800" dirty="0">
+              <a:solidFill>
+                <a:schemeClr val="tx1"/>
+              </a:solidFill>
+              <a:latin typeface="Arial" panose="020B0604020202020204" pitchFamily="34" charset="0"/>
+              <a:cs typeface="Arial" panose="020B0604020202020204" pitchFamily="34" charset="0"/>
+            </a:endParaRPr>
+          </a:p>
+          <a:p>
+            <a:pPr algn="ctr"/>
+            <a:r>
+              <a:rPr lang="de-CH" sz="1200" dirty="0" err="1">
+                <a:solidFill>
+                  <a:schemeClr val="tx1"/>
+                </a:solidFill>
+                <a:latin typeface="Arial" panose="020B0604020202020204" pitchFamily="34" charset="0"/>
+                <a:cs typeface="Arial" panose="020B0604020202020204" pitchFamily="34" charset="0"/>
+              </a:rPr>
+              <a:t>Creates</a:t>
+            </a:r>
+            <a:r>
               <a:rPr lang="de-CH" sz="1200" dirty="0">
                 <a:solidFill>
                   <a:schemeClr val="tx1"/>
@@ -18741,7 +19695,90 @@
                 <a:latin typeface="Arial" panose="020B0604020202020204" pitchFamily="34" charset="0"/>
                 <a:cs typeface="Arial" panose="020B0604020202020204" pitchFamily="34" charset="0"/>
               </a:rPr>
-              <a:t>Upload</a:t>
+              <a:t> code </a:t>
+            </a:r>
+            <a:r>
+              <a:rPr lang="de-CH" sz="1200" dirty="0" err="1">
+                <a:solidFill>
+                  <a:schemeClr val="tx1"/>
+                </a:solidFill>
+                <a:latin typeface="Arial" panose="020B0604020202020204" pitchFamily="34" charset="0"/>
+                <a:cs typeface="Arial" panose="020B0604020202020204" pitchFamily="34" charset="0"/>
+              </a:rPr>
+              <a:t>for</a:t>
+            </a:r>
+            <a:r>
+              <a:rPr lang="de-CH" sz="1200" dirty="0">
+                <a:solidFill>
+                  <a:schemeClr val="tx1"/>
+                </a:solidFill>
+                <a:latin typeface="Arial" panose="020B0604020202020204" pitchFamily="34" charset="0"/>
+                <a:cs typeface="Arial" panose="020B0604020202020204" pitchFamily="34" charset="0"/>
+              </a:rPr>
+              <a:t> </a:t>
+            </a:r>
+            <a:r>
+              <a:rPr lang="de-CH" sz="1200" dirty="0" err="1">
+                <a:solidFill>
+                  <a:schemeClr val="tx1"/>
+                </a:solidFill>
+                <a:latin typeface="Arial" panose="020B0604020202020204" pitchFamily="34" charset="0"/>
+                <a:cs typeface="Arial" panose="020B0604020202020204" pitchFamily="34" charset="0"/>
+              </a:rPr>
+              <a:t>the</a:t>
+            </a:r>
+            <a:r>
+              <a:rPr lang="de-CH" sz="1200" dirty="0">
+                <a:solidFill>
+                  <a:schemeClr val="tx1"/>
+                </a:solidFill>
+                <a:latin typeface="Arial" panose="020B0604020202020204" pitchFamily="34" charset="0"/>
+                <a:cs typeface="Arial" panose="020B0604020202020204" pitchFamily="34" charset="0"/>
+              </a:rPr>
+              <a:t> HTML </a:t>
+            </a:r>
+            <a:r>
+              <a:rPr lang="de-CH" sz="1200" dirty="0" err="1">
+                <a:solidFill>
+                  <a:schemeClr val="tx1"/>
+                </a:solidFill>
+                <a:latin typeface="Arial" panose="020B0604020202020204" pitchFamily="34" charset="0"/>
+                <a:cs typeface="Arial" panose="020B0604020202020204" pitchFamily="34" charset="0"/>
+              </a:rPr>
+              <a:t>files</a:t>
+            </a:r>
+            <a:r>
+              <a:rPr lang="de-CH" sz="1200" dirty="0">
+                <a:solidFill>
+                  <a:schemeClr val="tx1"/>
+                </a:solidFill>
+                <a:latin typeface="Arial" panose="020B0604020202020204" pitchFamily="34" charset="0"/>
+                <a:cs typeface="Arial" panose="020B0604020202020204" pitchFamily="34" charset="0"/>
+              </a:rPr>
+              <a:t>:</a:t>
+            </a:r>
+          </a:p>
+          <a:p>
+            <a:pPr algn="ctr"/>
+            <a:endParaRPr lang="de-CH" sz="800" dirty="0">
+              <a:solidFill>
+                <a:schemeClr val="tx1"/>
+              </a:solidFill>
+              <a:latin typeface="Arial" panose="020B0604020202020204" pitchFamily="34" charset="0"/>
+              <a:cs typeface="Arial" panose="020B0604020202020204" pitchFamily="34" charset="0"/>
+            </a:endParaRPr>
+          </a:p>
+          <a:p>
+            <a:pPr algn="ctr"/>
+            <a:r>
+              <a:rPr lang="de-CH" sz="800" b="1" i="1" dirty="0">
+                <a:solidFill>
+                  <a:schemeClr val="tx1"/>
+                </a:solidFill>
+                <a:latin typeface="Arial" panose="020B0604020202020204" pitchFamily="34" charset="0"/>
+                <a:cs typeface="Arial" panose="020B0604020202020204" pitchFamily="34" charset="0"/>
+              </a:rPr>
+              <a:t>AddReservation.htm, MakeReservation.htm, SearchReservation.htm, ShowLayout.htm, EventReservation.htm, ReservationList.htm, ReservationPrint.htm</a:t>
             </a:r>
           </a:p>
         </p:txBody>
@@ -18751,7 +19788,7 @@
           <p:cNvPr id="3" name="Rechteck 2">
             <a:extLst>
               <a:ext uri="{FF2B5EF4-FFF2-40B4-BE49-F238E27FC236}">
-                <a16:creationId xmlns:a16="http://schemas.microsoft.com/office/drawing/2014/main" id="{DF884E46-6D7C-E024-E50C-4BA43D097645}"/>
+                <a16:creationId xmlns:a16="http://schemas.microsoft.com/office/drawing/2014/main" id="{FF5C768D-5460-3046-F1D8-B092BA2F0E0A}"/>
               </a:ext>
             </a:extLst>
           </p:cNvPr>
@@ -18760,14 +19797,14 @@
         </p:nvSpPr>
         <p:spPr>
           <a:xfrm>
-            <a:off x="10875886" y="2264999"/>
-            <a:ext cx="860597" cy="202375"/>
+            <a:off x="412313" y="1696823"/>
+            <a:ext cx="3245286" cy="2045616"/>
           </a:xfrm>
           <a:prstGeom prst="rect">
             <a:avLst/>
           </a:prstGeom>
           <a:noFill/>
-          <a:ln>
+          <a:ln w="19050">
             <a:solidFill>
               <a:schemeClr val="tx1"/>
             </a:solidFill>
@@ -18793,26 +19830,324 @@
           <a:bodyPr rtlCol="0" anchor="ctr"/>
           <a:lstStyle/>
           <a:p>
-            <a:pPr algn="ctr"/>
-            <a:r>
-              <a:rPr lang="de-CH" sz="1200" dirty="0">
-                <a:solidFill>
-                  <a:schemeClr val="tx1"/>
-                </a:solidFill>
-                <a:latin typeface="Arial" panose="020B0604020202020204" pitchFamily="34" charset="0"/>
-                <a:cs typeface="Arial" panose="020B0604020202020204" pitchFamily="34" charset="0"/>
-              </a:rPr>
-              <a:t>Download</a:t>
+            <a:r>
+              <a:rPr lang="en-US" sz="1200" dirty="0">
+                <a:solidFill>
+                  <a:schemeClr val="tx1"/>
+                </a:solidFill>
+                <a:latin typeface="Arial" panose="020B0604020202020204" pitchFamily="34" charset="0"/>
+                <a:cs typeface="Arial" panose="020B0604020202020204" pitchFamily="34" charset="0"/>
+              </a:rPr>
+              <a:t>Member variables</a:t>
+            </a:r>
+          </a:p>
+          <a:p>
+            <a:r>
+              <a:rPr lang="en-US" sz="1000" b="1" dirty="0" err="1">
+                <a:solidFill>
+                  <a:schemeClr val="tx1"/>
+                </a:solidFill>
+                <a:latin typeface="Arial" panose="020B0604020202020204" pitchFamily="34" charset="0"/>
+                <a:cs typeface="Arial" panose="020B0604020202020204" pitchFamily="34" charset="0"/>
+              </a:rPr>
+              <a:t>m_layout_xml</a:t>
+            </a:r>
+            <a:endParaRPr lang="en-US" sz="1000" b="1" dirty="0">
+              <a:solidFill>
+                <a:schemeClr val="tx1"/>
+              </a:solidFill>
+              <a:latin typeface="Arial" panose="020B0604020202020204" pitchFamily="34" charset="0"/>
+              <a:cs typeface="Arial" panose="020B0604020202020204" pitchFamily="34" charset="0"/>
+            </a:endParaRPr>
+          </a:p>
+          <a:p>
+            <a:r>
+              <a:rPr lang="en-US" sz="1000" b="1" dirty="0" err="1">
+                <a:solidFill>
+                  <a:schemeClr val="tx1"/>
+                </a:solidFill>
+                <a:latin typeface="Arial" panose="020B0604020202020204" pitchFamily="34" charset="0"/>
+                <a:cs typeface="Arial" panose="020B0604020202020204" pitchFamily="34" charset="0"/>
+              </a:rPr>
+              <a:t>m_output_dir</a:t>
+            </a:r>
+            <a:endParaRPr lang="en-US" sz="1000" b="1" dirty="0">
+              <a:solidFill>
+                <a:schemeClr val="tx1"/>
+              </a:solidFill>
+              <a:latin typeface="Arial" panose="020B0604020202020204" pitchFamily="34" charset="0"/>
+              <a:cs typeface="Arial" panose="020B0604020202020204" pitchFamily="34" charset="0"/>
+            </a:endParaRPr>
+          </a:p>
+          <a:p>
+            <a:r>
+              <a:rPr lang="en-US" sz="1000" b="1" dirty="0" err="1">
+                <a:solidFill>
+                  <a:schemeClr val="tx1"/>
+                </a:solidFill>
+                <a:latin typeface="Arial" panose="020B0604020202020204" pitchFamily="34" charset="0"/>
+                <a:cs typeface="Arial" panose="020B0604020202020204" pitchFamily="34" charset="0"/>
+              </a:rPr>
+              <a:t>m_layout_file_case</a:t>
+            </a:r>
+            <a:endParaRPr lang="en-US" sz="1000" b="1" dirty="0">
+              <a:solidFill>
+                <a:schemeClr val="tx1"/>
+              </a:solidFill>
+              <a:latin typeface="Arial" panose="020B0604020202020204" pitchFamily="34" charset="0"/>
+              <a:cs typeface="Arial" panose="020B0604020202020204" pitchFamily="34" charset="0"/>
+            </a:endParaRPr>
+          </a:p>
+          <a:p>
+            <a:r>
+              <a:rPr lang="en-US" sz="1000" b="1" dirty="0" err="1">
+                <a:solidFill>
+                  <a:schemeClr val="tx1"/>
+                </a:solidFill>
+                <a:latin typeface="Arial" panose="020B0604020202020204" pitchFamily="34" charset="0"/>
+                <a:cs typeface="Arial" panose="020B0604020202020204" pitchFamily="34" charset="0"/>
+              </a:rPr>
+              <a:t>m_button_id_array</a:t>
+            </a:r>
+            <a:endParaRPr lang="en-US" sz="1000" b="1" dirty="0">
+              <a:solidFill>
+                <a:schemeClr val="tx1"/>
+              </a:solidFill>
+              <a:latin typeface="Arial" panose="020B0604020202020204" pitchFamily="34" charset="0"/>
+              <a:cs typeface="Arial" panose="020B0604020202020204" pitchFamily="34" charset="0"/>
+            </a:endParaRPr>
+          </a:p>
+          <a:p>
+            <a:r>
+              <a:rPr lang="en-US" sz="1000" b="1" dirty="0" err="1">
+                <a:solidFill>
+                  <a:schemeClr val="tx1"/>
+                </a:solidFill>
+                <a:latin typeface="Arial" panose="020B0604020202020204" pitchFamily="34" charset="0"/>
+                <a:cs typeface="Arial" panose="020B0604020202020204" pitchFamily="34" charset="0"/>
+              </a:rPr>
+              <a:t>m_layout_file_description</a:t>
+            </a:r>
+            <a:endParaRPr lang="en-US" sz="1000" b="1" dirty="0">
+              <a:solidFill>
+                <a:schemeClr val="tx1"/>
+              </a:solidFill>
+              <a:latin typeface="Arial" panose="020B0604020202020204" pitchFamily="34" charset="0"/>
+              <a:cs typeface="Arial" panose="020B0604020202020204" pitchFamily="34" charset="0"/>
+            </a:endParaRPr>
+          </a:p>
+          <a:p>
+            <a:r>
+              <a:rPr lang="en-US" sz="1000" b="1" dirty="0" err="1">
+                <a:solidFill>
+                  <a:schemeClr val="tx1"/>
+                </a:solidFill>
+                <a:latin typeface="Arial" panose="020B0604020202020204" pitchFamily="34" charset="0"/>
+                <a:cs typeface="Arial" panose="020B0604020202020204" pitchFamily="34" charset="0"/>
+              </a:rPr>
+              <a:t>m_html_code</a:t>
+            </a:r>
+            <a:endParaRPr lang="en-US" sz="1000" b="1" dirty="0">
+              <a:solidFill>
+                <a:schemeClr val="tx1"/>
+              </a:solidFill>
+              <a:latin typeface="Arial" panose="020B0604020202020204" pitchFamily="34" charset="0"/>
+              <a:cs typeface="Arial" panose="020B0604020202020204" pitchFamily="34" charset="0"/>
+            </a:endParaRPr>
+          </a:p>
+          <a:p>
+            <a:endParaRPr lang="en-US" sz="1000" b="1" dirty="0">
+              <a:solidFill>
+                <a:schemeClr val="tx1"/>
+              </a:solidFill>
+              <a:latin typeface="Arial" panose="020B0604020202020204" pitchFamily="34" charset="0"/>
+              <a:cs typeface="Arial" panose="020B0604020202020204" pitchFamily="34" charset="0"/>
+            </a:endParaRPr>
+          </a:p>
+          <a:p>
+            <a:r>
+              <a:rPr lang="en-US" sz="1200" dirty="0">
+                <a:solidFill>
+                  <a:schemeClr val="tx1"/>
+                </a:solidFill>
+                <a:latin typeface="Arial" panose="020B0604020202020204" pitchFamily="34" charset="0"/>
+                <a:cs typeface="Arial" panose="020B0604020202020204" pitchFamily="34" charset="0"/>
+              </a:rPr>
+              <a:t>Member functions</a:t>
+            </a:r>
+          </a:p>
+          <a:p>
+            <a:r>
+              <a:rPr lang="de-CH" sz="1000" b="1" dirty="0" err="1">
+                <a:solidFill>
+                  <a:schemeClr val="tx1"/>
+                </a:solidFill>
+                <a:latin typeface="Arial" panose="020B0604020202020204" pitchFamily="34" charset="0"/>
+                <a:cs typeface="Arial" panose="020B0604020202020204" pitchFamily="34" charset="0"/>
+              </a:rPr>
+              <a:t>execute</a:t>
+            </a:r>
+            <a:r>
+              <a:rPr lang="de-CH" sz="1000" b="1" dirty="0">
+                <a:solidFill>
+                  <a:schemeClr val="tx1"/>
+                </a:solidFill>
+                <a:latin typeface="Arial" panose="020B0604020202020204" pitchFamily="34" charset="0"/>
+                <a:cs typeface="Arial" panose="020B0604020202020204" pitchFamily="34" charset="0"/>
+              </a:rPr>
+              <a:t>: </a:t>
+            </a:r>
+            <a:r>
+              <a:rPr lang="de-CH" sz="1000" b="1" dirty="0" err="1">
+                <a:solidFill>
+                  <a:schemeClr val="tx1"/>
+                </a:solidFill>
+                <a:latin typeface="Arial" panose="020B0604020202020204" pitchFamily="34" charset="0"/>
+                <a:cs typeface="Arial" panose="020B0604020202020204" pitchFamily="34" charset="0"/>
+              </a:rPr>
+              <a:t>Creates</a:t>
+            </a:r>
+            <a:r>
+              <a:rPr lang="de-CH" sz="1000" b="1" dirty="0">
+                <a:solidFill>
+                  <a:schemeClr val="tx1"/>
+                </a:solidFill>
+                <a:latin typeface="Arial" panose="020B0604020202020204" pitchFamily="34" charset="0"/>
+                <a:cs typeface="Arial" panose="020B0604020202020204" pitchFamily="34" charset="0"/>
+              </a:rPr>
+              <a:t> </a:t>
+            </a:r>
+            <a:r>
+              <a:rPr lang="de-CH" sz="1000" b="1" dirty="0" err="1">
+                <a:solidFill>
+                  <a:schemeClr val="tx1"/>
+                </a:solidFill>
+                <a:latin typeface="Arial" panose="020B0604020202020204" pitchFamily="34" charset="0"/>
+                <a:cs typeface="Arial" panose="020B0604020202020204" pitchFamily="34" charset="0"/>
+              </a:rPr>
+              <a:t>the</a:t>
+            </a:r>
+            <a:r>
+              <a:rPr lang="de-CH" sz="1000" b="1" dirty="0">
+                <a:solidFill>
+                  <a:schemeClr val="tx1"/>
+                </a:solidFill>
+                <a:latin typeface="Arial" panose="020B0604020202020204" pitchFamily="34" charset="0"/>
+                <a:cs typeface="Arial" panose="020B0604020202020204" pitchFamily="34" charset="0"/>
+              </a:rPr>
+              <a:t> code </a:t>
+            </a:r>
+            <a:r>
+              <a:rPr lang="de-CH" sz="1000" b="1" dirty="0" err="1">
+                <a:solidFill>
+                  <a:schemeClr val="tx1"/>
+                </a:solidFill>
+                <a:latin typeface="Arial" panose="020B0604020202020204" pitchFamily="34" charset="0"/>
+                <a:cs typeface="Arial" panose="020B0604020202020204" pitchFamily="34" charset="0"/>
+              </a:rPr>
+              <a:t>for</a:t>
+            </a:r>
+            <a:r>
+              <a:rPr lang="de-CH" sz="1000" b="1" dirty="0">
+                <a:solidFill>
+                  <a:schemeClr val="tx1"/>
+                </a:solidFill>
+                <a:latin typeface="Arial" panose="020B0604020202020204" pitchFamily="34" charset="0"/>
+                <a:cs typeface="Arial" panose="020B0604020202020204" pitchFamily="34" charset="0"/>
+              </a:rPr>
+              <a:t> </a:t>
+            </a:r>
+            <a:r>
+              <a:rPr lang="de-CH" sz="1000" b="1" dirty="0" err="1">
+                <a:solidFill>
+                  <a:schemeClr val="tx1"/>
+                </a:solidFill>
+                <a:latin typeface="Arial" panose="020B0604020202020204" pitchFamily="34" charset="0"/>
+                <a:cs typeface="Arial" panose="020B0604020202020204" pitchFamily="34" charset="0"/>
+              </a:rPr>
+              <a:t>the</a:t>
+            </a:r>
+            <a:r>
+              <a:rPr lang="de-CH" sz="1000" b="1" dirty="0">
+                <a:solidFill>
+                  <a:schemeClr val="tx1"/>
+                </a:solidFill>
+                <a:latin typeface="Arial" panose="020B0604020202020204" pitchFamily="34" charset="0"/>
+                <a:cs typeface="Arial" panose="020B0604020202020204" pitchFamily="34" charset="0"/>
+              </a:rPr>
+              <a:t> HTML </a:t>
+            </a:r>
+            <a:r>
+              <a:rPr lang="de-CH" sz="1000" b="1" dirty="0" err="1">
+                <a:solidFill>
+                  <a:schemeClr val="tx1"/>
+                </a:solidFill>
+                <a:latin typeface="Arial" panose="020B0604020202020204" pitchFamily="34" charset="0"/>
+                <a:cs typeface="Arial" panose="020B0604020202020204" pitchFamily="34" charset="0"/>
+              </a:rPr>
+              <a:t>file</a:t>
+            </a:r>
+            <a:r>
+              <a:rPr lang="de-CH" sz="1000" b="1" dirty="0">
+                <a:solidFill>
+                  <a:schemeClr val="tx1"/>
+                </a:solidFill>
+                <a:latin typeface="Arial" panose="020B0604020202020204" pitchFamily="34" charset="0"/>
+                <a:cs typeface="Arial" panose="020B0604020202020204" pitchFamily="34" charset="0"/>
+              </a:rPr>
+              <a:t> </a:t>
+            </a:r>
+          </a:p>
+          <a:p>
+            <a:r>
+              <a:rPr lang="de-CH" sz="1000" b="1" dirty="0" err="1">
+                <a:solidFill>
+                  <a:schemeClr val="tx1"/>
+                </a:solidFill>
+                <a:latin typeface="Arial" panose="020B0604020202020204" pitchFamily="34" charset="0"/>
+                <a:cs typeface="Arial" panose="020B0604020202020204" pitchFamily="34" charset="0"/>
+              </a:rPr>
+              <a:t>get</a:t>
+            </a:r>
+            <a:r>
+              <a:rPr lang="de-CH" sz="1000" b="1" dirty="0">
+                <a:solidFill>
+                  <a:schemeClr val="tx1"/>
+                </a:solidFill>
+                <a:latin typeface="Arial" panose="020B0604020202020204" pitchFamily="34" charset="0"/>
+                <a:cs typeface="Arial" panose="020B0604020202020204" pitchFamily="34" charset="0"/>
+              </a:rPr>
+              <a:t>:         Returns </a:t>
+            </a:r>
+            <a:r>
+              <a:rPr lang="de-CH" sz="1000" b="1" dirty="0" err="1">
+                <a:solidFill>
+                  <a:schemeClr val="tx1"/>
+                </a:solidFill>
+                <a:latin typeface="Arial" panose="020B0604020202020204" pitchFamily="34" charset="0"/>
+                <a:cs typeface="Arial" panose="020B0604020202020204" pitchFamily="34" charset="0"/>
+              </a:rPr>
+              <a:t>the</a:t>
+            </a:r>
+            <a:r>
+              <a:rPr lang="de-CH" sz="1000" b="1" dirty="0">
+                <a:solidFill>
+                  <a:schemeClr val="tx1"/>
+                </a:solidFill>
+                <a:latin typeface="Arial" panose="020B0604020202020204" pitchFamily="34" charset="0"/>
+                <a:cs typeface="Arial" panose="020B0604020202020204" pitchFamily="34" charset="0"/>
+              </a:rPr>
+              <a:t> HTML code</a:t>
             </a:r>
           </a:p>
         </p:txBody>
       </p:sp>
       <p:sp>
         <p:nvSpPr>
-          <p:cNvPr id="37" name="Textfeld 36">
+          <p:cNvPr id="4" name="Textfeld 3">
             <a:extLst>
               <a:ext uri="{FF2B5EF4-FFF2-40B4-BE49-F238E27FC236}">
-                <a16:creationId xmlns:a16="http://schemas.microsoft.com/office/drawing/2014/main" id="{2ED15C12-AFDD-8F28-0B61-4636D8A38D8B}"/>
+                <a16:creationId xmlns:a16="http://schemas.microsoft.com/office/drawing/2014/main" id="{CB863C8A-449C-1A13-1CA0-46C134E3C471}"/>
               </a:ext>
             </a:extLst>
           </p:cNvPr>
@@ -18821,8 +20156,8 @@
         </p:nvSpPr>
         <p:spPr>
           <a:xfrm>
-            <a:off x="4482334" y="1174367"/>
-            <a:ext cx="1362165" cy="430887"/>
+            <a:off x="0" y="173506"/>
+            <a:ext cx="12192000" cy="369332"/>
           </a:xfrm>
           <a:prstGeom prst="rect">
             <a:avLst/>
@@ -18830,84 +20165,2537 @@
           <a:noFill/>
         </p:spPr>
         <p:txBody>
-          <a:bodyPr wrap="square" rtlCol="0">
+          <a:bodyPr wrap="square">
             <a:spAutoFit/>
           </a:bodyPr>
           <a:lstStyle/>
           <a:p>
-            <a:r>
-              <a:rPr lang="de-CH" sz="1200" dirty="0">
-                <a:latin typeface="Arial" panose="020B0604020202020204" pitchFamily="34" charset="0"/>
-                <a:cs typeface="Arial" panose="020B0604020202020204" pitchFamily="34" charset="0"/>
-              </a:rPr>
-              <a:t>Nummer</a:t>
-            </a:r>
-          </a:p>
-          <a:p>
-            <a:endParaRPr lang="de-CH" sz="200" dirty="0">
-              <a:latin typeface="Arial" panose="020B0604020202020204" pitchFamily="34" charset="0"/>
-              <a:cs typeface="Arial" panose="020B0604020202020204" pitchFamily="34" charset="0"/>
-            </a:endParaRPr>
-          </a:p>
-          <a:p>
-            <a:r>
-              <a:rPr lang="de-CH" sz="800" dirty="0">
-                <a:latin typeface="Arial" panose="020B0604020202020204" pitchFamily="34" charset="0"/>
-                <a:cs typeface="Arial" panose="020B0604020202020204" pitchFamily="34" charset="0"/>
-              </a:rPr>
-              <a:t>&lt;</a:t>
-            </a:r>
-            <a:r>
-              <a:rPr lang="de-CH" sz="800" dirty="0" err="1">
-                <a:latin typeface="Arial" panose="020B0604020202020204" pitchFamily="34" charset="0"/>
-                <a:cs typeface="Arial" panose="020B0604020202020204" pitchFamily="34" charset="0"/>
-              </a:rPr>
-              <a:t>JazzGuestRegNumber</a:t>
-            </a:r>
-            <a:r>
-              <a:rPr lang="de-CH" sz="800" dirty="0">
-                <a:latin typeface="Arial" panose="020B0604020202020204" pitchFamily="34" charset="0"/>
-                <a:cs typeface="Arial" panose="020B0604020202020204" pitchFamily="34" charset="0"/>
-              </a:rPr>
-              <a:t>&gt;</a:t>
+            <a:pPr algn="ctr"/>
+            <a:r>
+              <a:rPr lang="de-CH" b="1" dirty="0">
+                <a:latin typeface="Arial" panose="020B0604020202020204" pitchFamily="34" charset="0"/>
+                <a:cs typeface="Arial" panose="020B0604020202020204" pitchFamily="34" charset="0"/>
+              </a:rPr>
+              <a:t>ReservationLayoutHtml.js</a:t>
             </a:r>
           </a:p>
         </p:txBody>
       </p:sp>
-      <p:pic>
-        <p:nvPicPr>
-          <p:cNvPr id="57" name="Grafik 56">
+      <p:sp>
+        <p:nvSpPr>
+          <p:cNvPr id="9" name="Rechteck 8">
             <a:extLst>
               <a:ext uri="{FF2B5EF4-FFF2-40B4-BE49-F238E27FC236}">
-                <a16:creationId xmlns:a16="http://schemas.microsoft.com/office/drawing/2014/main" id="{DD4C6D50-48D3-1ABC-0597-4B799DEFC3DA}"/>
+                <a16:creationId xmlns:a16="http://schemas.microsoft.com/office/drawing/2014/main" id="{2617247C-D33A-45E3-0863-8591D391B66D}"/>
               </a:ext>
             </a:extLst>
           </p:cNvPr>
-          <p:cNvPicPr>
-            <a:picLocks noChangeAspect="1"/>
-          </p:cNvPicPr>
+          <p:cNvSpPr/>
           <p:nvPr/>
-        </p:nvPicPr>
-        <p:blipFill>
-          <a:blip r:embed="rId2"/>
-          <a:stretch>
-            <a:fillRect/>
-          </a:stretch>
-        </p:blipFill>
+        </p:nvSpPr>
         <p:spPr>
           <a:xfrm>
-            <a:off x="2242388" y="713056"/>
-            <a:ext cx="4733333" cy="247619"/>
+            <a:off x="412313" y="3711802"/>
+            <a:ext cx="3245285" cy="756861"/>
           </a:xfrm>
           <a:prstGeom prst="rect">
             <a:avLst/>
           </a:prstGeom>
-        </p:spPr>
-      </p:pic>
+          <a:noFill/>
+          <a:ln w="19050">
+            <a:solidFill>
+              <a:schemeClr val="tx1"/>
+            </a:solidFill>
+          </a:ln>
+        </p:spPr>
+        <p:style>
+          <a:lnRef idx="2">
+            <a:schemeClr val="accent1">
+              <a:shade val="50000"/>
+            </a:schemeClr>
+          </a:lnRef>
+          <a:fillRef idx="1">
+            <a:schemeClr val="accent1"/>
+          </a:fillRef>
+          <a:effectRef idx="0">
+            <a:schemeClr val="accent1"/>
+          </a:effectRef>
+          <a:fontRef idx="minor">
+            <a:schemeClr val="lt1"/>
+          </a:fontRef>
+        </p:style>
+        <p:txBody>
+          <a:bodyPr rtlCol="0" anchor="ctr"/>
+          <a:lstStyle/>
+          <a:p>
+            <a:pPr algn="ctr"/>
+            <a:r>
+              <a:rPr lang="de-CH" dirty="0" err="1">
+                <a:solidFill>
+                  <a:schemeClr val="tx1"/>
+                </a:solidFill>
+                <a:latin typeface="Arial" panose="020B0604020202020204" pitchFamily="34" charset="0"/>
+                <a:cs typeface="Arial" panose="020B0604020202020204" pitchFamily="34" charset="0"/>
+              </a:rPr>
+              <a:t>LayoutStyle</a:t>
+            </a:r>
+            <a:endParaRPr lang="de-CH" dirty="0">
+              <a:solidFill>
+                <a:schemeClr val="tx1"/>
+              </a:solidFill>
+              <a:latin typeface="Arial" panose="020B0604020202020204" pitchFamily="34" charset="0"/>
+              <a:cs typeface="Arial" panose="020B0604020202020204" pitchFamily="34" charset="0"/>
+            </a:endParaRPr>
+          </a:p>
+          <a:p>
+            <a:pPr algn="ctr"/>
+            <a:endParaRPr lang="de-CH" sz="800" dirty="0">
+              <a:solidFill>
+                <a:schemeClr val="tx1"/>
+              </a:solidFill>
+              <a:latin typeface="Arial" panose="020B0604020202020204" pitchFamily="34" charset="0"/>
+              <a:cs typeface="Arial" panose="020B0604020202020204" pitchFamily="34" charset="0"/>
+            </a:endParaRPr>
+          </a:p>
+          <a:p>
+            <a:pPr algn="ctr"/>
+            <a:r>
+              <a:rPr lang="de-CH" sz="1200" dirty="0" err="1">
+                <a:solidFill>
+                  <a:schemeClr val="tx1"/>
+                </a:solidFill>
+                <a:latin typeface="Arial" panose="020B0604020202020204" pitchFamily="34" charset="0"/>
+                <a:cs typeface="Arial" panose="020B0604020202020204" pitchFamily="34" charset="0"/>
+              </a:rPr>
+              <a:t>Creates</a:t>
+            </a:r>
+            <a:r>
+              <a:rPr lang="de-CH" sz="1200" dirty="0">
+                <a:solidFill>
+                  <a:schemeClr val="tx1"/>
+                </a:solidFill>
+                <a:latin typeface="Arial" panose="020B0604020202020204" pitchFamily="34" charset="0"/>
+                <a:cs typeface="Arial" panose="020B0604020202020204" pitchFamily="34" charset="0"/>
+              </a:rPr>
+              <a:t> </a:t>
+            </a:r>
+            <a:r>
+              <a:rPr lang="de-CH" sz="1200" dirty="0" err="1">
+                <a:solidFill>
+                  <a:schemeClr val="tx1"/>
+                </a:solidFill>
+                <a:latin typeface="Arial" panose="020B0604020202020204" pitchFamily="34" charset="0"/>
+                <a:cs typeface="Arial" panose="020B0604020202020204" pitchFamily="34" charset="0"/>
+              </a:rPr>
+              <a:t>the</a:t>
+            </a:r>
+            <a:r>
+              <a:rPr lang="de-CH" sz="1200" dirty="0">
+                <a:solidFill>
+                  <a:schemeClr val="tx1"/>
+                </a:solidFill>
+                <a:latin typeface="Arial" panose="020B0604020202020204" pitchFamily="34" charset="0"/>
+                <a:cs typeface="Arial" panose="020B0604020202020204" pitchFamily="34" charset="0"/>
+              </a:rPr>
+              <a:t> &lt;</a:t>
+            </a:r>
+            <a:r>
+              <a:rPr lang="de-CH" sz="1200" dirty="0" err="1">
+                <a:solidFill>
+                  <a:schemeClr val="tx1"/>
+                </a:solidFill>
+                <a:latin typeface="Arial" panose="020B0604020202020204" pitchFamily="34" charset="0"/>
+                <a:cs typeface="Arial" panose="020B0604020202020204" pitchFamily="34" charset="0"/>
+              </a:rPr>
+              <a:t>header</a:t>
+            </a:r>
+            <a:r>
+              <a:rPr lang="de-CH" sz="1200" dirty="0">
+                <a:solidFill>
+                  <a:schemeClr val="tx1"/>
+                </a:solidFill>
+                <a:latin typeface="Arial" panose="020B0604020202020204" pitchFamily="34" charset="0"/>
+                <a:cs typeface="Arial" panose="020B0604020202020204" pitchFamily="34" charset="0"/>
+              </a:rPr>
+              <a:t>&gt; &lt;style&gt;  code</a:t>
+            </a:r>
+          </a:p>
+        </p:txBody>
+      </p:sp>
+      <p:sp>
+        <p:nvSpPr>
+          <p:cNvPr id="10" name="Rechteck 9">
+            <a:extLst>
+              <a:ext uri="{FF2B5EF4-FFF2-40B4-BE49-F238E27FC236}">
+                <a16:creationId xmlns:a16="http://schemas.microsoft.com/office/drawing/2014/main" id="{22025F71-46C4-EFEC-DE3F-A5637F4ABD54}"/>
+              </a:ext>
+            </a:extLst>
+          </p:cNvPr>
+          <p:cNvSpPr/>
+          <p:nvPr/>
+        </p:nvSpPr>
+        <p:spPr>
+          <a:xfrm>
+            <a:off x="412312" y="4468663"/>
+            <a:ext cx="3245286" cy="1939565"/>
+          </a:xfrm>
+          <a:prstGeom prst="rect">
+            <a:avLst/>
+          </a:prstGeom>
+          <a:noFill/>
+          <a:ln w="19050">
+            <a:solidFill>
+              <a:schemeClr val="tx1"/>
+            </a:solidFill>
+          </a:ln>
+        </p:spPr>
+        <p:style>
+          <a:lnRef idx="2">
+            <a:schemeClr val="accent1">
+              <a:shade val="50000"/>
+            </a:schemeClr>
+          </a:lnRef>
+          <a:fillRef idx="1">
+            <a:schemeClr val="accent1"/>
+          </a:fillRef>
+          <a:effectRef idx="0">
+            <a:schemeClr val="accent1"/>
+          </a:effectRef>
+          <a:fontRef idx="minor">
+            <a:schemeClr val="lt1"/>
+          </a:fontRef>
+        </p:style>
+        <p:txBody>
+          <a:bodyPr rtlCol="0" anchor="ctr"/>
+          <a:lstStyle/>
+          <a:p>
+            <a:r>
+              <a:rPr lang="en-US" sz="1200" dirty="0">
+                <a:solidFill>
+                  <a:schemeClr val="tx1"/>
+                </a:solidFill>
+                <a:latin typeface="Arial" panose="020B0604020202020204" pitchFamily="34" charset="0"/>
+                <a:cs typeface="Arial" panose="020B0604020202020204" pitchFamily="34" charset="0"/>
+              </a:rPr>
+              <a:t>Member variables</a:t>
+            </a:r>
+          </a:p>
+          <a:p>
+            <a:r>
+              <a:rPr lang="en-US" sz="1000" b="1" dirty="0" err="1">
+                <a:solidFill>
+                  <a:schemeClr val="tx1"/>
+                </a:solidFill>
+                <a:latin typeface="Arial" panose="020B0604020202020204" pitchFamily="34" charset="0"/>
+                <a:cs typeface="Arial" panose="020B0604020202020204" pitchFamily="34" charset="0"/>
+              </a:rPr>
+              <a:t>m_layout_xml</a:t>
+            </a:r>
+            <a:endParaRPr lang="en-US" sz="1000" b="1" dirty="0">
+              <a:solidFill>
+                <a:schemeClr val="tx1"/>
+              </a:solidFill>
+              <a:latin typeface="Arial" panose="020B0604020202020204" pitchFamily="34" charset="0"/>
+              <a:cs typeface="Arial" panose="020B0604020202020204" pitchFamily="34" charset="0"/>
+            </a:endParaRPr>
+          </a:p>
+          <a:p>
+            <a:r>
+              <a:rPr lang="en-US" sz="1000" b="1" dirty="0" err="1">
+                <a:solidFill>
+                  <a:schemeClr val="tx1"/>
+                </a:solidFill>
+                <a:latin typeface="Arial" panose="020B0604020202020204" pitchFamily="34" charset="0"/>
+                <a:cs typeface="Arial" panose="020B0604020202020204" pitchFamily="34" charset="0"/>
+              </a:rPr>
+              <a:t>m_output_dir</a:t>
+            </a:r>
+            <a:endParaRPr lang="en-US" sz="1000" b="1" dirty="0">
+              <a:solidFill>
+                <a:schemeClr val="tx1"/>
+              </a:solidFill>
+              <a:latin typeface="Arial" panose="020B0604020202020204" pitchFamily="34" charset="0"/>
+              <a:cs typeface="Arial" panose="020B0604020202020204" pitchFamily="34" charset="0"/>
+            </a:endParaRPr>
+          </a:p>
+          <a:p>
+            <a:r>
+              <a:rPr lang="en-US" sz="1000" b="1" dirty="0" err="1">
+                <a:solidFill>
+                  <a:schemeClr val="tx1"/>
+                </a:solidFill>
+                <a:latin typeface="Arial" panose="020B0604020202020204" pitchFamily="34" charset="0"/>
+                <a:cs typeface="Arial" panose="020B0604020202020204" pitchFamily="34" charset="0"/>
+              </a:rPr>
+              <a:t>m_layout_file_case</a:t>
+            </a:r>
+            <a:endParaRPr lang="en-US" sz="1000" b="1" dirty="0">
+              <a:solidFill>
+                <a:schemeClr val="tx1"/>
+              </a:solidFill>
+              <a:latin typeface="Arial" panose="020B0604020202020204" pitchFamily="34" charset="0"/>
+              <a:cs typeface="Arial" panose="020B0604020202020204" pitchFamily="34" charset="0"/>
+            </a:endParaRPr>
+          </a:p>
+          <a:p>
+            <a:r>
+              <a:rPr lang="en-US" sz="1000" b="1" dirty="0" err="1">
+                <a:solidFill>
+                  <a:schemeClr val="tx1"/>
+                </a:solidFill>
+                <a:latin typeface="Arial" panose="020B0604020202020204" pitchFamily="34" charset="0"/>
+                <a:cs typeface="Arial" panose="020B0604020202020204" pitchFamily="34" charset="0"/>
+              </a:rPr>
+              <a:t>m_html_style_code</a:t>
+            </a:r>
+            <a:endParaRPr lang="en-US" sz="1000" b="1" dirty="0">
+              <a:solidFill>
+                <a:schemeClr val="tx1"/>
+              </a:solidFill>
+              <a:latin typeface="Arial" panose="020B0604020202020204" pitchFamily="34" charset="0"/>
+              <a:cs typeface="Arial" panose="020B0604020202020204" pitchFamily="34" charset="0"/>
+            </a:endParaRPr>
+          </a:p>
+          <a:p>
+            <a:endParaRPr lang="en-US" sz="1000" b="1" dirty="0">
+              <a:solidFill>
+                <a:schemeClr val="tx1"/>
+              </a:solidFill>
+              <a:latin typeface="Arial" panose="020B0604020202020204" pitchFamily="34" charset="0"/>
+              <a:cs typeface="Arial" panose="020B0604020202020204" pitchFamily="34" charset="0"/>
+            </a:endParaRPr>
+          </a:p>
+          <a:p>
+            <a:r>
+              <a:rPr lang="en-US" sz="1200" dirty="0">
+                <a:solidFill>
+                  <a:schemeClr val="tx1"/>
+                </a:solidFill>
+                <a:latin typeface="Arial" panose="020B0604020202020204" pitchFamily="34" charset="0"/>
+                <a:cs typeface="Arial" panose="020B0604020202020204" pitchFamily="34" charset="0"/>
+              </a:rPr>
+              <a:t>Member functions</a:t>
+            </a:r>
+          </a:p>
+          <a:p>
+            <a:r>
+              <a:rPr lang="de-CH" sz="1000" b="1" dirty="0" err="1">
+                <a:solidFill>
+                  <a:schemeClr val="tx1"/>
+                </a:solidFill>
+                <a:latin typeface="Arial" panose="020B0604020202020204" pitchFamily="34" charset="0"/>
+                <a:cs typeface="Arial" panose="020B0604020202020204" pitchFamily="34" charset="0"/>
+              </a:rPr>
+              <a:t>execute</a:t>
+            </a:r>
+            <a:r>
+              <a:rPr lang="de-CH" sz="1000" b="1" dirty="0">
+                <a:solidFill>
+                  <a:schemeClr val="tx1"/>
+                </a:solidFill>
+                <a:latin typeface="Arial" panose="020B0604020202020204" pitchFamily="34" charset="0"/>
+                <a:cs typeface="Arial" panose="020B0604020202020204" pitchFamily="34" charset="0"/>
+              </a:rPr>
+              <a:t>: </a:t>
+            </a:r>
+            <a:r>
+              <a:rPr lang="de-CH" sz="1000" b="1" dirty="0" err="1">
+                <a:solidFill>
+                  <a:schemeClr val="tx1"/>
+                </a:solidFill>
+                <a:latin typeface="Arial" panose="020B0604020202020204" pitchFamily="34" charset="0"/>
+                <a:cs typeface="Arial" panose="020B0604020202020204" pitchFamily="34" charset="0"/>
+              </a:rPr>
+              <a:t>Creates</a:t>
+            </a:r>
+            <a:r>
+              <a:rPr lang="de-CH" sz="1000" b="1" dirty="0">
+                <a:solidFill>
+                  <a:schemeClr val="tx1"/>
+                </a:solidFill>
+                <a:latin typeface="Arial" panose="020B0604020202020204" pitchFamily="34" charset="0"/>
+                <a:cs typeface="Arial" panose="020B0604020202020204" pitchFamily="34" charset="0"/>
+              </a:rPr>
+              <a:t> </a:t>
+            </a:r>
+            <a:r>
+              <a:rPr lang="de-CH" sz="1000" b="1" dirty="0" err="1">
+                <a:solidFill>
+                  <a:schemeClr val="tx1"/>
+                </a:solidFill>
+                <a:latin typeface="Arial" panose="020B0604020202020204" pitchFamily="34" charset="0"/>
+                <a:cs typeface="Arial" panose="020B0604020202020204" pitchFamily="34" charset="0"/>
+              </a:rPr>
+              <a:t>the</a:t>
+            </a:r>
+            <a:r>
+              <a:rPr lang="de-CH" sz="1000" b="1" dirty="0">
+                <a:solidFill>
+                  <a:schemeClr val="tx1"/>
+                </a:solidFill>
+                <a:latin typeface="Arial" panose="020B0604020202020204" pitchFamily="34" charset="0"/>
+                <a:cs typeface="Arial" panose="020B0604020202020204" pitchFamily="34" charset="0"/>
+              </a:rPr>
+              <a:t> JavaScript code </a:t>
+            </a:r>
+          </a:p>
+          <a:p>
+            <a:r>
+              <a:rPr lang="de-CH" sz="1000" b="1" dirty="0" err="1">
+                <a:solidFill>
+                  <a:schemeClr val="tx1"/>
+                </a:solidFill>
+                <a:latin typeface="Arial" panose="020B0604020202020204" pitchFamily="34" charset="0"/>
+                <a:cs typeface="Arial" panose="020B0604020202020204" pitchFamily="34" charset="0"/>
+              </a:rPr>
+              <a:t>get</a:t>
+            </a:r>
+            <a:r>
+              <a:rPr lang="de-CH" sz="1000" b="1" dirty="0">
+                <a:solidFill>
+                  <a:schemeClr val="tx1"/>
+                </a:solidFill>
+                <a:latin typeface="Arial" panose="020B0604020202020204" pitchFamily="34" charset="0"/>
+                <a:cs typeface="Arial" panose="020B0604020202020204" pitchFamily="34" charset="0"/>
+              </a:rPr>
+              <a:t>:         Returns </a:t>
+            </a:r>
+            <a:r>
+              <a:rPr lang="de-CH" sz="1000" b="1" dirty="0" err="1">
+                <a:solidFill>
+                  <a:schemeClr val="tx1"/>
+                </a:solidFill>
+                <a:latin typeface="Arial" panose="020B0604020202020204" pitchFamily="34" charset="0"/>
+                <a:cs typeface="Arial" panose="020B0604020202020204" pitchFamily="34" charset="0"/>
+              </a:rPr>
+              <a:t>the</a:t>
+            </a:r>
+            <a:r>
+              <a:rPr lang="de-CH" sz="1000" b="1" dirty="0">
+                <a:solidFill>
+                  <a:schemeClr val="tx1"/>
+                </a:solidFill>
+                <a:latin typeface="Arial" panose="020B0604020202020204" pitchFamily="34" charset="0"/>
+                <a:cs typeface="Arial" panose="020B0604020202020204" pitchFamily="34" charset="0"/>
+              </a:rPr>
+              <a:t> JavaScript code</a:t>
+            </a:r>
+          </a:p>
+          <a:p>
+            <a:r>
+              <a:rPr lang="de-CH" sz="1000" b="1" dirty="0" err="1">
+                <a:solidFill>
+                  <a:schemeClr val="tx1"/>
+                </a:solidFill>
+                <a:latin typeface="Arial" panose="020B0604020202020204" pitchFamily="34" charset="0"/>
+                <a:cs typeface="Arial" panose="020B0604020202020204" pitchFamily="34" charset="0"/>
+              </a:rPr>
+              <a:t>print</a:t>
+            </a:r>
+            <a:r>
+              <a:rPr lang="de-CH" sz="1000" b="1" dirty="0">
+                <a:solidFill>
+                  <a:schemeClr val="tx1"/>
+                </a:solidFill>
+                <a:latin typeface="Arial" panose="020B0604020202020204" pitchFamily="34" charset="0"/>
+                <a:cs typeface="Arial" panose="020B0604020202020204" pitchFamily="34" charset="0"/>
+              </a:rPr>
+              <a:t>:  @media </a:t>
+            </a:r>
+            <a:r>
+              <a:rPr lang="de-CH" sz="1000" b="1" dirty="0" err="1">
+                <a:solidFill>
+                  <a:schemeClr val="tx1"/>
+                </a:solidFill>
+                <a:latin typeface="Arial" panose="020B0604020202020204" pitchFamily="34" charset="0"/>
+                <a:cs typeface="Arial" panose="020B0604020202020204" pitchFamily="34" charset="0"/>
+              </a:rPr>
+              <a:t>print</a:t>
+            </a:r>
+            <a:r>
+              <a:rPr lang="de-CH" sz="1000" b="1" dirty="0">
+                <a:solidFill>
+                  <a:schemeClr val="tx1"/>
+                </a:solidFill>
+                <a:latin typeface="Arial" panose="020B0604020202020204" pitchFamily="34" charset="0"/>
+                <a:cs typeface="Arial" panose="020B0604020202020204" pitchFamily="34" charset="0"/>
+              </a:rPr>
+              <a:t>, @page </a:t>
+            </a:r>
+            <a:r>
+              <a:rPr lang="de-CH" sz="1000" b="1" dirty="0" err="1">
+                <a:solidFill>
+                  <a:schemeClr val="tx1"/>
+                </a:solidFill>
+                <a:latin typeface="Arial" panose="020B0604020202020204" pitchFamily="34" charset="0"/>
+                <a:cs typeface="Arial" panose="020B0604020202020204" pitchFamily="34" charset="0"/>
+              </a:rPr>
+              <a:t>statements</a:t>
+            </a:r>
+            <a:endParaRPr lang="de-CH" sz="1000" b="1" dirty="0">
+              <a:solidFill>
+                <a:schemeClr val="tx1"/>
+              </a:solidFill>
+              <a:latin typeface="Arial" panose="020B0604020202020204" pitchFamily="34" charset="0"/>
+              <a:cs typeface="Arial" panose="020B0604020202020204" pitchFamily="34" charset="0"/>
+            </a:endParaRPr>
+          </a:p>
+        </p:txBody>
+      </p:sp>
+      <p:sp>
+        <p:nvSpPr>
+          <p:cNvPr id="11" name="Rechteck 10">
+            <a:extLst>
+              <a:ext uri="{FF2B5EF4-FFF2-40B4-BE49-F238E27FC236}">
+                <a16:creationId xmlns:a16="http://schemas.microsoft.com/office/drawing/2014/main" id="{C03532F4-A8C5-5EF5-1450-E4EA4C883F08}"/>
+              </a:ext>
+            </a:extLst>
+          </p:cNvPr>
+          <p:cNvSpPr/>
+          <p:nvPr/>
+        </p:nvSpPr>
+        <p:spPr>
+          <a:xfrm>
+            <a:off x="4296157" y="817415"/>
+            <a:ext cx="3245285" cy="756861"/>
+          </a:xfrm>
+          <a:prstGeom prst="rect">
+            <a:avLst/>
+          </a:prstGeom>
+          <a:noFill/>
+          <a:ln w="19050">
+            <a:solidFill>
+              <a:schemeClr val="tx1"/>
+            </a:solidFill>
+          </a:ln>
+        </p:spPr>
+        <p:style>
+          <a:lnRef idx="2">
+            <a:schemeClr val="accent1">
+              <a:shade val="50000"/>
+            </a:schemeClr>
+          </a:lnRef>
+          <a:fillRef idx="1">
+            <a:schemeClr val="accent1"/>
+          </a:fillRef>
+          <a:effectRef idx="0">
+            <a:schemeClr val="accent1"/>
+          </a:effectRef>
+          <a:fontRef idx="minor">
+            <a:schemeClr val="lt1"/>
+          </a:fontRef>
+        </p:style>
+        <p:txBody>
+          <a:bodyPr rtlCol="0" anchor="ctr"/>
+          <a:lstStyle/>
+          <a:p>
+            <a:pPr algn="ctr"/>
+            <a:r>
+              <a:rPr lang="de-CH" dirty="0" err="1">
+                <a:solidFill>
+                  <a:schemeClr val="tx1"/>
+                </a:solidFill>
+                <a:latin typeface="Arial" panose="020B0604020202020204" pitchFamily="34" charset="0"/>
+                <a:cs typeface="Arial" panose="020B0604020202020204" pitchFamily="34" charset="0"/>
+              </a:rPr>
+              <a:t>LayoutBody</a:t>
+            </a:r>
+            <a:endParaRPr lang="de-CH" dirty="0">
+              <a:solidFill>
+                <a:schemeClr val="tx1"/>
+              </a:solidFill>
+              <a:latin typeface="Arial" panose="020B0604020202020204" pitchFamily="34" charset="0"/>
+              <a:cs typeface="Arial" panose="020B0604020202020204" pitchFamily="34" charset="0"/>
+            </a:endParaRPr>
+          </a:p>
+          <a:p>
+            <a:pPr algn="ctr"/>
+            <a:endParaRPr lang="de-CH" sz="800" dirty="0">
+              <a:solidFill>
+                <a:schemeClr val="tx1"/>
+              </a:solidFill>
+              <a:latin typeface="Arial" panose="020B0604020202020204" pitchFamily="34" charset="0"/>
+              <a:cs typeface="Arial" panose="020B0604020202020204" pitchFamily="34" charset="0"/>
+            </a:endParaRPr>
+          </a:p>
+          <a:p>
+            <a:pPr algn="ctr"/>
+            <a:r>
+              <a:rPr lang="de-CH" sz="1200" dirty="0" err="1">
+                <a:solidFill>
+                  <a:schemeClr val="tx1"/>
+                </a:solidFill>
+                <a:latin typeface="Arial" panose="020B0604020202020204" pitchFamily="34" charset="0"/>
+                <a:cs typeface="Arial" panose="020B0604020202020204" pitchFamily="34" charset="0"/>
+              </a:rPr>
+              <a:t>Creates</a:t>
+            </a:r>
+            <a:r>
+              <a:rPr lang="de-CH" sz="1200" dirty="0">
+                <a:solidFill>
+                  <a:schemeClr val="tx1"/>
+                </a:solidFill>
+                <a:latin typeface="Arial" panose="020B0604020202020204" pitchFamily="34" charset="0"/>
+                <a:cs typeface="Arial" panose="020B0604020202020204" pitchFamily="34" charset="0"/>
+              </a:rPr>
+              <a:t> </a:t>
+            </a:r>
+            <a:r>
+              <a:rPr lang="de-CH" sz="1200" dirty="0" err="1">
+                <a:solidFill>
+                  <a:schemeClr val="tx1"/>
+                </a:solidFill>
+                <a:latin typeface="Arial" panose="020B0604020202020204" pitchFamily="34" charset="0"/>
+                <a:cs typeface="Arial" panose="020B0604020202020204" pitchFamily="34" charset="0"/>
+              </a:rPr>
+              <a:t>the</a:t>
+            </a:r>
+            <a:r>
+              <a:rPr lang="de-CH" sz="1200" dirty="0">
+                <a:solidFill>
+                  <a:schemeClr val="tx1"/>
+                </a:solidFill>
+                <a:latin typeface="Arial" panose="020B0604020202020204" pitchFamily="34" charset="0"/>
+                <a:cs typeface="Arial" panose="020B0604020202020204" pitchFamily="34" charset="0"/>
+              </a:rPr>
+              <a:t> &lt;</a:t>
+            </a:r>
+            <a:r>
+              <a:rPr lang="de-CH" sz="1200" dirty="0" err="1">
+                <a:solidFill>
+                  <a:schemeClr val="tx1"/>
+                </a:solidFill>
+                <a:latin typeface="Arial" panose="020B0604020202020204" pitchFamily="34" charset="0"/>
+                <a:cs typeface="Arial" panose="020B0604020202020204" pitchFamily="34" charset="0"/>
+              </a:rPr>
+              <a:t>body</a:t>
+            </a:r>
+            <a:r>
+              <a:rPr lang="de-CH" sz="1200" dirty="0">
+                <a:solidFill>
+                  <a:schemeClr val="tx1"/>
+                </a:solidFill>
+                <a:latin typeface="Arial" panose="020B0604020202020204" pitchFamily="34" charset="0"/>
+                <a:cs typeface="Arial" panose="020B0604020202020204" pitchFamily="34" charset="0"/>
+              </a:rPr>
+              <a:t>&gt; HTML code</a:t>
+            </a:r>
+          </a:p>
+        </p:txBody>
+      </p:sp>
+      <p:sp>
+        <p:nvSpPr>
+          <p:cNvPr id="12" name="Rechteck 11">
+            <a:extLst>
+              <a:ext uri="{FF2B5EF4-FFF2-40B4-BE49-F238E27FC236}">
+                <a16:creationId xmlns:a16="http://schemas.microsoft.com/office/drawing/2014/main" id="{F6F67D9E-121F-B623-50AD-F7D386DC1D2C}"/>
+              </a:ext>
+            </a:extLst>
+          </p:cNvPr>
+          <p:cNvSpPr/>
+          <p:nvPr/>
+        </p:nvSpPr>
+        <p:spPr>
+          <a:xfrm>
+            <a:off x="4296156" y="1574276"/>
+            <a:ext cx="3245286" cy="3289956"/>
+          </a:xfrm>
+          <a:prstGeom prst="rect">
+            <a:avLst/>
+          </a:prstGeom>
+          <a:noFill/>
+          <a:ln w="19050">
+            <a:solidFill>
+              <a:schemeClr val="tx1"/>
+            </a:solidFill>
+          </a:ln>
+        </p:spPr>
+        <p:style>
+          <a:lnRef idx="2">
+            <a:schemeClr val="accent1">
+              <a:shade val="50000"/>
+            </a:schemeClr>
+          </a:lnRef>
+          <a:fillRef idx="1">
+            <a:schemeClr val="accent1"/>
+          </a:fillRef>
+          <a:effectRef idx="0">
+            <a:schemeClr val="accent1"/>
+          </a:effectRef>
+          <a:fontRef idx="minor">
+            <a:schemeClr val="lt1"/>
+          </a:fontRef>
+        </p:style>
+        <p:txBody>
+          <a:bodyPr rtlCol="0" anchor="ctr"/>
+          <a:lstStyle/>
+          <a:p>
+            <a:r>
+              <a:rPr lang="en-US" sz="1200" dirty="0">
+                <a:solidFill>
+                  <a:schemeClr val="tx1"/>
+                </a:solidFill>
+                <a:latin typeface="Arial" panose="020B0604020202020204" pitchFamily="34" charset="0"/>
+                <a:cs typeface="Arial" panose="020B0604020202020204" pitchFamily="34" charset="0"/>
+              </a:rPr>
+              <a:t>Member variables</a:t>
+            </a:r>
+          </a:p>
+          <a:p>
+            <a:r>
+              <a:rPr lang="en-US" sz="1000" b="1" dirty="0" err="1">
+                <a:solidFill>
+                  <a:schemeClr val="tx1"/>
+                </a:solidFill>
+                <a:latin typeface="Arial" panose="020B0604020202020204" pitchFamily="34" charset="0"/>
+                <a:cs typeface="Arial" panose="020B0604020202020204" pitchFamily="34" charset="0"/>
+              </a:rPr>
+              <a:t>m_layout_xml</a:t>
+            </a:r>
+            <a:endParaRPr lang="en-US" sz="1000" b="1" dirty="0">
+              <a:solidFill>
+                <a:schemeClr val="tx1"/>
+              </a:solidFill>
+              <a:latin typeface="Arial" panose="020B0604020202020204" pitchFamily="34" charset="0"/>
+              <a:cs typeface="Arial" panose="020B0604020202020204" pitchFamily="34" charset="0"/>
+            </a:endParaRPr>
+          </a:p>
+          <a:p>
+            <a:r>
+              <a:rPr lang="en-US" sz="1000" b="1" dirty="0" err="1">
+                <a:solidFill>
+                  <a:schemeClr val="tx1"/>
+                </a:solidFill>
+                <a:latin typeface="Arial" panose="020B0604020202020204" pitchFamily="34" charset="0"/>
+                <a:cs typeface="Arial" panose="020B0604020202020204" pitchFamily="34" charset="0"/>
+              </a:rPr>
+              <a:t>m_output_dir</a:t>
+            </a:r>
+            <a:endParaRPr lang="en-US" sz="1000" b="1" dirty="0">
+              <a:solidFill>
+                <a:schemeClr val="tx1"/>
+              </a:solidFill>
+              <a:latin typeface="Arial" panose="020B0604020202020204" pitchFamily="34" charset="0"/>
+              <a:cs typeface="Arial" panose="020B0604020202020204" pitchFamily="34" charset="0"/>
+            </a:endParaRPr>
+          </a:p>
+          <a:p>
+            <a:r>
+              <a:rPr lang="en-US" sz="1000" b="1" dirty="0" err="1">
+                <a:solidFill>
+                  <a:schemeClr val="tx1"/>
+                </a:solidFill>
+                <a:latin typeface="Arial" panose="020B0604020202020204" pitchFamily="34" charset="0"/>
+                <a:cs typeface="Arial" panose="020B0604020202020204" pitchFamily="34" charset="0"/>
+              </a:rPr>
+              <a:t>m_layout_file_case</a:t>
+            </a:r>
+            <a:endParaRPr lang="en-US" sz="1000" b="1" dirty="0">
+              <a:solidFill>
+                <a:schemeClr val="tx1"/>
+              </a:solidFill>
+              <a:latin typeface="Arial" panose="020B0604020202020204" pitchFamily="34" charset="0"/>
+              <a:cs typeface="Arial" panose="020B0604020202020204" pitchFamily="34" charset="0"/>
+            </a:endParaRPr>
+          </a:p>
+          <a:p>
+            <a:r>
+              <a:rPr lang="en-US" sz="1000" b="1" dirty="0" err="1">
+                <a:solidFill>
+                  <a:schemeClr val="tx1"/>
+                </a:solidFill>
+                <a:latin typeface="Arial" panose="020B0604020202020204" pitchFamily="34" charset="0"/>
+                <a:cs typeface="Arial" panose="020B0604020202020204" pitchFamily="34" charset="0"/>
+              </a:rPr>
+              <a:t>m_button_id_array</a:t>
+            </a:r>
+            <a:endParaRPr lang="en-US" sz="1000" b="1" dirty="0">
+              <a:solidFill>
+                <a:schemeClr val="tx1"/>
+              </a:solidFill>
+              <a:latin typeface="Arial" panose="020B0604020202020204" pitchFamily="34" charset="0"/>
+              <a:cs typeface="Arial" panose="020B0604020202020204" pitchFamily="34" charset="0"/>
+            </a:endParaRPr>
+          </a:p>
+          <a:p>
+            <a:r>
+              <a:rPr lang="en-US" sz="1000" b="1" dirty="0" err="1">
+                <a:solidFill>
+                  <a:schemeClr val="tx1"/>
+                </a:solidFill>
+                <a:latin typeface="Arial" panose="020B0604020202020204" pitchFamily="34" charset="0"/>
+                <a:cs typeface="Arial" panose="020B0604020202020204" pitchFamily="34" charset="0"/>
+              </a:rPr>
+              <a:t>m_html_body_code</a:t>
+            </a:r>
+            <a:endParaRPr lang="en-US" sz="1000" b="1" dirty="0">
+              <a:solidFill>
+                <a:schemeClr val="tx1"/>
+              </a:solidFill>
+              <a:latin typeface="Arial" panose="020B0604020202020204" pitchFamily="34" charset="0"/>
+              <a:cs typeface="Arial" panose="020B0604020202020204" pitchFamily="34" charset="0"/>
+            </a:endParaRPr>
+          </a:p>
+          <a:p>
+            <a:endParaRPr lang="en-US" sz="1000" b="1" dirty="0">
+              <a:solidFill>
+                <a:schemeClr val="tx1"/>
+              </a:solidFill>
+              <a:latin typeface="Arial" panose="020B0604020202020204" pitchFamily="34" charset="0"/>
+              <a:cs typeface="Arial" panose="020B0604020202020204" pitchFamily="34" charset="0"/>
+            </a:endParaRPr>
+          </a:p>
+          <a:p>
+            <a:r>
+              <a:rPr lang="en-US" sz="1200" dirty="0">
+                <a:solidFill>
+                  <a:schemeClr val="tx1"/>
+                </a:solidFill>
+                <a:latin typeface="Arial" panose="020B0604020202020204" pitchFamily="34" charset="0"/>
+                <a:cs typeface="Arial" panose="020B0604020202020204" pitchFamily="34" charset="0"/>
+              </a:rPr>
+              <a:t>Member functions</a:t>
+            </a:r>
+          </a:p>
+          <a:p>
+            <a:r>
+              <a:rPr lang="de-CH" sz="1000" b="1" dirty="0" err="1">
+                <a:solidFill>
+                  <a:schemeClr val="tx1"/>
+                </a:solidFill>
+                <a:latin typeface="Arial" panose="020B0604020202020204" pitchFamily="34" charset="0"/>
+                <a:cs typeface="Arial" panose="020B0604020202020204" pitchFamily="34" charset="0"/>
+              </a:rPr>
+              <a:t>execute</a:t>
+            </a:r>
+            <a:r>
+              <a:rPr lang="de-CH" sz="1000" b="1" dirty="0">
+                <a:solidFill>
+                  <a:schemeClr val="tx1"/>
+                </a:solidFill>
+                <a:latin typeface="Arial" panose="020B0604020202020204" pitchFamily="34" charset="0"/>
+                <a:cs typeface="Arial" panose="020B0604020202020204" pitchFamily="34" charset="0"/>
+              </a:rPr>
+              <a:t>: </a:t>
+            </a:r>
+            <a:r>
+              <a:rPr lang="de-CH" sz="1000" b="1" dirty="0" err="1">
+                <a:solidFill>
+                  <a:schemeClr val="tx1"/>
+                </a:solidFill>
+                <a:latin typeface="Arial" panose="020B0604020202020204" pitchFamily="34" charset="0"/>
+                <a:cs typeface="Arial" panose="020B0604020202020204" pitchFamily="34" charset="0"/>
+              </a:rPr>
+              <a:t>Creates</a:t>
+            </a:r>
+            <a:r>
+              <a:rPr lang="de-CH" sz="1000" b="1" dirty="0">
+                <a:solidFill>
+                  <a:schemeClr val="tx1"/>
+                </a:solidFill>
+                <a:latin typeface="Arial" panose="020B0604020202020204" pitchFamily="34" charset="0"/>
+                <a:cs typeface="Arial" panose="020B0604020202020204" pitchFamily="34" charset="0"/>
+              </a:rPr>
+              <a:t> </a:t>
+            </a:r>
+            <a:r>
+              <a:rPr lang="de-CH" sz="1000" b="1" dirty="0" err="1">
+                <a:solidFill>
+                  <a:schemeClr val="tx1"/>
+                </a:solidFill>
+                <a:latin typeface="Arial" panose="020B0604020202020204" pitchFamily="34" charset="0"/>
+                <a:cs typeface="Arial" panose="020B0604020202020204" pitchFamily="34" charset="0"/>
+              </a:rPr>
+              <a:t>the</a:t>
+            </a:r>
+            <a:r>
+              <a:rPr lang="de-CH" sz="1000" b="1" dirty="0">
+                <a:solidFill>
+                  <a:schemeClr val="tx1"/>
+                </a:solidFill>
+                <a:latin typeface="Arial" panose="020B0604020202020204" pitchFamily="34" charset="0"/>
+                <a:cs typeface="Arial" panose="020B0604020202020204" pitchFamily="34" charset="0"/>
+              </a:rPr>
+              <a:t> </a:t>
+            </a:r>
+            <a:r>
+              <a:rPr lang="de-CH" sz="1000" b="1" dirty="0" err="1">
+                <a:solidFill>
+                  <a:schemeClr val="tx1"/>
+                </a:solidFill>
+                <a:latin typeface="Arial" panose="020B0604020202020204" pitchFamily="34" charset="0"/>
+                <a:cs typeface="Arial" panose="020B0604020202020204" pitchFamily="34" charset="0"/>
+              </a:rPr>
+              <a:t>body</a:t>
+            </a:r>
+            <a:r>
+              <a:rPr lang="de-CH" sz="1000" b="1" dirty="0">
+                <a:solidFill>
+                  <a:schemeClr val="tx1"/>
+                </a:solidFill>
+                <a:latin typeface="Arial" panose="020B0604020202020204" pitchFamily="34" charset="0"/>
+                <a:cs typeface="Arial" panose="020B0604020202020204" pitchFamily="34" charset="0"/>
+              </a:rPr>
+              <a:t> HTML code </a:t>
+            </a:r>
+          </a:p>
+          <a:p>
+            <a:r>
+              <a:rPr lang="de-CH" sz="1000" b="1" dirty="0" err="1">
+                <a:solidFill>
+                  <a:schemeClr val="tx1"/>
+                </a:solidFill>
+                <a:latin typeface="Arial" panose="020B0604020202020204" pitchFamily="34" charset="0"/>
+                <a:cs typeface="Arial" panose="020B0604020202020204" pitchFamily="34" charset="0"/>
+              </a:rPr>
+              <a:t>get</a:t>
+            </a:r>
+            <a:r>
+              <a:rPr lang="de-CH" sz="1000" b="1" dirty="0">
+                <a:solidFill>
+                  <a:schemeClr val="tx1"/>
+                </a:solidFill>
+                <a:latin typeface="Arial" panose="020B0604020202020204" pitchFamily="34" charset="0"/>
+                <a:cs typeface="Arial" panose="020B0604020202020204" pitchFamily="34" charset="0"/>
+              </a:rPr>
+              <a:t>:         Returns </a:t>
+            </a:r>
+            <a:r>
+              <a:rPr lang="de-CH" sz="1000" b="1" dirty="0" err="1">
+                <a:solidFill>
+                  <a:schemeClr val="tx1"/>
+                </a:solidFill>
+                <a:latin typeface="Arial" panose="020B0604020202020204" pitchFamily="34" charset="0"/>
+                <a:cs typeface="Arial" panose="020B0604020202020204" pitchFamily="34" charset="0"/>
+              </a:rPr>
+              <a:t>the</a:t>
+            </a:r>
+            <a:r>
+              <a:rPr lang="de-CH" sz="1000" b="1" dirty="0">
+                <a:solidFill>
+                  <a:schemeClr val="tx1"/>
+                </a:solidFill>
+                <a:latin typeface="Arial" panose="020B0604020202020204" pitchFamily="34" charset="0"/>
+                <a:cs typeface="Arial" panose="020B0604020202020204" pitchFamily="34" charset="0"/>
+              </a:rPr>
+              <a:t> </a:t>
+            </a:r>
+            <a:r>
+              <a:rPr lang="de-CH" sz="1000" b="1" dirty="0" err="1">
+                <a:solidFill>
+                  <a:schemeClr val="tx1"/>
+                </a:solidFill>
+                <a:latin typeface="Arial" panose="020B0604020202020204" pitchFamily="34" charset="0"/>
+                <a:cs typeface="Arial" panose="020B0604020202020204" pitchFamily="34" charset="0"/>
+              </a:rPr>
+              <a:t>body</a:t>
+            </a:r>
+            <a:r>
+              <a:rPr lang="de-CH" sz="1000" b="1" dirty="0">
+                <a:solidFill>
+                  <a:schemeClr val="tx1"/>
+                </a:solidFill>
+                <a:latin typeface="Arial" panose="020B0604020202020204" pitchFamily="34" charset="0"/>
+                <a:cs typeface="Arial" panose="020B0604020202020204" pitchFamily="34" charset="0"/>
+              </a:rPr>
+              <a:t> HTML code</a:t>
+            </a:r>
+          </a:p>
+          <a:p>
+            <a:r>
+              <a:rPr lang="de-CH" sz="1000" b="1" dirty="0" err="1">
+                <a:solidFill>
+                  <a:schemeClr val="tx1"/>
+                </a:solidFill>
+                <a:latin typeface="Arial" panose="020B0604020202020204" pitchFamily="34" charset="0"/>
+                <a:cs typeface="Arial" panose="020B0604020202020204" pitchFamily="34" charset="0"/>
+              </a:rPr>
+              <a:t>setXml</a:t>
+            </a:r>
+            <a:r>
+              <a:rPr lang="de-CH" sz="1000" b="1" dirty="0">
+                <a:solidFill>
+                  <a:schemeClr val="tx1"/>
+                </a:solidFill>
+                <a:latin typeface="Arial" panose="020B0604020202020204" pitchFamily="34" charset="0"/>
+                <a:cs typeface="Arial" panose="020B0604020202020204" pitchFamily="34" charset="0"/>
+              </a:rPr>
+              <a:t>:  Global </a:t>
+            </a:r>
+            <a:r>
+              <a:rPr lang="de-CH" sz="1000" b="1" dirty="0" err="1">
+                <a:solidFill>
+                  <a:schemeClr val="tx1"/>
+                </a:solidFill>
+                <a:latin typeface="Arial" panose="020B0604020202020204" pitchFamily="34" charset="0"/>
+                <a:cs typeface="Arial" panose="020B0604020202020204" pitchFamily="34" charset="0"/>
+              </a:rPr>
+              <a:t>parameter</a:t>
+            </a:r>
+            <a:r>
+              <a:rPr lang="de-CH" sz="1000" b="1" dirty="0">
+                <a:solidFill>
+                  <a:schemeClr val="tx1"/>
+                </a:solidFill>
+                <a:latin typeface="Arial" panose="020B0604020202020204" pitchFamily="34" charset="0"/>
+                <a:cs typeface="Arial" panose="020B0604020202020204" pitchFamily="34" charset="0"/>
+              </a:rPr>
+              <a:t> </a:t>
+            </a:r>
+            <a:r>
+              <a:rPr lang="de-CH" sz="1000" b="1" dirty="0" err="1">
+                <a:solidFill>
+                  <a:schemeClr val="tx1"/>
+                </a:solidFill>
+                <a:latin typeface="Arial" panose="020B0604020202020204" pitchFamily="34" charset="0"/>
+                <a:cs typeface="Arial" panose="020B0604020202020204" pitchFamily="34" charset="0"/>
+              </a:rPr>
+              <a:t>name</a:t>
+            </a:r>
+            <a:r>
+              <a:rPr lang="de-CH" sz="1000" b="1" dirty="0">
+                <a:solidFill>
+                  <a:schemeClr val="tx1"/>
+                </a:solidFill>
+                <a:latin typeface="Arial" panose="020B0604020202020204" pitchFamily="34" charset="0"/>
+                <a:cs typeface="Arial" panose="020B0604020202020204" pitchFamily="34" charset="0"/>
+              </a:rPr>
+              <a:t> </a:t>
+            </a:r>
+            <a:r>
+              <a:rPr lang="de-CH" sz="1000" b="1" dirty="0" err="1">
+                <a:solidFill>
+                  <a:schemeClr val="tx1"/>
+                </a:solidFill>
+                <a:latin typeface="Arial" panose="020B0604020202020204" pitchFamily="34" charset="0"/>
+                <a:cs typeface="Arial" panose="020B0604020202020204" pitchFamily="34" charset="0"/>
+              </a:rPr>
+              <a:t>of</a:t>
+            </a:r>
+            <a:r>
+              <a:rPr lang="de-CH" sz="1000" b="1" dirty="0">
+                <a:solidFill>
+                  <a:schemeClr val="tx1"/>
+                </a:solidFill>
+                <a:latin typeface="Arial" panose="020B0604020202020204" pitchFamily="34" charset="0"/>
+                <a:cs typeface="Arial" panose="020B0604020202020204" pitchFamily="34" charset="0"/>
+              </a:rPr>
+              <a:t> </a:t>
+            </a:r>
+            <a:r>
+              <a:rPr lang="de-CH" sz="1000" b="1" dirty="0" err="1">
+                <a:solidFill>
+                  <a:schemeClr val="tx1"/>
+                </a:solidFill>
+                <a:latin typeface="Arial" panose="020B0604020202020204" pitchFamily="34" charset="0"/>
+                <a:cs typeface="Arial" panose="020B0604020202020204" pitchFamily="34" charset="0"/>
+              </a:rPr>
+              <a:t>layout</a:t>
+            </a:r>
+            <a:r>
+              <a:rPr lang="de-CH" sz="1000" b="1" dirty="0">
+                <a:solidFill>
+                  <a:schemeClr val="tx1"/>
+                </a:solidFill>
+                <a:latin typeface="Arial" panose="020B0604020202020204" pitchFamily="34" charset="0"/>
+                <a:cs typeface="Arial" panose="020B0604020202020204" pitchFamily="34" charset="0"/>
+              </a:rPr>
+              <a:t> XML </a:t>
+            </a:r>
+            <a:r>
+              <a:rPr lang="de-CH" sz="1000" b="1" dirty="0" err="1">
+                <a:solidFill>
+                  <a:schemeClr val="tx1"/>
+                </a:solidFill>
+                <a:latin typeface="Arial" panose="020B0604020202020204" pitchFamily="34" charset="0"/>
+                <a:cs typeface="Arial" panose="020B0604020202020204" pitchFamily="34" charset="0"/>
+              </a:rPr>
+              <a:t>file</a:t>
+            </a:r>
+            <a:endParaRPr lang="de-CH" sz="1000" b="1" dirty="0">
+              <a:solidFill>
+                <a:schemeClr val="tx1"/>
+              </a:solidFill>
+              <a:latin typeface="Arial" panose="020B0604020202020204" pitchFamily="34" charset="0"/>
+              <a:cs typeface="Arial" panose="020B0604020202020204" pitchFamily="34" charset="0"/>
+            </a:endParaRPr>
+          </a:p>
+          <a:p>
+            <a:r>
+              <a:rPr lang="de-CH" sz="1000" b="1" dirty="0" err="1">
+                <a:solidFill>
+                  <a:schemeClr val="tx1"/>
+                </a:solidFill>
+                <a:latin typeface="Arial" panose="020B0604020202020204" pitchFamily="34" charset="0"/>
+                <a:cs typeface="Arial" panose="020B0604020202020204" pitchFamily="34" charset="0"/>
+              </a:rPr>
+              <a:t>divSearch</a:t>
+            </a:r>
+            <a:r>
+              <a:rPr lang="de-CH" sz="1000" b="1" dirty="0">
+                <a:solidFill>
+                  <a:schemeClr val="tx1"/>
+                </a:solidFill>
+                <a:latin typeface="Arial" panose="020B0604020202020204" pitchFamily="34" charset="0"/>
+                <a:cs typeface="Arial" panose="020B0604020202020204" pitchFamily="34" charset="0"/>
+              </a:rPr>
+              <a:t>: &lt;div&gt; </a:t>
+            </a:r>
+            <a:r>
+              <a:rPr lang="de-CH" sz="1000" b="1" dirty="0" err="1">
+                <a:solidFill>
+                  <a:schemeClr val="tx1"/>
+                </a:solidFill>
+                <a:latin typeface="Arial" panose="020B0604020202020204" pitchFamily="34" charset="0"/>
+                <a:cs typeface="Arial" panose="020B0604020202020204" pitchFamily="34" charset="0"/>
+              </a:rPr>
+              <a:t>for</a:t>
+            </a:r>
+            <a:r>
+              <a:rPr lang="de-CH" sz="1000" b="1" dirty="0">
+                <a:solidFill>
+                  <a:schemeClr val="tx1"/>
+                </a:solidFill>
+                <a:latin typeface="Arial" panose="020B0604020202020204" pitchFamily="34" charset="0"/>
+                <a:cs typeface="Arial" panose="020B0604020202020204" pitchFamily="34" charset="0"/>
+              </a:rPr>
+              <a:t> </a:t>
+            </a:r>
+            <a:r>
+              <a:rPr lang="de-CH" sz="1000" b="1" dirty="0" err="1">
+                <a:solidFill>
+                  <a:schemeClr val="tx1"/>
+                </a:solidFill>
+                <a:latin typeface="Arial" panose="020B0604020202020204" pitchFamily="34" charset="0"/>
+                <a:cs typeface="Arial" panose="020B0604020202020204" pitchFamily="34" charset="0"/>
+              </a:rPr>
+              <a:t>search</a:t>
+            </a:r>
+            <a:r>
+              <a:rPr lang="de-CH" sz="1000" b="1" dirty="0">
+                <a:solidFill>
+                  <a:schemeClr val="tx1"/>
+                </a:solidFill>
+                <a:latin typeface="Arial" panose="020B0604020202020204" pitchFamily="34" charset="0"/>
+                <a:cs typeface="Arial" panose="020B0604020202020204" pitchFamily="34" charset="0"/>
+              </a:rPr>
+              <a:t> </a:t>
+            </a:r>
+            <a:r>
+              <a:rPr lang="de-CH" sz="1000" b="1" dirty="0" err="1">
+                <a:solidFill>
+                  <a:schemeClr val="tx1"/>
+                </a:solidFill>
+                <a:latin typeface="Arial" panose="020B0604020202020204" pitchFamily="34" charset="0"/>
+                <a:cs typeface="Arial" panose="020B0604020202020204" pitchFamily="34" charset="0"/>
+              </a:rPr>
+              <a:t>of</a:t>
+            </a:r>
+            <a:r>
+              <a:rPr lang="de-CH" sz="1000" b="1" dirty="0">
+                <a:solidFill>
+                  <a:schemeClr val="tx1"/>
+                </a:solidFill>
+                <a:latin typeface="Arial" panose="020B0604020202020204" pitchFamily="34" charset="0"/>
+                <a:cs typeface="Arial" panose="020B0604020202020204" pitchFamily="34" charset="0"/>
+              </a:rPr>
+              <a:t> </a:t>
+            </a:r>
+            <a:r>
+              <a:rPr lang="de-CH" sz="1000" b="1" dirty="0" err="1">
+                <a:solidFill>
+                  <a:schemeClr val="tx1"/>
+                </a:solidFill>
+                <a:latin typeface="Arial" panose="020B0604020202020204" pitchFamily="34" charset="0"/>
+                <a:cs typeface="Arial" panose="020B0604020202020204" pitchFamily="34" charset="0"/>
+              </a:rPr>
+              <a:t>seats</a:t>
+            </a:r>
+            <a:endParaRPr lang="de-CH" sz="1000" b="1" dirty="0">
+              <a:solidFill>
+                <a:schemeClr val="tx1"/>
+              </a:solidFill>
+              <a:latin typeface="Arial" panose="020B0604020202020204" pitchFamily="34" charset="0"/>
+              <a:cs typeface="Arial" panose="020B0604020202020204" pitchFamily="34" charset="0"/>
+            </a:endParaRPr>
+          </a:p>
+          <a:p>
+            <a:r>
+              <a:rPr lang="de-CH" sz="1000" b="1" dirty="0" err="1">
+                <a:solidFill>
+                  <a:schemeClr val="tx1"/>
+                </a:solidFill>
+                <a:latin typeface="Arial" panose="020B0604020202020204" pitchFamily="34" charset="0"/>
+                <a:cs typeface="Arial" panose="020B0604020202020204" pitchFamily="34" charset="0"/>
+              </a:rPr>
+              <a:t>divSelectEvent</a:t>
+            </a:r>
+            <a:r>
+              <a:rPr lang="de-CH" sz="1000" b="1" dirty="0">
+                <a:solidFill>
+                  <a:schemeClr val="tx1"/>
+                </a:solidFill>
+                <a:latin typeface="Arial" panose="020B0604020202020204" pitchFamily="34" charset="0"/>
+                <a:cs typeface="Arial" panose="020B0604020202020204" pitchFamily="34" charset="0"/>
+              </a:rPr>
+              <a:t>: &lt;div&gt;  </a:t>
+            </a:r>
+            <a:r>
+              <a:rPr lang="de-CH" sz="1000" b="1" dirty="0" err="1">
+                <a:solidFill>
+                  <a:schemeClr val="tx1"/>
+                </a:solidFill>
+                <a:latin typeface="Arial" panose="020B0604020202020204" pitchFamily="34" charset="0"/>
+                <a:cs typeface="Arial" panose="020B0604020202020204" pitchFamily="34" charset="0"/>
+              </a:rPr>
+              <a:t>select</a:t>
+            </a:r>
+            <a:r>
+              <a:rPr lang="de-CH" sz="1000" b="1" dirty="0">
+                <a:solidFill>
+                  <a:schemeClr val="tx1"/>
+                </a:solidFill>
+                <a:latin typeface="Arial" panose="020B0604020202020204" pitchFamily="34" charset="0"/>
+                <a:cs typeface="Arial" panose="020B0604020202020204" pitchFamily="34" charset="0"/>
+              </a:rPr>
+              <a:t> </a:t>
+            </a:r>
+            <a:r>
+              <a:rPr lang="de-CH" sz="1000" b="1" dirty="0" err="1">
+                <a:solidFill>
+                  <a:schemeClr val="tx1"/>
+                </a:solidFill>
+                <a:latin typeface="Arial" panose="020B0604020202020204" pitchFamily="34" charset="0"/>
+                <a:cs typeface="Arial" panose="020B0604020202020204" pitchFamily="34" charset="0"/>
+              </a:rPr>
+              <a:t>event</a:t>
+            </a:r>
+            <a:endParaRPr lang="de-CH" sz="1000" b="1" dirty="0">
+              <a:solidFill>
+                <a:schemeClr val="tx1"/>
+              </a:solidFill>
+              <a:latin typeface="Arial" panose="020B0604020202020204" pitchFamily="34" charset="0"/>
+              <a:cs typeface="Arial" panose="020B0604020202020204" pitchFamily="34" charset="0"/>
+            </a:endParaRPr>
+          </a:p>
+          <a:p>
+            <a:r>
+              <a:rPr lang="de-CH" sz="1000" b="1" dirty="0" err="1">
+                <a:solidFill>
+                  <a:schemeClr val="tx1"/>
+                </a:solidFill>
+                <a:latin typeface="Arial" panose="020B0604020202020204" pitchFamily="34" charset="0"/>
+                <a:cs typeface="Arial" panose="020B0604020202020204" pitchFamily="34" charset="0"/>
+              </a:rPr>
+              <a:t>paragraphDisplayEvent</a:t>
+            </a:r>
+            <a:r>
+              <a:rPr lang="de-CH" sz="1000" b="1" dirty="0">
+                <a:solidFill>
+                  <a:schemeClr val="tx1"/>
+                </a:solidFill>
+                <a:latin typeface="Arial" panose="020B0604020202020204" pitchFamily="34" charset="0"/>
+                <a:cs typeface="Arial" panose="020B0604020202020204" pitchFamily="34" charset="0"/>
+              </a:rPr>
+              <a:t>: &lt;div&gt; </a:t>
+            </a:r>
+            <a:r>
+              <a:rPr lang="de-CH" sz="1000" b="1" dirty="0" err="1">
+                <a:solidFill>
+                  <a:schemeClr val="tx1"/>
+                </a:solidFill>
+                <a:latin typeface="Arial" panose="020B0604020202020204" pitchFamily="34" charset="0"/>
+                <a:cs typeface="Arial" panose="020B0604020202020204" pitchFamily="34" charset="0"/>
+              </a:rPr>
+              <a:t>show</a:t>
+            </a:r>
+            <a:r>
+              <a:rPr lang="de-CH" sz="1000" b="1" dirty="0">
+                <a:solidFill>
+                  <a:schemeClr val="tx1"/>
+                </a:solidFill>
+                <a:latin typeface="Arial" panose="020B0604020202020204" pitchFamily="34" charset="0"/>
+                <a:cs typeface="Arial" panose="020B0604020202020204" pitchFamily="34" charset="0"/>
+              </a:rPr>
+              <a:t> </a:t>
+            </a:r>
+            <a:r>
+              <a:rPr lang="de-CH" sz="1000" b="1" dirty="0" err="1">
+                <a:solidFill>
+                  <a:schemeClr val="tx1"/>
+                </a:solidFill>
+                <a:latin typeface="Arial" panose="020B0604020202020204" pitchFamily="34" charset="0"/>
+                <a:cs typeface="Arial" panose="020B0604020202020204" pitchFamily="34" charset="0"/>
+              </a:rPr>
+              <a:t>event</a:t>
+            </a:r>
+            <a:r>
+              <a:rPr lang="de-CH" sz="1000" b="1" dirty="0">
+                <a:solidFill>
+                  <a:schemeClr val="tx1"/>
+                </a:solidFill>
+                <a:latin typeface="Arial" panose="020B0604020202020204" pitchFamily="34" charset="0"/>
+                <a:cs typeface="Arial" panose="020B0604020202020204" pitchFamily="34" charset="0"/>
+              </a:rPr>
+              <a:t> </a:t>
+            </a:r>
+            <a:r>
+              <a:rPr lang="de-CH" sz="1000" b="1" dirty="0" err="1">
+                <a:solidFill>
+                  <a:schemeClr val="tx1"/>
+                </a:solidFill>
+                <a:latin typeface="Arial" panose="020B0604020202020204" pitchFamily="34" charset="0"/>
+                <a:cs typeface="Arial" panose="020B0604020202020204" pitchFamily="34" charset="0"/>
+              </a:rPr>
+              <a:t>name</a:t>
+            </a:r>
+            <a:endParaRPr lang="de-CH" sz="1000" b="1" dirty="0">
+              <a:solidFill>
+                <a:schemeClr val="tx1"/>
+              </a:solidFill>
+              <a:latin typeface="Arial" panose="020B0604020202020204" pitchFamily="34" charset="0"/>
+              <a:cs typeface="Arial" panose="020B0604020202020204" pitchFamily="34" charset="0"/>
+            </a:endParaRPr>
+          </a:p>
+          <a:p>
+            <a:r>
+              <a:rPr lang="de-CH" sz="1000" b="1" dirty="0" err="1">
+                <a:solidFill>
+                  <a:schemeClr val="tx1"/>
+                </a:solidFill>
+                <a:latin typeface="Arial" panose="020B0604020202020204" pitchFamily="34" charset="0"/>
+                <a:cs typeface="Arial" panose="020B0604020202020204" pitchFamily="34" charset="0"/>
+              </a:rPr>
+              <a:t>layoutSvgTrTd</a:t>
+            </a:r>
+            <a:r>
+              <a:rPr lang="de-CH" sz="1000" b="1" dirty="0">
+                <a:solidFill>
+                  <a:schemeClr val="tx1"/>
+                </a:solidFill>
+                <a:latin typeface="Arial" panose="020B0604020202020204" pitchFamily="34" charset="0"/>
+                <a:cs typeface="Arial" panose="020B0604020202020204" pitchFamily="34" charset="0"/>
+              </a:rPr>
+              <a:t>: All &lt;</a:t>
+            </a:r>
+            <a:r>
+              <a:rPr lang="de-CH" sz="1000" b="1" dirty="0" err="1">
+                <a:solidFill>
+                  <a:schemeClr val="tx1"/>
+                </a:solidFill>
+                <a:latin typeface="Arial" panose="020B0604020202020204" pitchFamily="34" charset="0"/>
+                <a:cs typeface="Arial" panose="020B0604020202020204" pitchFamily="34" charset="0"/>
+              </a:rPr>
+              <a:t>svg</a:t>
+            </a:r>
+            <a:r>
+              <a:rPr lang="de-CH" sz="1000" b="1" dirty="0">
+                <a:solidFill>
+                  <a:schemeClr val="tx1"/>
+                </a:solidFill>
+                <a:latin typeface="Arial" panose="020B0604020202020204" pitchFamily="34" charset="0"/>
+                <a:cs typeface="Arial" panose="020B0604020202020204" pitchFamily="34" charset="0"/>
+              </a:rPr>
+              <a:t>&gt; code</a:t>
+            </a:r>
+          </a:p>
+          <a:p>
+            <a:r>
+              <a:rPr lang="de-CH" sz="1000" b="1" dirty="0" err="1">
+                <a:solidFill>
+                  <a:schemeClr val="tx1"/>
+                </a:solidFill>
+                <a:latin typeface="Arial" panose="020B0604020202020204" pitchFamily="34" charset="0"/>
+                <a:cs typeface="Arial" panose="020B0604020202020204" pitchFamily="34" charset="0"/>
+              </a:rPr>
+              <a:t>imageSponsors</a:t>
+            </a:r>
+            <a:r>
+              <a:rPr lang="de-CH" sz="1000" b="1" dirty="0">
+                <a:solidFill>
+                  <a:schemeClr val="tx1"/>
+                </a:solidFill>
+                <a:latin typeface="Arial" panose="020B0604020202020204" pitchFamily="34" charset="0"/>
+                <a:cs typeface="Arial" panose="020B0604020202020204" pitchFamily="34" charset="0"/>
+              </a:rPr>
+              <a:t>: Sponsor </a:t>
+            </a:r>
+            <a:r>
+              <a:rPr lang="de-CH" sz="1000" b="1" dirty="0" err="1">
+                <a:solidFill>
+                  <a:schemeClr val="tx1"/>
+                </a:solidFill>
+                <a:latin typeface="Arial" panose="020B0604020202020204" pitchFamily="34" charset="0"/>
+                <a:cs typeface="Arial" panose="020B0604020202020204" pitchFamily="34" charset="0"/>
+              </a:rPr>
+              <a:t>image</a:t>
+            </a:r>
+            <a:endParaRPr lang="de-CH" sz="1000" b="1" dirty="0">
+              <a:solidFill>
+                <a:schemeClr val="tx1"/>
+              </a:solidFill>
+              <a:latin typeface="Arial" panose="020B0604020202020204" pitchFamily="34" charset="0"/>
+              <a:cs typeface="Arial" panose="020B0604020202020204" pitchFamily="34" charset="0"/>
+            </a:endParaRPr>
+          </a:p>
+          <a:p>
+            <a:r>
+              <a:rPr lang="de-CH" sz="1000" b="1" dirty="0" err="1">
+                <a:solidFill>
+                  <a:schemeClr val="tx1"/>
+                </a:solidFill>
+                <a:latin typeface="Arial" panose="020B0604020202020204" pitchFamily="34" charset="0"/>
+                <a:cs typeface="Arial" panose="020B0604020202020204" pitchFamily="34" charset="0"/>
+              </a:rPr>
+              <a:t>bodyReservationPrint</a:t>
+            </a:r>
+            <a:r>
+              <a:rPr lang="de-CH" sz="1000" b="1" dirty="0">
+                <a:solidFill>
+                  <a:schemeClr val="tx1"/>
+                </a:solidFill>
+                <a:latin typeface="Arial" panose="020B0604020202020204" pitchFamily="34" charset="0"/>
+                <a:cs typeface="Arial" panose="020B0604020202020204" pitchFamily="34" charset="0"/>
+              </a:rPr>
+              <a:t>: Print code (</a:t>
+            </a:r>
+            <a:r>
+              <a:rPr lang="de-CH" sz="1000" b="1" dirty="0" err="1">
+                <a:solidFill>
+                  <a:schemeClr val="tx1"/>
+                </a:solidFill>
+                <a:latin typeface="Arial" panose="020B0604020202020204" pitchFamily="34" charset="0"/>
+                <a:cs typeface="Arial" panose="020B0604020202020204" pitchFamily="34" charset="0"/>
+              </a:rPr>
+              <a:t>windows.write</a:t>
+            </a:r>
+            <a:r>
+              <a:rPr lang="de-CH" sz="1000" b="1" dirty="0">
+                <a:solidFill>
+                  <a:schemeClr val="tx1"/>
+                </a:solidFill>
+                <a:latin typeface="Arial" panose="020B0604020202020204" pitchFamily="34" charset="0"/>
+                <a:cs typeface="Arial" panose="020B0604020202020204" pitchFamily="34" charset="0"/>
+              </a:rPr>
+              <a:t>)</a:t>
+            </a:r>
+          </a:p>
+          <a:p>
+            <a:r>
+              <a:rPr lang="de-CH" sz="1000" b="1" dirty="0" err="1">
+                <a:solidFill>
+                  <a:schemeClr val="tx1"/>
+                </a:solidFill>
+                <a:latin typeface="Arial" panose="020B0604020202020204" pitchFamily="34" charset="0"/>
+                <a:cs typeface="Arial" panose="020B0604020202020204" pitchFamily="34" charset="0"/>
+              </a:rPr>
+              <a:t>bodyReservationList</a:t>
+            </a:r>
+            <a:r>
+              <a:rPr lang="de-CH" sz="1000" b="1" dirty="0">
+                <a:solidFill>
+                  <a:schemeClr val="tx1"/>
+                </a:solidFill>
+                <a:latin typeface="Arial" panose="020B0604020202020204" pitchFamily="34" charset="0"/>
+                <a:cs typeface="Arial" panose="020B0604020202020204" pitchFamily="34" charset="0"/>
+              </a:rPr>
+              <a:t>: List code (</a:t>
+            </a:r>
+            <a:r>
+              <a:rPr lang="de-CH" sz="1000" b="1" dirty="0" err="1">
+                <a:solidFill>
+                  <a:schemeClr val="tx1"/>
+                </a:solidFill>
+                <a:latin typeface="Arial" panose="020B0604020202020204" pitchFamily="34" charset="0"/>
+                <a:cs typeface="Arial" panose="020B0604020202020204" pitchFamily="34" charset="0"/>
+              </a:rPr>
+              <a:t>windows.write</a:t>
+            </a:r>
+            <a:r>
+              <a:rPr lang="de-CH" sz="1000" b="1" dirty="0">
+                <a:solidFill>
+                  <a:schemeClr val="tx1"/>
+                </a:solidFill>
+                <a:latin typeface="Arial" panose="020B0604020202020204" pitchFamily="34" charset="0"/>
+                <a:cs typeface="Arial" panose="020B0604020202020204" pitchFamily="34" charset="0"/>
+              </a:rPr>
+              <a:t>)</a:t>
+            </a:r>
+          </a:p>
+          <a:p>
+            <a:r>
+              <a:rPr lang="de-CH" sz="1000" b="1" dirty="0" err="1">
+                <a:solidFill>
+                  <a:schemeClr val="tx1"/>
+                </a:solidFill>
+                <a:latin typeface="Arial" panose="020B0604020202020204" pitchFamily="34" charset="0"/>
+                <a:cs typeface="Arial" panose="020B0604020202020204" pitchFamily="34" charset="0"/>
+              </a:rPr>
+              <a:t>startString</a:t>
+            </a:r>
+            <a:r>
+              <a:rPr lang="de-CH" sz="1000" b="1" dirty="0">
+                <a:solidFill>
+                  <a:schemeClr val="tx1"/>
+                </a:solidFill>
+                <a:latin typeface="Arial" panose="020B0604020202020204" pitchFamily="34" charset="0"/>
+                <a:cs typeface="Arial" panose="020B0604020202020204" pitchFamily="34" charset="0"/>
+              </a:rPr>
+              <a:t>: &lt;</a:t>
+            </a:r>
+            <a:r>
+              <a:rPr lang="de-CH" sz="1000" b="1" dirty="0" err="1">
+                <a:solidFill>
+                  <a:schemeClr val="tx1"/>
+                </a:solidFill>
+                <a:latin typeface="Arial" panose="020B0604020202020204" pitchFamily="34" charset="0"/>
+                <a:cs typeface="Arial" panose="020B0604020202020204" pitchFamily="34" charset="0"/>
+              </a:rPr>
+              <a:t>body</a:t>
+            </a:r>
+            <a:r>
+              <a:rPr lang="de-CH" sz="1000" b="1" dirty="0">
+                <a:solidFill>
+                  <a:schemeClr val="tx1"/>
+                </a:solidFill>
+                <a:latin typeface="Arial" panose="020B0604020202020204" pitchFamily="34" charset="0"/>
+                <a:cs typeface="Arial" panose="020B0604020202020204" pitchFamily="34" charset="0"/>
+              </a:rPr>
+              <a:t>&gt; </a:t>
+            </a:r>
+            <a:r>
+              <a:rPr lang="de-CH" sz="1000" b="1" dirty="0" err="1">
+                <a:solidFill>
+                  <a:schemeClr val="tx1"/>
+                </a:solidFill>
+                <a:latin typeface="Arial" panose="020B0604020202020204" pitchFamily="34" charset="0"/>
+                <a:cs typeface="Arial" panose="020B0604020202020204" pitchFamily="34" charset="0"/>
+              </a:rPr>
+              <a:t>with</a:t>
+            </a:r>
+            <a:r>
+              <a:rPr lang="de-CH" sz="1000" b="1" dirty="0">
+                <a:solidFill>
+                  <a:schemeClr val="tx1"/>
+                </a:solidFill>
+                <a:latin typeface="Arial" panose="020B0604020202020204" pitchFamily="34" charset="0"/>
+                <a:cs typeface="Arial" panose="020B0604020202020204" pitchFamily="34" charset="0"/>
+              </a:rPr>
+              <a:t> </a:t>
+            </a:r>
+            <a:r>
+              <a:rPr lang="de-CH" sz="1000" b="1" dirty="0" err="1">
+                <a:solidFill>
+                  <a:schemeClr val="tx1"/>
+                </a:solidFill>
+                <a:latin typeface="Arial" panose="020B0604020202020204" pitchFamily="34" charset="0"/>
+                <a:cs typeface="Arial" panose="020B0604020202020204" pitchFamily="34" charset="0"/>
+              </a:rPr>
+              <a:t>onload</a:t>
+            </a:r>
+            <a:r>
+              <a:rPr lang="de-CH" sz="1000" b="1" dirty="0">
+                <a:solidFill>
+                  <a:schemeClr val="tx1"/>
+                </a:solidFill>
+                <a:latin typeface="Arial" panose="020B0604020202020204" pitchFamily="34" charset="0"/>
+                <a:cs typeface="Arial" panose="020B0604020202020204" pitchFamily="34" charset="0"/>
+              </a:rPr>
+              <a:t> </a:t>
+            </a:r>
+            <a:r>
+              <a:rPr lang="de-CH" sz="1000" b="1" dirty="0" err="1">
+                <a:solidFill>
+                  <a:schemeClr val="tx1"/>
+                </a:solidFill>
+                <a:latin typeface="Arial" panose="020B0604020202020204" pitchFamily="34" charset="0"/>
+                <a:cs typeface="Arial" panose="020B0604020202020204" pitchFamily="34" charset="0"/>
+              </a:rPr>
+              <a:t>function</a:t>
+            </a:r>
+            <a:r>
+              <a:rPr lang="de-CH" sz="1000" b="1" dirty="0">
+                <a:solidFill>
+                  <a:schemeClr val="tx1"/>
+                </a:solidFill>
+                <a:latin typeface="Arial" panose="020B0604020202020204" pitchFamily="34" charset="0"/>
+                <a:cs typeface="Arial" panose="020B0604020202020204" pitchFamily="34" charset="0"/>
+              </a:rPr>
+              <a:t> </a:t>
+            </a:r>
+            <a:r>
+              <a:rPr lang="de-CH" sz="1000" b="1" dirty="0" err="1">
+                <a:solidFill>
+                  <a:schemeClr val="tx1"/>
+                </a:solidFill>
+                <a:latin typeface="Arial" panose="020B0604020202020204" pitchFamily="34" charset="0"/>
+                <a:cs typeface="Arial" panose="020B0604020202020204" pitchFamily="34" charset="0"/>
+              </a:rPr>
+              <a:t>name</a:t>
+            </a:r>
+            <a:endParaRPr lang="de-CH" sz="1000" b="1" dirty="0">
+              <a:solidFill>
+                <a:schemeClr val="tx1"/>
+              </a:solidFill>
+              <a:latin typeface="Arial" panose="020B0604020202020204" pitchFamily="34" charset="0"/>
+              <a:cs typeface="Arial" panose="020B0604020202020204" pitchFamily="34" charset="0"/>
+            </a:endParaRPr>
+          </a:p>
+          <a:p>
+            <a:endParaRPr lang="de-CH" sz="1000" b="1" dirty="0">
+              <a:solidFill>
+                <a:schemeClr val="tx1"/>
+              </a:solidFill>
+              <a:latin typeface="Arial" panose="020B0604020202020204" pitchFamily="34" charset="0"/>
+              <a:cs typeface="Arial" panose="020B0604020202020204" pitchFamily="34" charset="0"/>
+            </a:endParaRPr>
+          </a:p>
+        </p:txBody>
+      </p:sp>
+      <p:sp>
+        <p:nvSpPr>
+          <p:cNvPr id="13" name="Rechteck 12">
+            <a:extLst>
+              <a:ext uri="{FF2B5EF4-FFF2-40B4-BE49-F238E27FC236}">
+                <a16:creationId xmlns:a16="http://schemas.microsoft.com/office/drawing/2014/main" id="{BB1EDC33-C4F2-D61D-4B4D-12E93C994F16}"/>
+              </a:ext>
+            </a:extLst>
+          </p:cNvPr>
+          <p:cNvSpPr/>
+          <p:nvPr/>
+        </p:nvSpPr>
+        <p:spPr>
+          <a:xfrm>
+            <a:off x="7652099" y="817415"/>
+            <a:ext cx="3245285" cy="756861"/>
+          </a:xfrm>
+          <a:prstGeom prst="rect">
+            <a:avLst/>
+          </a:prstGeom>
+          <a:noFill/>
+          <a:ln w="19050">
+            <a:solidFill>
+              <a:schemeClr val="tx1"/>
+            </a:solidFill>
+          </a:ln>
+        </p:spPr>
+        <p:style>
+          <a:lnRef idx="2">
+            <a:schemeClr val="accent1">
+              <a:shade val="50000"/>
+            </a:schemeClr>
+          </a:lnRef>
+          <a:fillRef idx="1">
+            <a:schemeClr val="accent1"/>
+          </a:fillRef>
+          <a:effectRef idx="0">
+            <a:schemeClr val="accent1"/>
+          </a:effectRef>
+          <a:fontRef idx="minor">
+            <a:schemeClr val="lt1"/>
+          </a:fontRef>
+        </p:style>
+        <p:txBody>
+          <a:bodyPr rtlCol="0" anchor="ctr"/>
+          <a:lstStyle/>
+          <a:p>
+            <a:pPr algn="ctr"/>
+            <a:r>
+              <a:rPr lang="de-CH" dirty="0" err="1">
+                <a:solidFill>
+                  <a:schemeClr val="tx1"/>
+                </a:solidFill>
+                <a:latin typeface="Arial" panose="020B0604020202020204" pitchFamily="34" charset="0"/>
+                <a:cs typeface="Arial" panose="020B0604020202020204" pitchFamily="34" charset="0"/>
+              </a:rPr>
+              <a:t>LayoutScript</a:t>
+            </a:r>
+            <a:endParaRPr lang="de-CH" dirty="0">
+              <a:solidFill>
+                <a:schemeClr val="tx1"/>
+              </a:solidFill>
+              <a:latin typeface="Arial" panose="020B0604020202020204" pitchFamily="34" charset="0"/>
+              <a:cs typeface="Arial" panose="020B0604020202020204" pitchFamily="34" charset="0"/>
+            </a:endParaRPr>
+          </a:p>
+          <a:p>
+            <a:pPr algn="ctr"/>
+            <a:endParaRPr lang="de-CH" sz="800" dirty="0">
+              <a:solidFill>
+                <a:schemeClr val="tx1"/>
+              </a:solidFill>
+              <a:latin typeface="Arial" panose="020B0604020202020204" pitchFamily="34" charset="0"/>
+              <a:cs typeface="Arial" panose="020B0604020202020204" pitchFamily="34" charset="0"/>
+            </a:endParaRPr>
+          </a:p>
+          <a:p>
+            <a:pPr algn="ctr"/>
+            <a:r>
+              <a:rPr lang="de-CH" sz="1200" dirty="0" err="1">
+                <a:solidFill>
+                  <a:schemeClr val="tx1"/>
+                </a:solidFill>
+                <a:latin typeface="Arial" panose="020B0604020202020204" pitchFamily="34" charset="0"/>
+                <a:cs typeface="Arial" panose="020B0604020202020204" pitchFamily="34" charset="0"/>
+              </a:rPr>
+              <a:t>Creates</a:t>
+            </a:r>
+            <a:r>
+              <a:rPr lang="de-CH" sz="1200" dirty="0">
+                <a:solidFill>
+                  <a:schemeClr val="tx1"/>
+                </a:solidFill>
+                <a:latin typeface="Arial" panose="020B0604020202020204" pitchFamily="34" charset="0"/>
+                <a:cs typeface="Arial" panose="020B0604020202020204" pitchFamily="34" charset="0"/>
+              </a:rPr>
+              <a:t> </a:t>
+            </a:r>
+            <a:r>
+              <a:rPr lang="de-CH" sz="1200" dirty="0" err="1">
+                <a:solidFill>
+                  <a:schemeClr val="tx1"/>
+                </a:solidFill>
+                <a:latin typeface="Arial" panose="020B0604020202020204" pitchFamily="34" charset="0"/>
+                <a:cs typeface="Arial" panose="020B0604020202020204" pitchFamily="34" charset="0"/>
+              </a:rPr>
+              <a:t>the</a:t>
+            </a:r>
+            <a:r>
+              <a:rPr lang="de-CH" sz="1200" dirty="0">
+                <a:solidFill>
+                  <a:schemeClr val="tx1"/>
+                </a:solidFill>
+                <a:latin typeface="Arial" panose="020B0604020202020204" pitchFamily="34" charset="0"/>
+                <a:cs typeface="Arial" panose="020B0604020202020204" pitchFamily="34" charset="0"/>
+              </a:rPr>
+              <a:t> &lt;</a:t>
+            </a:r>
+            <a:r>
+              <a:rPr lang="de-CH" sz="1200" dirty="0" err="1">
+                <a:solidFill>
+                  <a:schemeClr val="tx1"/>
+                </a:solidFill>
+                <a:latin typeface="Arial" panose="020B0604020202020204" pitchFamily="34" charset="0"/>
+                <a:cs typeface="Arial" panose="020B0604020202020204" pitchFamily="34" charset="0"/>
+              </a:rPr>
+              <a:t>header</a:t>
+            </a:r>
+            <a:r>
+              <a:rPr lang="de-CH" sz="1200" dirty="0">
+                <a:solidFill>
+                  <a:schemeClr val="tx1"/>
+                </a:solidFill>
+                <a:latin typeface="Arial" panose="020B0604020202020204" pitchFamily="34" charset="0"/>
+                <a:cs typeface="Arial" panose="020B0604020202020204" pitchFamily="34" charset="0"/>
+              </a:rPr>
+              <a:t>&gt; &lt;</a:t>
+            </a:r>
+            <a:r>
+              <a:rPr lang="de-CH" sz="1200" dirty="0" err="1">
+                <a:solidFill>
+                  <a:schemeClr val="tx1"/>
+                </a:solidFill>
+                <a:latin typeface="Arial" panose="020B0604020202020204" pitchFamily="34" charset="0"/>
+                <a:cs typeface="Arial" panose="020B0604020202020204" pitchFamily="34" charset="0"/>
+              </a:rPr>
+              <a:t>script</a:t>
+            </a:r>
+            <a:r>
+              <a:rPr lang="de-CH" sz="1200" dirty="0">
+                <a:solidFill>
+                  <a:schemeClr val="tx1"/>
+                </a:solidFill>
+                <a:latin typeface="Arial" panose="020B0604020202020204" pitchFamily="34" charset="0"/>
+                <a:cs typeface="Arial" panose="020B0604020202020204" pitchFamily="34" charset="0"/>
+              </a:rPr>
+              <a:t>&gt;  code</a:t>
+            </a:r>
+          </a:p>
+        </p:txBody>
+      </p:sp>
+      <p:sp>
+        <p:nvSpPr>
+          <p:cNvPr id="14" name="Rechteck 13">
+            <a:extLst>
+              <a:ext uri="{FF2B5EF4-FFF2-40B4-BE49-F238E27FC236}">
+                <a16:creationId xmlns:a16="http://schemas.microsoft.com/office/drawing/2014/main" id="{E1214645-7643-34D7-A504-BDD07B87DA0F}"/>
+              </a:ext>
+            </a:extLst>
+          </p:cNvPr>
+          <p:cNvSpPr/>
+          <p:nvPr/>
+        </p:nvSpPr>
+        <p:spPr>
+          <a:xfrm>
+            <a:off x="7652098" y="1574276"/>
+            <a:ext cx="3245286" cy="2988297"/>
+          </a:xfrm>
+          <a:prstGeom prst="rect">
+            <a:avLst/>
+          </a:prstGeom>
+          <a:noFill/>
+          <a:ln w="19050">
+            <a:solidFill>
+              <a:schemeClr val="tx1"/>
+            </a:solidFill>
+          </a:ln>
+        </p:spPr>
+        <p:style>
+          <a:lnRef idx="2">
+            <a:schemeClr val="accent1">
+              <a:shade val="50000"/>
+            </a:schemeClr>
+          </a:lnRef>
+          <a:fillRef idx="1">
+            <a:schemeClr val="accent1"/>
+          </a:fillRef>
+          <a:effectRef idx="0">
+            <a:schemeClr val="accent1"/>
+          </a:effectRef>
+          <a:fontRef idx="minor">
+            <a:schemeClr val="lt1"/>
+          </a:fontRef>
+        </p:style>
+        <p:txBody>
+          <a:bodyPr rtlCol="0" anchor="ctr"/>
+          <a:lstStyle/>
+          <a:p>
+            <a:r>
+              <a:rPr lang="en-US" sz="1200" dirty="0">
+                <a:solidFill>
+                  <a:schemeClr val="tx1"/>
+                </a:solidFill>
+                <a:latin typeface="Arial" panose="020B0604020202020204" pitchFamily="34" charset="0"/>
+                <a:cs typeface="Arial" panose="020B0604020202020204" pitchFamily="34" charset="0"/>
+              </a:rPr>
+              <a:t>Member variables</a:t>
+            </a:r>
+          </a:p>
+          <a:p>
+            <a:r>
+              <a:rPr lang="en-US" sz="1000" b="1" dirty="0" err="1">
+                <a:solidFill>
+                  <a:schemeClr val="tx1"/>
+                </a:solidFill>
+                <a:latin typeface="Arial" panose="020B0604020202020204" pitchFamily="34" charset="0"/>
+                <a:cs typeface="Arial" panose="020B0604020202020204" pitchFamily="34" charset="0"/>
+              </a:rPr>
+              <a:t>m_layout_xml</a:t>
+            </a:r>
+            <a:endParaRPr lang="en-US" sz="1000" b="1" dirty="0">
+              <a:solidFill>
+                <a:schemeClr val="tx1"/>
+              </a:solidFill>
+              <a:latin typeface="Arial" panose="020B0604020202020204" pitchFamily="34" charset="0"/>
+              <a:cs typeface="Arial" panose="020B0604020202020204" pitchFamily="34" charset="0"/>
+            </a:endParaRPr>
+          </a:p>
+          <a:p>
+            <a:r>
+              <a:rPr lang="en-US" sz="1000" b="1" dirty="0" err="1">
+                <a:solidFill>
+                  <a:schemeClr val="tx1"/>
+                </a:solidFill>
+                <a:latin typeface="Arial" panose="020B0604020202020204" pitchFamily="34" charset="0"/>
+                <a:cs typeface="Arial" panose="020B0604020202020204" pitchFamily="34" charset="0"/>
+              </a:rPr>
+              <a:t>m_output_dir</a:t>
+            </a:r>
+            <a:endParaRPr lang="en-US" sz="1000" b="1" dirty="0">
+              <a:solidFill>
+                <a:schemeClr val="tx1"/>
+              </a:solidFill>
+              <a:latin typeface="Arial" panose="020B0604020202020204" pitchFamily="34" charset="0"/>
+              <a:cs typeface="Arial" panose="020B0604020202020204" pitchFamily="34" charset="0"/>
+            </a:endParaRPr>
+          </a:p>
+          <a:p>
+            <a:r>
+              <a:rPr lang="en-US" sz="1000" b="1" dirty="0" err="1">
+                <a:solidFill>
+                  <a:schemeClr val="tx1"/>
+                </a:solidFill>
+                <a:latin typeface="Arial" panose="020B0604020202020204" pitchFamily="34" charset="0"/>
+                <a:cs typeface="Arial" panose="020B0604020202020204" pitchFamily="34" charset="0"/>
+              </a:rPr>
+              <a:t>m_layout_file_case</a:t>
+            </a:r>
+            <a:endParaRPr lang="en-US" sz="1000" b="1" dirty="0">
+              <a:solidFill>
+                <a:schemeClr val="tx1"/>
+              </a:solidFill>
+              <a:latin typeface="Arial" panose="020B0604020202020204" pitchFamily="34" charset="0"/>
+              <a:cs typeface="Arial" panose="020B0604020202020204" pitchFamily="34" charset="0"/>
+            </a:endParaRPr>
+          </a:p>
+          <a:p>
+            <a:r>
+              <a:rPr lang="en-US" sz="1000" b="1" dirty="0" err="1">
+                <a:solidFill>
+                  <a:schemeClr val="tx1"/>
+                </a:solidFill>
+                <a:latin typeface="Arial" panose="020B0604020202020204" pitchFamily="34" charset="0"/>
+                <a:cs typeface="Arial" panose="020B0604020202020204" pitchFamily="34" charset="0"/>
+              </a:rPr>
+              <a:t>m_html_script_code</a:t>
+            </a:r>
+            <a:endParaRPr lang="en-US" sz="1000" b="1" dirty="0">
+              <a:solidFill>
+                <a:schemeClr val="tx1"/>
+              </a:solidFill>
+              <a:latin typeface="Arial" panose="020B0604020202020204" pitchFamily="34" charset="0"/>
+              <a:cs typeface="Arial" panose="020B0604020202020204" pitchFamily="34" charset="0"/>
+            </a:endParaRPr>
+          </a:p>
+          <a:p>
+            <a:endParaRPr lang="en-US" sz="1000" b="1" dirty="0">
+              <a:solidFill>
+                <a:schemeClr val="tx1"/>
+              </a:solidFill>
+              <a:latin typeface="Arial" panose="020B0604020202020204" pitchFamily="34" charset="0"/>
+              <a:cs typeface="Arial" panose="020B0604020202020204" pitchFamily="34" charset="0"/>
+            </a:endParaRPr>
+          </a:p>
+          <a:p>
+            <a:r>
+              <a:rPr lang="en-US" sz="1200" dirty="0">
+                <a:solidFill>
+                  <a:schemeClr val="tx1"/>
+                </a:solidFill>
+                <a:latin typeface="Arial" panose="020B0604020202020204" pitchFamily="34" charset="0"/>
+                <a:cs typeface="Arial" panose="020B0604020202020204" pitchFamily="34" charset="0"/>
+              </a:rPr>
+              <a:t>Member functions</a:t>
+            </a:r>
+          </a:p>
+          <a:p>
+            <a:r>
+              <a:rPr lang="de-CH" sz="1000" b="1" dirty="0" err="1">
+                <a:solidFill>
+                  <a:schemeClr val="tx1"/>
+                </a:solidFill>
+                <a:latin typeface="Arial" panose="020B0604020202020204" pitchFamily="34" charset="0"/>
+                <a:cs typeface="Arial" panose="020B0604020202020204" pitchFamily="34" charset="0"/>
+              </a:rPr>
+              <a:t>execute</a:t>
+            </a:r>
+            <a:r>
+              <a:rPr lang="de-CH" sz="1000" b="1" dirty="0">
+                <a:solidFill>
+                  <a:schemeClr val="tx1"/>
+                </a:solidFill>
+                <a:latin typeface="Arial" panose="020B0604020202020204" pitchFamily="34" charset="0"/>
+                <a:cs typeface="Arial" panose="020B0604020202020204" pitchFamily="34" charset="0"/>
+              </a:rPr>
+              <a:t>: </a:t>
+            </a:r>
+            <a:r>
+              <a:rPr lang="de-CH" sz="1000" b="1" dirty="0" err="1">
+                <a:solidFill>
+                  <a:schemeClr val="tx1"/>
+                </a:solidFill>
+                <a:latin typeface="Arial" panose="020B0604020202020204" pitchFamily="34" charset="0"/>
+                <a:cs typeface="Arial" panose="020B0604020202020204" pitchFamily="34" charset="0"/>
+              </a:rPr>
+              <a:t>Creates</a:t>
+            </a:r>
+            <a:r>
+              <a:rPr lang="de-CH" sz="1000" b="1" dirty="0">
+                <a:solidFill>
+                  <a:schemeClr val="tx1"/>
+                </a:solidFill>
+                <a:latin typeface="Arial" panose="020B0604020202020204" pitchFamily="34" charset="0"/>
+                <a:cs typeface="Arial" panose="020B0604020202020204" pitchFamily="34" charset="0"/>
+              </a:rPr>
+              <a:t> </a:t>
+            </a:r>
+            <a:r>
+              <a:rPr lang="de-CH" sz="1000" b="1" dirty="0" err="1">
+                <a:solidFill>
+                  <a:schemeClr val="tx1"/>
+                </a:solidFill>
+                <a:latin typeface="Arial" panose="020B0604020202020204" pitchFamily="34" charset="0"/>
+                <a:cs typeface="Arial" panose="020B0604020202020204" pitchFamily="34" charset="0"/>
+              </a:rPr>
+              <a:t>the</a:t>
+            </a:r>
+            <a:r>
+              <a:rPr lang="de-CH" sz="1000" b="1" dirty="0">
+                <a:solidFill>
+                  <a:schemeClr val="tx1"/>
+                </a:solidFill>
+                <a:latin typeface="Arial" panose="020B0604020202020204" pitchFamily="34" charset="0"/>
+                <a:cs typeface="Arial" panose="020B0604020202020204" pitchFamily="34" charset="0"/>
+              </a:rPr>
+              <a:t> JavaScript code </a:t>
+            </a:r>
+          </a:p>
+          <a:p>
+            <a:r>
+              <a:rPr lang="de-CH" sz="1000" b="1" dirty="0" err="1">
+                <a:solidFill>
+                  <a:schemeClr val="tx1"/>
+                </a:solidFill>
+                <a:latin typeface="Arial" panose="020B0604020202020204" pitchFamily="34" charset="0"/>
+                <a:cs typeface="Arial" panose="020B0604020202020204" pitchFamily="34" charset="0"/>
+              </a:rPr>
+              <a:t>get</a:t>
+            </a:r>
+            <a:r>
+              <a:rPr lang="de-CH" sz="1000" b="1" dirty="0">
+                <a:solidFill>
+                  <a:schemeClr val="tx1"/>
+                </a:solidFill>
+                <a:latin typeface="Arial" panose="020B0604020202020204" pitchFamily="34" charset="0"/>
+                <a:cs typeface="Arial" panose="020B0604020202020204" pitchFamily="34" charset="0"/>
+              </a:rPr>
+              <a:t>:         Returns </a:t>
+            </a:r>
+            <a:r>
+              <a:rPr lang="de-CH" sz="1000" b="1" dirty="0" err="1">
+                <a:solidFill>
+                  <a:schemeClr val="tx1"/>
+                </a:solidFill>
+                <a:latin typeface="Arial" panose="020B0604020202020204" pitchFamily="34" charset="0"/>
+                <a:cs typeface="Arial" panose="020B0604020202020204" pitchFamily="34" charset="0"/>
+              </a:rPr>
+              <a:t>the</a:t>
+            </a:r>
+            <a:r>
+              <a:rPr lang="de-CH" sz="1000" b="1" dirty="0">
+                <a:solidFill>
+                  <a:schemeClr val="tx1"/>
+                </a:solidFill>
+                <a:latin typeface="Arial" panose="020B0604020202020204" pitchFamily="34" charset="0"/>
+                <a:cs typeface="Arial" panose="020B0604020202020204" pitchFamily="34" charset="0"/>
+              </a:rPr>
+              <a:t> JavaScript code</a:t>
+            </a:r>
+          </a:p>
+          <a:p>
+            <a:r>
+              <a:rPr lang="de-CH" sz="1000" b="1" dirty="0" err="1">
+                <a:solidFill>
+                  <a:schemeClr val="tx1"/>
+                </a:solidFill>
+                <a:latin typeface="Arial" panose="020B0604020202020204" pitchFamily="34" charset="0"/>
+                <a:cs typeface="Arial" panose="020B0604020202020204" pitchFamily="34" charset="0"/>
+              </a:rPr>
+              <a:t>addIncludeJavaScripts</a:t>
+            </a:r>
+            <a:r>
+              <a:rPr lang="de-CH" sz="1000" b="1" dirty="0">
+                <a:solidFill>
+                  <a:schemeClr val="tx1"/>
+                </a:solidFill>
+                <a:latin typeface="Arial" panose="020B0604020202020204" pitchFamily="34" charset="0"/>
+                <a:cs typeface="Arial" panose="020B0604020202020204" pitchFamily="34" charset="0"/>
+              </a:rPr>
+              <a:t>: </a:t>
+            </a:r>
+            <a:r>
+              <a:rPr lang="de-CH" sz="1000" b="1" dirty="0" err="1">
+                <a:solidFill>
+                  <a:schemeClr val="tx1"/>
+                </a:solidFill>
+                <a:latin typeface="Arial" panose="020B0604020202020204" pitchFamily="34" charset="0"/>
+                <a:cs typeface="Arial" panose="020B0604020202020204" pitchFamily="34" charset="0"/>
+              </a:rPr>
+              <a:t>Adds</a:t>
+            </a:r>
+            <a:r>
+              <a:rPr lang="de-CH" sz="1000" b="1" dirty="0">
+                <a:solidFill>
+                  <a:schemeClr val="tx1"/>
+                </a:solidFill>
+                <a:latin typeface="Arial" panose="020B0604020202020204" pitchFamily="34" charset="0"/>
+                <a:cs typeface="Arial" panose="020B0604020202020204" pitchFamily="34" charset="0"/>
+              </a:rPr>
+              <a:t> </a:t>
+            </a:r>
+            <a:r>
+              <a:rPr lang="de-CH" sz="1000" b="1" dirty="0" err="1">
+                <a:solidFill>
+                  <a:schemeClr val="tx1"/>
+                </a:solidFill>
+                <a:latin typeface="Arial" panose="020B0604020202020204" pitchFamily="34" charset="0"/>
+                <a:cs typeface="Arial" panose="020B0604020202020204" pitchFamily="34" charset="0"/>
+              </a:rPr>
+              <a:t>include</a:t>
+            </a:r>
+            <a:r>
+              <a:rPr lang="de-CH" sz="1000" b="1" dirty="0">
+                <a:solidFill>
+                  <a:schemeClr val="tx1"/>
+                </a:solidFill>
+                <a:latin typeface="Arial" panose="020B0604020202020204" pitchFamily="34" charset="0"/>
+                <a:cs typeface="Arial" panose="020B0604020202020204" pitchFamily="34" charset="0"/>
+              </a:rPr>
+              <a:t> </a:t>
+            </a:r>
+            <a:r>
+              <a:rPr lang="de-CH" sz="1000" b="1" dirty="0" err="1">
+                <a:solidFill>
+                  <a:schemeClr val="tx1"/>
+                </a:solidFill>
+                <a:latin typeface="Arial" panose="020B0604020202020204" pitchFamily="34" charset="0"/>
+                <a:cs typeface="Arial" panose="020B0604020202020204" pitchFamily="34" charset="0"/>
+              </a:rPr>
+              <a:t>files</a:t>
+            </a:r>
+            <a:endParaRPr lang="de-CH" sz="1000" b="1" dirty="0">
+              <a:solidFill>
+                <a:schemeClr val="tx1"/>
+              </a:solidFill>
+              <a:latin typeface="Arial" panose="020B0604020202020204" pitchFamily="34" charset="0"/>
+              <a:cs typeface="Arial" panose="020B0604020202020204" pitchFamily="34" charset="0"/>
+            </a:endParaRPr>
+          </a:p>
+          <a:p>
+            <a:r>
+              <a:rPr lang="de-CH" sz="1000" b="1" dirty="0" err="1">
+                <a:solidFill>
+                  <a:schemeClr val="tx1"/>
+                </a:solidFill>
+                <a:latin typeface="Arial" panose="020B0604020202020204" pitchFamily="34" charset="0"/>
+                <a:cs typeface="Arial" panose="020B0604020202020204" pitchFamily="34" charset="0"/>
+              </a:rPr>
+              <a:t>setEventFunctions</a:t>
+            </a:r>
+            <a:r>
+              <a:rPr lang="de-CH" sz="1000" b="1" dirty="0">
+                <a:solidFill>
+                  <a:schemeClr val="tx1"/>
+                </a:solidFill>
+                <a:latin typeface="Arial" panose="020B0604020202020204" pitchFamily="34" charset="0"/>
+                <a:cs typeface="Arial" panose="020B0604020202020204" pitchFamily="34" charset="0"/>
+              </a:rPr>
+              <a:t>: Seat </a:t>
+            </a:r>
+            <a:r>
+              <a:rPr lang="de-CH" sz="1000" b="1" dirty="0" err="1">
+                <a:solidFill>
+                  <a:schemeClr val="tx1"/>
+                </a:solidFill>
+                <a:latin typeface="Arial" panose="020B0604020202020204" pitchFamily="34" charset="0"/>
+                <a:cs typeface="Arial" panose="020B0604020202020204" pitchFamily="34" charset="0"/>
+              </a:rPr>
+              <a:t>event</a:t>
+            </a:r>
+            <a:r>
+              <a:rPr lang="de-CH" sz="1000" b="1" dirty="0">
+                <a:solidFill>
+                  <a:schemeClr val="tx1"/>
+                </a:solidFill>
+                <a:latin typeface="Arial" panose="020B0604020202020204" pitchFamily="34" charset="0"/>
+                <a:cs typeface="Arial" panose="020B0604020202020204" pitchFamily="34" charset="0"/>
+              </a:rPr>
+              <a:t> </a:t>
+            </a:r>
+            <a:r>
+              <a:rPr lang="de-CH" sz="1000" b="1" dirty="0" err="1">
+                <a:solidFill>
+                  <a:schemeClr val="tx1"/>
+                </a:solidFill>
+                <a:latin typeface="Arial" panose="020B0604020202020204" pitchFamily="34" charset="0"/>
+                <a:cs typeface="Arial" panose="020B0604020202020204" pitchFamily="34" charset="0"/>
+              </a:rPr>
+              <a:t>functions</a:t>
+            </a:r>
+            <a:r>
+              <a:rPr lang="de-CH" sz="1000" b="1" dirty="0">
+                <a:solidFill>
+                  <a:schemeClr val="tx1"/>
+                </a:solidFill>
+                <a:latin typeface="Arial" panose="020B0604020202020204" pitchFamily="34" charset="0"/>
+                <a:cs typeface="Arial" panose="020B0604020202020204" pitchFamily="34" charset="0"/>
+              </a:rPr>
+              <a:t> code</a:t>
+            </a:r>
+          </a:p>
+          <a:p>
+            <a:r>
+              <a:rPr lang="de-CH" sz="1000" b="1" dirty="0" err="1">
+                <a:solidFill>
+                  <a:schemeClr val="tx1"/>
+                </a:solidFill>
+                <a:latin typeface="Arial" panose="020B0604020202020204" pitchFamily="34" charset="0"/>
+                <a:cs typeface="Arial" panose="020B0604020202020204" pitchFamily="34" charset="0"/>
+              </a:rPr>
+              <a:t>setMouseDownMouseOver</a:t>
+            </a:r>
+            <a:r>
+              <a:rPr lang="de-CH" sz="1000" b="1" dirty="0">
+                <a:solidFill>
+                  <a:schemeClr val="tx1"/>
+                </a:solidFill>
+                <a:latin typeface="Arial" panose="020B0604020202020204" pitchFamily="34" charset="0"/>
+                <a:cs typeface="Arial" panose="020B0604020202020204" pitchFamily="34" charset="0"/>
+              </a:rPr>
+              <a:t>: Mouse </a:t>
+            </a:r>
+            <a:r>
+              <a:rPr lang="de-CH" sz="1000" b="1" dirty="0" err="1">
+                <a:solidFill>
+                  <a:schemeClr val="tx1"/>
+                </a:solidFill>
+                <a:latin typeface="Arial" panose="020B0604020202020204" pitchFamily="34" charset="0"/>
+                <a:cs typeface="Arial" panose="020B0604020202020204" pitchFamily="34" charset="0"/>
+              </a:rPr>
+              <a:t>events</a:t>
+            </a:r>
+            <a:endParaRPr lang="de-CH" sz="1000" b="1" dirty="0">
+              <a:solidFill>
+                <a:schemeClr val="tx1"/>
+              </a:solidFill>
+              <a:latin typeface="Arial" panose="020B0604020202020204" pitchFamily="34" charset="0"/>
+              <a:cs typeface="Arial" panose="020B0604020202020204" pitchFamily="34" charset="0"/>
+            </a:endParaRPr>
+          </a:p>
+          <a:p>
+            <a:r>
+              <a:rPr lang="de-CH" sz="1000" b="1" dirty="0" err="1">
+                <a:solidFill>
+                  <a:schemeClr val="tx1"/>
+                </a:solidFill>
+                <a:latin typeface="Arial" panose="020B0604020202020204" pitchFamily="34" charset="0"/>
+                <a:cs typeface="Arial" panose="020B0604020202020204" pitchFamily="34" charset="0"/>
+              </a:rPr>
+              <a:t>getSeatEventFunctions</a:t>
+            </a:r>
+            <a:r>
+              <a:rPr lang="de-CH" sz="1000" b="1" dirty="0">
+                <a:solidFill>
+                  <a:schemeClr val="tx1"/>
+                </a:solidFill>
+                <a:latin typeface="Arial" panose="020B0604020202020204" pitchFamily="34" charset="0"/>
+                <a:cs typeface="Arial" panose="020B0604020202020204" pitchFamily="34" charset="0"/>
+              </a:rPr>
+              <a:t>: </a:t>
+            </a:r>
+            <a:r>
+              <a:rPr lang="de-CH" sz="1000" b="1" dirty="0" err="1">
+                <a:solidFill>
+                  <a:schemeClr val="tx1"/>
+                </a:solidFill>
+                <a:latin typeface="Arial" panose="020B0604020202020204" pitchFamily="34" charset="0"/>
+                <a:cs typeface="Arial" panose="020B0604020202020204" pitchFamily="34" charset="0"/>
+              </a:rPr>
+              <a:t>Get</a:t>
+            </a:r>
+            <a:r>
+              <a:rPr lang="de-CH" sz="1000" b="1" dirty="0">
+                <a:solidFill>
+                  <a:schemeClr val="tx1"/>
+                </a:solidFill>
+                <a:latin typeface="Arial" panose="020B0604020202020204" pitchFamily="34" charset="0"/>
+                <a:cs typeface="Arial" panose="020B0604020202020204" pitchFamily="34" charset="0"/>
+              </a:rPr>
+              <a:t> </a:t>
+            </a:r>
+            <a:r>
+              <a:rPr lang="de-CH" sz="1000" b="1" dirty="0" err="1">
+                <a:solidFill>
+                  <a:schemeClr val="tx1"/>
+                </a:solidFill>
+                <a:latin typeface="Arial" panose="020B0604020202020204" pitchFamily="34" charset="0"/>
+                <a:cs typeface="Arial" panose="020B0604020202020204" pitchFamily="34" charset="0"/>
+              </a:rPr>
+              <a:t>seat</a:t>
+            </a:r>
+            <a:r>
+              <a:rPr lang="de-CH" sz="1000" b="1" dirty="0">
+                <a:solidFill>
+                  <a:schemeClr val="tx1"/>
+                </a:solidFill>
+                <a:latin typeface="Arial" panose="020B0604020202020204" pitchFamily="34" charset="0"/>
+                <a:cs typeface="Arial" panose="020B0604020202020204" pitchFamily="34" charset="0"/>
+              </a:rPr>
+              <a:t> </a:t>
+            </a:r>
+            <a:r>
+              <a:rPr lang="de-CH" sz="1000" b="1" dirty="0" err="1">
+                <a:solidFill>
+                  <a:schemeClr val="tx1"/>
+                </a:solidFill>
+                <a:latin typeface="Arial" panose="020B0604020202020204" pitchFamily="34" charset="0"/>
+                <a:cs typeface="Arial" panose="020B0604020202020204" pitchFamily="34" charset="0"/>
+              </a:rPr>
+              <a:t>mouse</a:t>
+            </a:r>
+            <a:r>
+              <a:rPr lang="de-CH" sz="1000" b="1" dirty="0">
+                <a:solidFill>
+                  <a:schemeClr val="tx1"/>
+                </a:solidFill>
+                <a:latin typeface="Arial" panose="020B0604020202020204" pitchFamily="34" charset="0"/>
+                <a:cs typeface="Arial" panose="020B0604020202020204" pitchFamily="34" charset="0"/>
+              </a:rPr>
+              <a:t> </a:t>
+            </a:r>
+            <a:r>
+              <a:rPr lang="de-CH" sz="1000" b="1" dirty="0" err="1">
+                <a:solidFill>
+                  <a:schemeClr val="tx1"/>
+                </a:solidFill>
+                <a:latin typeface="Arial" panose="020B0604020202020204" pitchFamily="34" charset="0"/>
+                <a:cs typeface="Arial" panose="020B0604020202020204" pitchFamily="34" charset="0"/>
+              </a:rPr>
+              <a:t>functions</a:t>
+            </a:r>
+            <a:endParaRPr lang="de-CH" sz="1000" b="1" dirty="0">
+              <a:solidFill>
+                <a:schemeClr val="tx1"/>
+              </a:solidFill>
+              <a:latin typeface="Arial" panose="020B0604020202020204" pitchFamily="34" charset="0"/>
+              <a:cs typeface="Arial" panose="020B0604020202020204" pitchFamily="34" charset="0"/>
+            </a:endParaRPr>
+          </a:p>
+          <a:p>
+            <a:r>
+              <a:rPr lang="de-CH" sz="1000" b="1" dirty="0" err="1">
+                <a:solidFill>
+                  <a:schemeClr val="tx1"/>
+                </a:solidFill>
+                <a:latin typeface="Arial" panose="020B0604020202020204" pitchFamily="34" charset="0"/>
+                <a:cs typeface="Arial" panose="020B0604020202020204" pitchFamily="34" charset="0"/>
+              </a:rPr>
+              <a:t>mainFunction</a:t>
+            </a:r>
+            <a:r>
+              <a:rPr lang="de-CH" sz="1000" b="1" dirty="0">
+                <a:solidFill>
+                  <a:schemeClr val="tx1"/>
+                </a:solidFill>
+                <a:latin typeface="Arial" panose="020B0604020202020204" pitchFamily="34" charset="0"/>
+                <a:cs typeface="Arial" panose="020B0604020202020204" pitchFamily="34" charset="0"/>
+              </a:rPr>
+              <a:t>: Main (</a:t>
+            </a:r>
+            <a:r>
+              <a:rPr lang="de-CH" sz="1000" b="1" dirty="0" err="1">
+                <a:solidFill>
+                  <a:schemeClr val="tx1"/>
+                </a:solidFill>
+                <a:latin typeface="Arial" panose="020B0604020202020204" pitchFamily="34" charset="0"/>
+                <a:cs typeface="Arial" panose="020B0604020202020204" pitchFamily="34" charset="0"/>
+              </a:rPr>
+              <a:t>onload</a:t>
+            </a:r>
+            <a:r>
+              <a:rPr lang="de-CH" sz="1000" b="1" dirty="0">
+                <a:solidFill>
+                  <a:schemeClr val="tx1"/>
+                </a:solidFill>
+                <a:latin typeface="Arial" panose="020B0604020202020204" pitchFamily="34" charset="0"/>
+                <a:cs typeface="Arial" panose="020B0604020202020204" pitchFamily="34" charset="0"/>
+              </a:rPr>
+              <a:t>) </a:t>
+            </a:r>
+            <a:r>
+              <a:rPr lang="de-CH" sz="1000" b="1" dirty="0" err="1">
+                <a:solidFill>
+                  <a:schemeClr val="tx1"/>
+                </a:solidFill>
+                <a:latin typeface="Arial" panose="020B0604020202020204" pitchFamily="34" charset="0"/>
+                <a:cs typeface="Arial" panose="020B0604020202020204" pitchFamily="34" charset="0"/>
+              </a:rPr>
+              <a:t>function</a:t>
+            </a:r>
+            <a:r>
+              <a:rPr lang="de-CH" sz="1000" b="1" dirty="0">
+                <a:solidFill>
+                  <a:schemeClr val="tx1"/>
+                </a:solidFill>
+                <a:latin typeface="Arial" panose="020B0604020202020204" pitchFamily="34" charset="0"/>
+                <a:cs typeface="Arial" panose="020B0604020202020204" pitchFamily="34" charset="0"/>
+              </a:rPr>
+              <a:t> code</a:t>
+            </a:r>
+          </a:p>
+          <a:p>
+            <a:r>
+              <a:rPr lang="de-CH" sz="1000" b="1" dirty="0" err="1">
+                <a:solidFill>
+                  <a:schemeClr val="tx1"/>
+                </a:solidFill>
+                <a:latin typeface="Arial" panose="020B0604020202020204" pitchFamily="34" charset="0"/>
+                <a:cs typeface="Arial" panose="020B0604020202020204" pitchFamily="34" charset="0"/>
+              </a:rPr>
+              <a:t>noScript</a:t>
+            </a:r>
+            <a:r>
+              <a:rPr lang="de-CH" sz="1000" b="1" dirty="0">
+                <a:solidFill>
+                  <a:schemeClr val="tx1"/>
+                </a:solidFill>
+                <a:latin typeface="Arial" panose="020B0604020202020204" pitchFamily="34" charset="0"/>
+                <a:cs typeface="Arial" panose="020B0604020202020204" pitchFamily="34" charset="0"/>
+              </a:rPr>
+              <a:t>: </a:t>
+            </a:r>
+            <a:r>
+              <a:rPr lang="de-CH" sz="1000" b="1" dirty="0" err="1">
+                <a:solidFill>
+                  <a:schemeClr val="tx1"/>
+                </a:solidFill>
+                <a:latin typeface="Arial" panose="020B0604020202020204" pitchFamily="34" charset="0"/>
+                <a:cs typeface="Arial" panose="020B0604020202020204" pitchFamily="34" charset="0"/>
+              </a:rPr>
+              <a:t>Instructions</a:t>
+            </a:r>
+            <a:r>
+              <a:rPr lang="de-CH" sz="1000" b="1" dirty="0">
+                <a:solidFill>
+                  <a:schemeClr val="tx1"/>
+                </a:solidFill>
+                <a:latin typeface="Arial" panose="020B0604020202020204" pitchFamily="34" charset="0"/>
+                <a:cs typeface="Arial" panose="020B0604020202020204" pitchFamily="34" charset="0"/>
+              </a:rPr>
+              <a:t> JavaScript not </a:t>
+            </a:r>
+            <a:r>
+              <a:rPr lang="de-CH" sz="1000" b="1" dirty="0" err="1">
+                <a:solidFill>
+                  <a:schemeClr val="tx1"/>
+                </a:solidFill>
+                <a:latin typeface="Arial" panose="020B0604020202020204" pitchFamily="34" charset="0"/>
+                <a:cs typeface="Arial" panose="020B0604020202020204" pitchFamily="34" charset="0"/>
+              </a:rPr>
+              <a:t>allowed</a:t>
+            </a:r>
+            <a:endParaRPr lang="de-CH" sz="1000" b="1" dirty="0">
+              <a:solidFill>
+                <a:schemeClr val="tx1"/>
+              </a:solidFill>
+              <a:latin typeface="Arial" panose="020B0604020202020204" pitchFamily="34" charset="0"/>
+              <a:cs typeface="Arial" panose="020B0604020202020204" pitchFamily="34" charset="0"/>
+            </a:endParaRPr>
+          </a:p>
+          <a:p>
+            <a:r>
+              <a:rPr lang="de-CH" sz="1000" b="1" dirty="0" err="1">
+                <a:solidFill>
+                  <a:schemeClr val="tx1"/>
+                </a:solidFill>
+                <a:latin typeface="Arial" panose="020B0604020202020204" pitchFamily="34" charset="0"/>
+                <a:cs typeface="Arial" panose="020B0604020202020204" pitchFamily="34" charset="0"/>
+              </a:rPr>
+              <a:t>tempMainComments</a:t>
+            </a:r>
+            <a:r>
+              <a:rPr lang="de-CH" sz="1000" b="1" dirty="0">
+                <a:solidFill>
+                  <a:schemeClr val="tx1"/>
+                </a:solidFill>
+                <a:latin typeface="Arial" panose="020B0604020202020204" pitchFamily="34" charset="0"/>
+                <a:cs typeface="Arial" panose="020B0604020202020204" pitchFamily="34" charset="0"/>
+              </a:rPr>
+              <a:t>: </a:t>
+            </a:r>
+            <a:r>
+              <a:rPr lang="de-CH" sz="1000" b="1" dirty="0" err="1">
+                <a:solidFill>
+                  <a:schemeClr val="tx1"/>
+                </a:solidFill>
+                <a:latin typeface="Arial" panose="020B0604020202020204" pitchFamily="34" charset="0"/>
+                <a:cs typeface="Arial" panose="020B0604020202020204" pitchFamily="34" charset="0"/>
+              </a:rPr>
+              <a:t>For</a:t>
+            </a:r>
+            <a:r>
+              <a:rPr lang="de-CH" sz="1000" b="1" dirty="0">
+                <a:solidFill>
+                  <a:schemeClr val="tx1"/>
+                </a:solidFill>
+                <a:latin typeface="Arial" panose="020B0604020202020204" pitchFamily="34" charset="0"/>
+                <a:cs typeface="Arial" panose="020B0604020202020204" pitchFamily="34" charset="0"/>
+              </a:rPr>
+              <a:t> </a:t>
+            </a:r>
+            <a:r>
+              <a:rPr lang="de-CH" sz="1000" b="1" dirty="0" err="1">
+                <a:solidFill>
+                  <a:schemeClr val="tx1"/>
+                </a:solidFill>
+                <a:latin typeface="Arial" panose="020B0604020202020204" pitchFamily="34" charset="0"/>
+                <a:cs typeface="Arial" panose="020B0604020202020204" pitchFamily="34" charset="0"/>
+              </a:rPr>
+              <a:t>testing</a:t>
+            </a:r>
+            <a:endParaRPr lang="de-CH" sz="1000" b="1" dirty="0">
+              <a:solidFill>
+                <a:schemeClr val="tx1"/>
+              </a:solidFill>
+              <a:latin typeface="Arial" panose="020B0604020202020204" pitchFamily="34" charset="0"/>
+              <a:cs typeface="Arial" panose="020B0604020202020204" pitchFamily="34" charset="0"/>
+            </a:endParaRPr>
+          </a:p>
+          <a:p>
+            <a:r>
+              <a:rPr lang="de-CH" sz="1000" b="1" dirty="0" err="1">
+                <a:solidFill>
+                  <a:schemeClr val="tx1"/>
+                </a:solidFill>
+                <a:latin typeface="Arial" panose="020B0604020202020204" pitchFamily="34" charset="0"/>
+                <a:cs typeface="Arial" panose="020B0604020202020204" pitchFamily="34" charset="0"/>
+              </a:rPr>
+              <a:t>tempMainFunction</a:t>
+            </a:r>
+            <a:r>
+              <a:rPr lang="de-CH" sz="1000" b="1" dirty="0">
+                <a:solidFill>
+                  <a:schemeClr val="tx1"/>
+                </a:solidFill>
+                <a:latin typeface="Arial" panose="020B0604020202020204" pitchFamily="34" charset="0"/>
+                <a:cs typeface="Arial" panose="020B0604020202020204" pitchFamily="34" charset="0"/>
+              </a:rPr>
+              <a:t>: </a:t>
+            </a:r>
+            <a:r>
+              <a:rPr lang="de-CH" sz="1000" b="1" dirty="0" err="1">
+                <a:solidFill>
+                  <a:schemeClr val="tx1"/>
+                </a:solidFill>
+                <a:latin typeface="Arial" panose="020B0604020202020204" pitchFamily="34" charset="0"/>
+                <a:cs typeface="Arial" panose="020B0604020202020204" pitchFamily="34" charset="0"/>
+              </a:rPr>
+              <a:t>For</a:t>
+            </a:r>
+            <a:r>
+              <a:rPr lang="de-CH" sz="1000" b="1" dirty="0">
+                <a:solidFill>
+                  <a:schemeClr val="tx1"/>
+                </a:solidFill>
+                <a:latin typeface="Arial" panose="020B0604020202020204" pitchFamily="34" charset="0"/>
+                <a:cs typeface="Arial" panose="020B0604020202020204" pitchFamily="34" charset="0"/>
+              </a:rPr>
+              <a:t> </a:t>
+            </a:r>
+            <a:r>
+              <a:rPr lang="de-CH" sz="1000" b="1" dirty="0" err="1">
+                <a:solidFill>
+                  <a:schemeClr val="tx1"/>
+                </a:solidFill>
+                <a:latin typeface="Arial" panose="020B0604020202020204" pitchFamily="34" charset="0"/>
+                <a:cs typeface="Arial" panose="020B0604020202020204" pitchFamily="34" charset="0"/>
+              </a:rPr>
+              <a:t>testing</a:t>
+            </a:r>
+            <a:endParaRPr lang="de-CH" sz="1000" b="1" dirty="0">
+              <a:solidFill>
+                <a:schemeClr val="tx1"/>
+              </a:solidFill>
+              <a:latin typeface="Arial" panose="020B0604020202020204" pitchFamily="34" charset="0"/>
+              <a:cs typeface="Arial" panose="020B0604020202020204" pitchFamily="34" charset="0"/>
+            </a:endParaRPr>
+          </a:p>
+        </p:txBody>
+      </p:sp>
     </p:spTree>
     <p:extLst>
       <p:ext uri="{BB962C8B-B14F-4D97-AF65-F5344CB8AC3E}">
-        <p14:creationId xmlns:p14="http://schemas.microsoft.com/office/powerpoint/2010/main" val="2402299156"/>
+        <p14:creationId xmlns:p14="http://schemas.microsoft.com/office/powerpoint/2010/main" val="359369775"/>
       </p:ext>
     </p:extLst>
   </p:cSld>

</xml_diff>

<commit_message>
First version scan dir
</commit_message>
<xml_diff>
--- a/Description/ReservationLayout.pptx
+++ b/Description/ReservationLayout.pptx
@@ -287,7 +287,7 @@
           <a:p>
             <a:fld id="{DDCE6D58-9B57-4731-A47B-3CD41B48F0A9}" type="datetimeFigureOut">
               <a:rPr lang="de-CH" smtClean="0"/>
-              <a:t>07.01.2025</a:t>
+              <a:t>10.01.2025</a:t>
             </a:fld>
             <a:endParaRPr lang="de-CH"/>
           </a:p>
@@ -457,7 +457,7 @@
           <a:p>
             <a:fld id="{DDCE6D58-9B57-4731-A47B-3CD41B48F0A9}" type="datetimeFigureOut">
               <a:rPr lang="de-CH" smtClean="0"/>
-              <a:t>07.01.2025</a:t>
+              <a:t>10.01.2025</a:t>
             </a:fld>
             <a:endParaRPr lang="de-CH"/>
           </a:p>
@@ -637,7 +637,7 @@
           <a:p>
             <a:fld id="{DDCE6D58-9B57-4731-A47B-3CD41B48F0A9}" type="datetimeFigureOut">
               <a:rPr lang="de-CH" smtClean="0"/>
-              <a:t>07.01.2025</a:t>
+              <a:t>10.01.2025</a:t>
             </a:fld>
             <a:endParaRPr lang="de-CH"/>
           </a:p>
@@ -807,7 +807,7 @@
           <a:p>
             <a:fld id="{DDCE6D58-9B57-4731-A47B-3CD41B48F0A9}" type="datetimeFigureOut">
               <a:rPr lang="de-CH" smtClean="0"/>
-              <a:t>07.01.2025</a:t>
+              <a:t>10.01.2025</a:t>
             </a:fld>
             <a:endParaRPr lang="de-CH"/>
           </a:p>
@@ -1053,7 +1053,7 @@
           <a:p>
             <a:fld id="{DDCE6D58-9B57-4731-A47B-3CD41B48F0A9}" type="datetimeFigureOut">
               <a:rPr lang="de-CH" smtClean="0"/>
-              <a:t>07.01.2025</a:t>
+              <a:t>10.01.2025</a:t>
             </a:fld>
             <a:endParaRPr lang="de-CH"/>
           </a:p>
@@ -1285,7 +1285,7 @@
           <a:p>
             <a:fld id="{DDCE6D58-9B57-4731-A47B-3CD41B48F0A9}" type="datetimeFigureOut">
               <a:rPr lang="de-CH" smtClean="0"/>
-              <a:t>07.01.2025</a:t>
+              <a:t>10.01.2025</a:t>
             </a:fld>
             <a:endParaRPr lang="de-CH"/>
           </a:p>
@@ -1652,7 +1652,7 @@
           <a:p>
             <a:fld id="{DDCE6D58-9B57-4731-A47B-3CD41B48F0A9}" type="datetimeFigureOut">
               <a:rPr lang="de-CH" smtClean="0"/>
-              <a:t>07.01.2025</a:t>
+              <a:t>10.01.2025</a:t>
             </a:fld>
             <a:endParaRPr lang="de-CH"/>
           </a:p>
@@ -1770,7 +1770,7 @@
           <a:p>
             <a:fld id="{DDCE6D58-9B57-4731-A47B-3CD41B48F0A9}" type="datetimeFigureOut">
               <a:rPr lang="de-CH" smtClean="0"/>
-              <a:t>07.01.2025</a:t>
+              <a:t>10.01.2025</a:t>
             </a:fld>
             <a:endParaRPr lang="de-CH"/>
           </a:p>
@@ -1865,7 +1865,7 @@
           <a:p>
             <a:fld id="{DDCE6D58-9B57-4731-A47B-3CD41B48F0A9}" type="datetimeFigureOut">
               <a:rPr lang="de-CH" smtClean="0"/>
-              <a:t>07.01.2025</a:t>
+              <a:t>10.01.2025</a:t>
             </a:fld>
             <a:endParaRPr lang="de-CH"/>
           </a:p>
@@ -2142,7 +2142,7 @@
           <a:p>
             <a:fld id="{DDCE6D58-9B57-4731-A47B-3CD41B48F0A9}" type="datetimeFigureOut">
               <a:rPr lang="de-CH" smtClean="0"/>
-              <a:t>07.01.2025</a:t>
+              <a:t>10.01.2025</a:t>
             </a:fld>
             <a:endParaRPr lang="de-CH"/>
           </a:p>
@@ -2395,7 +2395,7 @@
           <a:p>
             <a:fld id="{DDCE6D58-9B57-4731-A47B-3CD41B48F0A9}" type="datetimeFigureOut">
               <a:rPr lang="de-CH" smtClean="0"/>
-              <a:t>07.01.2025</a:t>
+              <a:t>10.01.2025</a:t>
             </a:fld>
             <a:endParaRPr lang="de-CH"/>
           </a:p>
@@ -2608,7 +2608,7 @@
           <a:p>
             <a:fld id="{DDCE6D58-9B57-4731-A47B-3CD41B48F0A9}" type="datetimeFigureOut">
               <a:rPr lang="de-CH" smtClean="0"/>
-              <a:t>07.01.2025</a:t>
+              <a:t>10.01.2025</a:t>
             </a:fld>
             <a:endParaRPr lang="de-CH"/>
           </a:p>
@@ -23647,7 +23647,7 @@
         <p:spPr>
           <a:xfrm>
             <a:off x="436535" y="1142868"/>
-            <a:ext cx="2966541" cy="4942134"/>
+            <a:ext cx="2966541" cy="5133334"/>
           </a:xfrm>
           <a:prstGeom prst="rect">
             <a:avLst/>
@@ -23737,6 +23737,47 @@
                 <a:latin typeface="Arial" panose="020B0604020202020204" pitchFamily="34" charset="0"/>
                 <a:cs typeface="Arial" panose="020B0604020202020204" pitchFamily="34" charset="0"/>
               </a:rPr>
+              <a:t>m_callback_function_array</a:t>
+            </a:r>
+            <a:r>
+              <a:rPr lang="en-US" sz="1000" b="1" dirty="0">
+                <a:solidFill>
+                  <a:schemeClr val="tx1"/>
+                </a:solidFill>
+                <a:latin typeface="Arial" panose="020B0604020202020204" pitchFamily="34" charset="0"/>
+                <a:cs typeface="Arial" panose="020B0604020202020204" pitchFamily="34" charset="0"/>
+              </a:rPr>
+              <a:t> </a:t>
+            </a:r>
+          </a:p>
+          <a:p>
+            <a:r>
+              <a:rPr lang="en-US" sz="1000" b="1" dirty="0" err="1">
+                <a:solidFill>
+                  <a:schemeClr val="tx1"/>
+                </a:solidFill>
+                <a:latin typeface="Arial" panose="020B0604020202020204" pitchFamily="34" charset="0"/>
+                <a:cs typeface="Arial" panose="020B0604020202020204" pitchFamily="34" charset="0"/>
+              </a:rPr>
+              <a:t>m_callback_function_array_index</a:t>
+            </a:r>
+            <a:endParaRPr lang="en-US" sz="1000" b="1" dirty="0">
+              <a:solidFill>
+                <a:schemeClr val="tx1"/>
+              </a:solidFill>
+              <a:latin typeface="Arial" panose="020B0604020202020204" pitchFamily="34" charset="0"/>
+              <a:cs typeface="Arial" panose="020B0604020202020204" pitchFamily="34" charset="0"/>
+            </a:endParaRPr>
+          </a:p>
+          <a:p>
+            <a:r>
+              <a:rPr lang="en-US" sz="1000" b="1" dirty="0" err="1">
+                <a:solidFill>
+                  <a:schemeClr val="tx1"/>
+                </a:solidFill>
+                <a:latin typeface="Arial" panose="020B0604020202020204" pitchFamily="34" charset="0"/>
+                <a:cs typeface="Arial" panose="020B0604020202020204" pitchFamily="34" charset="0"/>
+              </a:rPr>
               <a:t>m_error_callback_function_name</a:t>
             </a:r>
             <a:endParaRPr lang="en-US" sz="1000" b="1" dirty="0">
@@ -24184,18 +24225,6 @@
               <a:latin typeface="Arial" panose="020B0604020202020204" pitchFamily="34" charset="0"/>
               <a:cs typeface="Arial" panose="020B0604020202020204" pitchFamily="34" charset="0"/>
             </a:endParaRPr>
-          </a:p>
-          <a:p>
-            <a:r>
-              <a:rPr lang="de-CH" sz="1000" b="1" dirty="0">
-                <a:solidFill>
-                  <a:schemeClr val="tx1"/>
-                </a:solidFill>
-                <a:latin typeface="Arial" panose="020B0604020202020204" pitchFamily="34" charset="0"/>
-                <a:cs typeface="Arial" panose="020B0604020202020204" pitchFamily="34" charset="0"/>
-              </a:rPr>
-              <a:t>.</a:t>
-            </a:r>
           </a:p>
           <a:p>
             <a:r>

</xml_diff>